<commit_message>
Updated ppt with Lunar Lander and Acrobot results
</commit_message>
<xml_diff>
--- a/Final Project Presentation.pptx
+++ b/Final Project Presentation.pptx
@@ -22,9 +22,29 @@
     <p:sldId id="273" r:id="rId16"/>
     <p:sldId id="280" r:id="rId17"/>
     <p:sldId id="281" r:id="rId18"/>
-    <p:sldId id="274" r:id="rId19"/>
-    <p:sldId id="275" r:id="rId20"/>
-    <p:sldId id="282" r:id="rId21"/>
+    <p:sldId id="283" r:id="rId19"/>
+    <p:sldId id="288" r:id="rId20"/>
+    <p:sldId id="284" r:id="rId21"/>
+    <p:sldId id="289" r:id="rId22"/>
+    <p:sldId id="286" r:id="rId23"/>
+    <p:sldId id="290" r:id="rId24"/>
+    <p:sldId id="285" r:id="rId25"/>
+    <p:sldId id="291" r:id="rId26"/>
+    <p:sldId id="287" r:id="rId27"/>
+    <p:sldId id="292" r:id="rId28"/>
+    <p:sldId id="293" r:id="rId29"/>
+    <p:sldId id="294" r:id="rId30"/>
+    <p:sldId id="295" r:id="rId31"/>
+    <p:sldId id="296" r:id="rId32"/>
+    <p:sldId id="297" r:id="rId33"/>
+    <p:sldId id="298" r:id="rId34"/>
+    <p:sldId id="299" r:id="rId35"/>
+    <p:sldId id="300" r:id="rId36"/>
+    <p:sldId id="301" r:id="rId37"/>
+    <p:sldId id="302" r:id="rId38"/>
+    <p:sldId id="274" r:id="rId39"/>
+    <p:sldId id="275" r:id="rId40"/>
+    <p:sldId id="282" r:id="rId41"/>
   </p:sldIdLst>
   <p:sldSz cx="12192000" cy="6858000"/>
   <p:notesSz cx="6858000" cy="9144000"/>
@@ -123,6 +143,11 @@
       </a:defRPr>
     </a:lvl9pPr>
   </p:defaultTextStyle>
+  <p:extLst>
+    <p:ext uri="{EFAFB233-063F-42B5-8137-9DF3F51BA10A}">
+      <p15:sldGuideLst xmlns:p15="http://schemas.microsoft.com/office/powerpoint/2012/main"/>
+    </p:ext>
+  </p:extLst>
 </p:presentation>
 </file>
 
@@ -6714,7 +6739,12 @@
             <p:ph type="body" sz="quarter" idx="10"/>
           </p:nvPr>
         </p:nvSpPr>
-        <p:spPr/>
+        <p:spPr>
+          <a:xfrm>
+            <a:off x="658368" y="4340830"/>
+            <a:ext cx="6638544" cy="1650381"/>
+          </a:xfrm>
+        </p:spPr>
         <p:txBody>
           <a:bodyPr/>
           <a:lstStyle/>
@@ -6926,7 +6956,19 @@
           <a:p>
             <a:r>
               <a:rPr lang="en-US" dirty="0"/>
-              <a:t>Presenters: Harsh Bhargava and Vivek</a:t>
+              <a:t>Presenters: Harsh Bhargava </a:t>
+            </a:r>
+          </a:p>
+          <a:p>
+            <a:r>
+              <a:rPr lang="en-US" dirty="0"/>
+              <a:t>			and </a:t>
+            </a:r>
+          </a:p>
+          <a:p>
+            <a:r>
+              <a:rPr lang="en-US" dirty="0"/>
+              <a:t>		Vivek Viswam R. V.</a:t>
             </a:r>
           </a:p>
         </p:txBody>
@@ -9603,13 +9645,7 @@
   <p:cSld>
     <p:spTree>
       <p:nvGrpSpPr>
-        <p:cNvPr id="1" name="">
-          <a:extLst>
-            <a:ext uri="{FF2B5EF4-FFF2-40B4-BE49-F238E27FC236}">
-              <a16:creationId xmlns:a16="http://schemas.microsoft.com/office/drawing/2014/main" id="{9159CA42-E54B-4158-A290-1688BD730C41}"/>
-            </a:ext>
-          </a:extLst>
-        </p:cNvPr>
+        <p:cNvPr id="1" name=""/>
         <p:cNvGrpSpPr/>
         <p:nvPr/>
       </p:nvGrpSpPr>
@@ -9623,18 +9659,18 @@
       </p:grpSpPr>
       <p:sp>
         <p:nvSpPr>
-          <p:cNvPr id="4" name="Sub-topic">
-            <a:extLst>
-              <a:ext uri="{FF2B5EF4-FFF2-40B4-BE49-F238E27FC236}">
-                <a16:creationId xmlns:a16="http://schemas.microsoft.com/office/drawing/2014/main" id="{7338BDB3-59AA-9059-7996-A2F01752888B}"/>
-              </a:ext>
-            </a:extLst>
-          </p:cNvPr>
-          <p:cNvSpPr>
-            <a:spLocks noGrp="1"/>
-          </p:cNvSpPr>
-          <p:nvPr>
-            <p:ph type="ctrTitle"/>
+          <p:cNvPr id="2" name="Title 1">
+            <a:extLst>
+              <a:ext uri="{FF2B5EF4-FFF2-40B4-BE49-F238E27FC236}">
+                <a16:creationId xmlns:a16="http://schemas.microsoft.com/office/drawing/2014/main" id="{04E2A0A8-4F3D-5BF3-3A95-054E7716541D}"/>
+              </a:ext>
+            </a:extLst>
+          </p:cNvPr>
+          <p:cNvSpPr>
+            <a:spLocks noGrp="1"/>
+          </p:cNvSpPr>
+          <p:nvPr>
+            <p:ph type="title"/>
           </p:nvPr>
         </p:nvSpPr>
         <p:spPr/>
@@ -9644,25 +9680,60 @@
           <a:p>
             <a:r>
               <a:rPr lang="en-US" dirty="0"/>
-              <a:t>Demo</a:t>
-            </a:r>
-          </a:p>
-        </p:txBody>
-      </p:sp>
-      <p:sp>
-        <p:nvSpPr>
-          <p:cNvPr id="5" name="Section Divider Title">
-            <a:extLst>
-              <a:ext uri="{FF2B5EF4-FFF2-40B4-BE49-F238E27FC236}">
-                <a16:creationId xmlns:a16="http://schemas.microsoft.com/office/drawing/2014/main" id="{667A348B-801F-F6C1-BCB1-CF9A3F4498D0}"/>
-              </a:ext>
-            </a:extLst>
-          </p:cNvPr>
-          <p:cNvSpPr>
-            <a:spLocks noGrp="1"/>
-          </p:cNvSpPr>
-          <p:nvPr>
-            <p:ph type="subTitle" idx="1"/>
+              <a:t>Lunar Lander: DQN (Training)</a:t>
+            </a:r>
+          </a:p>
+        </p:txBody>
+      </p:sp>
+      <p:pic>
+        <p:nvPicPr>
+          <p:cNvPr id="6" name="Content Placeholder 5">
+            <a:extLst>
+              <a:ext uri="{FF2B5EF4-FFF2-40B4-BE49-F238E27FC236}">
+                <a16:creationId xmlns:a16="http://schemas.microsoft.com/office/drawing/2014/main" id="{DFC4D672-4DA5-A93E-B221-C09FDAEF2E48}"/>
+              </a:ext>
+            </a:extLst>
+          </p:cNvPr>
+          <p:cNvPicPr>
+            <a:picLocks noGrp="1" noChangeAspect="1"/>
+          </p:cNvPicPr>
+          <p:nvPr>
+            <p:ph idx="1"/>
+          </p:nvPr>
+        </p:nvPicPr>
+        <p:blipFill>
+          <a:blip r:embed="rId2">
+            <a:extLst>
+              <a:ext uri="{28A0092B-C50C-407E-A947-70E740481C1C}">
+                <a14:useLocalDpi xmlns:a14="http://schemas.microsoft.com/office/drawing/2010/main" val="0"/>
+              </a:ext>
+            </a:extLst>
+          </a:blip>
+          <a:stretch>
+            <a:fillRect/>
+          </a:stretch>
+        </p:blipFill>
+        <p:spPr>
+          <a:xfrm>
+            <a:off x="637032" y="2260288"/>
+            <a:ext cx="4982270" cy="3753374"/>
+          </a:xfrm>
+        </p:spPr>
+      </p:pic>
+      <p:sp>
+        <p:nvSpPr>
+          <p:cNvPr id="4" name="Footer Placeholder 3">
+            <a:extLst>
+              <a:ext uri="{FF2B5EF4-FFF2-40B4-BE49-F238E27FC236}">
+                <a16:creationId xmlns:a16="http://schemas.microsoft.com/office/drawing/2014/main" id="{FC4E3709-291D-AC80-16EF-3603B4888F4F}"/>
+              </a:ext>
+            </a:extLst>
+          </p:cNvPr>
+          <p:cNvSpPr>
+            <a:spLocks noGrp="1"/>
+          </p:cNvSpPr>
+          <p:nvPr>
+            <p:ph type="ftr" sz="quarter" idx="10"/>
           </p:nvPr>
         </p:nvSpPr>
         <p:spPr/>
@@ -9670,14 +9741,55 @@
           <a:bodyPr/>
           <a:lstStyle/>
           <a:p>
+            <a:fld id="{EB53C135-CEC6-A548-8917-8F7FEB82358B}" type="slidenum">
+              <a:rPr lang="en-US" smtClean="0"/>
+              <a:pPr/>
+              <a:t>17</a:t>
+            </a:fld>
             <a:endParaRPr lang="en-US" dirty="0"/>
           </a:p>
         </p:txBody>
       </p:sp>
+      <p:pic>
+        <p:nvPicPr>
+          <p:cNvPr id="8" name="Picture 7">
+            <a:extLst>
+              <a:ext uri="{FF2B5EF4-FFF2-40B4-BE49-F238E27FC236}">
+                <a16:creationId xmlns:a16="http://schemas.microsoft.com/office/drawing/2014/main" id="{F2B3646C-C028-F751-BA23-8C8DD27E761E}"/>
+              </a:ext>
+            </a:extLst>
+          </p:cNvPr>
+          <p:cNvPicPr>
+            <a:picLocks noChangeAspect="1"/>
+          </p:cNvPicPr>
+          <p:nvPr/>
+        </p:nvPicPr>
+        <p:blipFill>
+          <a:blip r:embed="rId3">
+            <a:extLst>
+              <a:ext uri="{28A0092B-C50C-407E-A947-70E740481C1C}">
+                <a14:useLocalDpi xmlns:a14="http://schemas.microsoft.com/office/drawing/2010/main" val="0"/>
+              </a:ext>
+            </a:extLst>
+          </a:blip>
+          <a:stretch>
+            <a:fillRect/>
+          </a:stretch>
+        </p:blipFill>
+        <p:spPr>
+          <a:xfrm>
+            <a:off x="5900974" y="2260288"/>
+            <a:ext cx="4906060" cy="3791479"/>
+          </a:xfrm>
+          <a:prstGeom prst="rect">
+            <a:avLst/>
+          </a:prstGeom>
+        </p:spPr>
+      </p:pic>
     </p:spTree>
     <p:extLst>
       <p:ext uri="{BB962C8B-B14F-4D97-AF65-F5344CB8AC3E}">
-        <p14:creationId xmlns:p14="http://schemas.microsoft.com/office/powerpoint/2010/main" val="1698194335"/>
+        <p14:creationId xmlns:p14="http://schemas.microsoft.com/office/powerpoint/2010/main" val="3091967620"/>
       </p:ext>
     </p:extLst>
   </p:cSld>
@@ -9695,7 +9807,7 @@
         <p:cNvPr id="1" name="">
           <a:extLst>
             <a:ext uri="{FF2B5EF4-FFF2-40B4-BE49-F238E27FC236}">
-              <a16:creationId xmlns:a16="http://schemas.microsoft.com/office/drawing/2014/main" id="{13F16B6F-AF95-EB09-E2B1-477ED4A38E50}"/>
+              <a16:creationId xmlns:a16="http://schemas.microsoft.com/office/drawing/2014/main" id="{88D81FEE-8E9F-5E45-7E49-41467AD25827}"/>
             </a:ext>
           </a:extLst>
         </p:cNvPr>
@@ -9715,7 +9827,7 @@
           <p:cNvPr id="2" name="Title 1">
             <a:extLst>
               <a:ext uri="{FF2B5EF4-FFF2-40B4-BE49-F238E27FC236}">
-                <a16:creationId xmlns:a16="http://schemas.microsoft.com/office/drawing/2014/main" id="{8ADDB04F-3D8D-BB07-A54A-DC7CACFD7555}"/>
+                <a16:creationId xmlns:a16="http://schemas.microsoft.com/office/drawing/2014/main" id="{4CE0845F-5513-C048-88D5-DAADAC6D0292}"/>
               </a:ext>
             </a:extLst>
           </p:cNvPr>
@@ -9726,50 +9838,64 @@
             <p:ph type="title"/>
           </p:nvPr>
         </p:nvSpPr>
-        <p:spPr/>
+        <p:spPr>
+          <a:xfrm>
+            <a:off x="566928" y="1499616"/>
+            <a:ext cx="6951472" cy="590931"/>
+          </a:xfrm>
+        </p:spPr>
         <p:txBody>
           <a:bodyPr/>
           <a:lstStyle/>
           <a:p>
             <a:r>
               <a:rPr lang="en-US" dirty="0"/>
-              <a:t>Challenges</a:t>
-            </a:r>
-            <a:endParaRPr lang="en-IN" dirty="0"/>
-          </a:p>
-        </p:txBody>
-      </p:sp>
-      <p:sp>
-        <p:nvSpPr>
-          <p:cNvPr id="3" name="Content Placeholder 2">
-            <a:extLst>
-              <a:ext uri="{FF2B5EF4-FFF2-40B4-BE49-F238E27FC236}">
-                <a16:creationId xmlns:a16="http://schemas.microsoft.com/office/drawing/2014/main" id="{1FF5E961-7D49-296A-D9AD-FB39DBF99E80}"/>
-              </a:ext>
-            </a:extLst>
-          </p:cNvPr>
-          <p:cNvSpPr>
-            <a:spLocks noGrp="1"/>
-          </p:cNvSpPr>
+              <a:t>Lunar Lander: DQN (Evaluation)</a:t>
+            </a:r>
+          </a:p>
+        </p:txBody>
+      </p:sp>
+      <p:pic>
+        <p:nvPicPr>
+          <p:cNvPr id="6" name="Content Placeholder 5">
+            <a:extLst>
+              <a:ext uri="{FF2B5EF4-FFF2-40B4-BE49-F238E27FC236}">
+                <a16:creationId xmlns:a16="http://schemas.microsoft.com/office/drawing/2014/main" id="{F340B7D8-736A-9961-AECA-1D2476523F41}"/>
+              </a:ext>
+            </a:extLst>
+          </p:cNvPr>
+          <p:cNvPicPr>
+            <a:picLocks noGrp="1" noChangeAspect="1"/>
+          </p:cNvPicPr>
           <p:nvPr>
             <p:ph idx="1"/>
           </p:nvPr>
-        </p:nvSpPr>
-        <p:spPr/>
-        <p:txBody>
-          <a:bodyPr/>
-          <a:lstStyle/>
-          <a:p>
-            <a:endParaRPr lang="en-IN"/>
-          </a:p>
-        </p:txBody>
-      </p:sp>
+        </p:nvPicPr>
+        <p:blipFill>
+          <a:blip r:embed="rId2">
+            <a:extLst>
+              <a:ext uri="{28A0092B-C50C-407E-A947-70E740481C1C}">
+                <a14:useLocalDpi xmlns:a14="http://schemas.microsoft.com/office/drawing/2010/main" val="0"/>
+              </a:ext>
+            </a:extLst>
+          </a:blip>
+          <a:stretch>
+            <a:fillRect/>
+          </a:stretch>
+        </p:blipFill>
+        <p:spPr>
+          <a:xfrm>
+            <a:off x="566928" y="2269066"/>
+            <a:ext cx="4991797" cy="3801005"/>
+          </a:xfrm>
+        </p:spPr>
+      </p:pic>
       <p:sp>
         <p:nvSpPr>
           <p:cNvPr id="4" name="Footer Placeholder 3">
             <a:extLst>
               <a:ext uri="{FF2B5EF4-FFF2-40B4-BE49-F238E27FC236}">
-                <a16:creationId xmlns:a16="http://schemas.microsoft.com/office/drawing/2014/main" id="{1FB69A47-1EB5-4657-4814-90645E8799D8}"/>
+                <a16:creationId xmlns:a16="http://schemas.microsoft.com/office/drawing/2014/main" id="{2A2F2524-66B4-C477-DE9C-17FC3A863117}"/>
               </a:ext>
             </a:extLst>
           </p:cNvPr>
@@ -9794,10 +9920,46 @@
           </a:p>
         </p:txBody>
       </p:sp>
+      <p:pic>
+        <p:nvPicPr>
+          <p:cNvPr id="8" name="Picture 7">
+            <a:extLst>
+              <a:ext uri="{FF2B5EF4-FFF2-40B4-BE49-F238E27FC236}">
+                <a16:creationId xmlns:a16="http://schemas.microsoft.com/office/drawing/2014/main" id="{AC040477-7307-0249-1D56-6AC09644EAC4}"/>
+              </a:ext>
+            </a:extLst>
+          </p:cNvPr>
+          <p:cNvPicPr>
+            <a:picLocks noChangeAspect="1"/>
+          </p:cNvPicPr>
+          <p:nvPr/>
+        </p:nvPicPr>
+        <p:blipFill>
+          <a:blip r:embed="rId3">
+            <a:extLst>
+              <a:ext uri="{28A0092B-C50C-407E-A947-70E740481C1C}">
+                <a14:useLocalDpi xmlns:a14="http://schemas.microsoft.com/office/drawing/2010/main" val="0"/>
+              </a:ext>
+            </a:extLst>
+          </a:blip>
+          <a:stretch>
+            <a:fillRect/>
+          </a:stretch>
+        </p:blipFill>
+        <p:spPr>
+          <a:xfrm>
+            <a:off x="5921171" y="2269066"/>
+            <a:ext cx="5172797" cy="3820058"/>
+          </a:xfrm>
+          <a:prstGeom prst="rect">
+            <a:avLst/>
+          </a:prstGeom>
+        </p:spPr>
+      </p:pic>
     </p:spTree>
     <p:extLst>
       <p:ext uri="{BB962C8B-B14F-4D97-AF65-F5344CB8AC3E}">
-        <p14:creationId xmlns:p14="http://schemas.microsoft.com/office/powerpoint/2010/main" val="929824031"/>
+        <p14:creationId xmlns:p14="http://schemas.microsoft.com/office/powerpoint/2010/main" val="4076909719"/>
       </p:ext>
     </p:extLst>
   </p:cSld>
@@ -9812,7 +9974,13 @@
   <p:cSld>
     <p:spTree>
       <p:nvGrpSpPr>
-        <p:cNvPr id="1" name=""/>
+        <p:cNvPr id="1" name="">
+          <a:extLst>
+            <a:ext uri="{FF2B5EF4-FFF2-40B4-BE49-F238E27FC236}">
+              <a16:creationId xmlns:a16="http://schemas.microsoft.com/office/drawing/2014/main" id="{69AD9347-4179-726C-3563-30CCA4EC8B63}"/>
+            </a:ext>
+          </a:extLst>
+        </p:cNvPr>
         <p:cNvGrpSpPr/>
         <p:nvPr/>
       </p:nvGrpSpPr>
@@ -9829,7 +9997,7 @@
           <p:cNvPr id="2" name="Title 1">
             <a:extLst>
               <a:ext uri="{FF2B5EF4-FFF2-40B4-BE49-F238E27FC236}">
-                <a16:creationId xmlns:a16="http://schemas.microsoft.com/office/drawing/2014/main" id="{3741CAEC-B05F-C1F0-3356-1C899FA4C902}"/>
+                <a16:creationId xmlns:a16="http://schemas.microsoft.com/office/drawing/2014/main" id="{B9FBC250-3920-3257-9170-7757D9F9229C}"/>
               </a:ext>
             </a:extLst>
           </p:cNvPr>
@@ -9847,43 +10015,52 @@
           <a:p>
             <a:r>
               <a:rPr lang="en-US" dirty="0"/>
-              <a:t>Contribution Table</a:t>
-            </a:r>
-            <a:endParaRPr lang="en-IN" dirty="0"/>
-          </a:p>
-        </p:txBody>
-      </p:sp>
-      <p:sp>
-        <p:nvSpPr>
-          <p:cNvPr id="3" name="Content Placeholder 2">
-            <a:extLst>
-              <a:ext uri="{FF2B5EF4-FFF2-40B4-BE49-F238E27FC236}">
-                <a16:creationId xmlns:a16="http://schemas.microsoft.com/office/drawing/2014/main" id="{2A364488-7B55-16E2-77B9-C220CFF03DA8}"/>
-              </a:ext>
-            </a:extLst>
-          </p:cNvPr>
-          <p:cNvSpPr>
-            <a:spLocks noGrp="1"/>
-          </p:cNvSpPr>
+              <a:t>Lunar Lander: DDQN (Training)</a:t>
+            </a:r>
+          </a:p>
+        </p:txBody>
+      </p:sp>
+      <p:pic>
+        <p:nvPicPr>
+          <p:cNvPr id="6" name="Content Placeholder 5">
+            <a:extLst>
+              <a:ext uri="{FF2B5EF4-FFF2-40B4-BE49-F238E27FC236}">
+                <a16:creationId xmlns:a16="http://schemas.microsoft.com/office/drawing/2014/main" id="{DA477147-37F3-1BAC-A9F2-2E91347ABF73}"/>
+              </a:ext>
+            </a:extLst>
+          </p:cNvPr>
+          <p:cNvPicPr>
+            <a:picLocks noGrp="1" noChangeAspect="1"/>
+          </p:cNvPicPr>
           <p:nvPr>
             <p:ph idx="1"/>
           </p:nvPr>
-        </p:nvSpPr>
-        <p:spPr/>
-        <p:txBody>
-          <a:bodyPr/>
-          <a:lstStyle/>
-          <a:p>
-            <a:endParaRPr lang="en-IN" dirty="0"/>
-          </a:p>
-        </p:txBody>
-      </p:sp>
+        </p:nvPicPr>
+        <p:blipFill>
+          <a:blip r:embed="rId2">
+            <a:extLst>
+              <a:ext uri="{28A0092B-C50C-407E-A947-70E740481C1C}">
+                <a14:useLocalDpi xmlns:a14="http://schemas.microsoft.com/office/drawing/2010/main" val="0"/>
+              </a:ext>
+            </a:extLst>
+          </a:blip>
+          <a:stretch>
+            <a:fillRect/>
+          </a:stretch>
+        </p:blipFill>
+        <p:spPr>
+          <a:xfrm>
+            <a:off x="566928" y="2314151"/>
+            <a:ext cx="5001323" cy="3724795"/>
+          </a:xfrm>
+        </p:spPr>
+      </p:pic>
       <p:sp>
         <p:nvSpPr>
           <p:cNvPr id="4" name="Footer Placeholder 3">
             <a:extLst>
               <a:ext uri="{FF2B5EF4-FFF2-40B4-BE49-F238E27FC236}">
-                <a16:creationId xmlns:a16="http://schemas.microsoft.com/office/drawing/2014/main" id="{3DFCB9C5-D32C-D27E-AACF-640851B30F8B}"/>
+                <a16:creationId xmlns:a16="http://schemas.microsoft.com/office/drawing/2014/main" id="{4918E4C1-5A25-89CA-F3FE-884C723E42C3}"/>
               </a:ext>
             </a:extLst>
           </p:cNvPr>
@@ -9908,10 +10085,46 @@
           </a:p>
         </p:txBody>
       </p:sp>
+      <p:pic>
+        <p:nvPicPr>
+          <p:cNvPr id="8" name="Picture 7">
+            <a:extLst>
+              <a:ext uri="{FF2B5EF4-FFF2-40B4-BE49-F238E27FC236}">
+                <a16:creationId xmlns:a16="http://schemas.microsoft.com/office/drawing/2014/main" id="{11E98312-1E28-B19F-331C-4EFB1453F05A}"/>
+              </a:ext>
+            </a:extLst>
+          </p:cNvPr>
+          <p:cNvPicPr>
+            <a:picLocks noChangeAspect="1"/>
+          </p:cNvPicPr>
+          <p:nvPr/>
+        </p:nvPicPr>
+        <p:blipFill>
+          <a:blip r:embed="rId3">
+            <a:extLst>
+              <a:ext uri="{28A0092B-C50C-407E-A947-70E740481C1C}">
+                <a14:useLocalDpi xmlns:a14="http://schemas.microsoft.com/office/drawing/2010/main" val="0"/>
+              </a:ext>
+            </a:extLst>
+          </a:blip>
+          <a:stretch>
+            <a:fillRect/>
+          </a:stretch>
+        </p:blipFill>
+        <p:spPr>
+          <a:xfrm>
+            <a:off x="5851694" y="2314151"/>
+            <a:ext cx="4801270" cy="3734321"/>
+          </a:xfrm>
+          <a:prstGeom prst="rect">
+            <a:avLst/>
+          </a:prstGeom>
+        </p:spPr>
+      </p:pic>
     </p:spTree>
     <p:extLst>
       <p:ext uri="{BB962C8B-B14F-4D97-AF65-F5344CB8AC3E}">
-        <p14:creationId xmlns:p14="http://schemas.microsoft.com/office/powerpoint/2010/main" val="3290968601"/>
+        <p14:creationId xmlns:p14="http://schemas.microsoft.com/office/powerpoint/2010/main" val="3611568128"/>
       </p:ext>
     </p:extLst>
   </p:cSld>
@@ -10104,6 +10317,1698 @@
 </p:sld>
 </file>
 
+<file path=ppt/slides/slide20.xml><?xml version="1.0" encoding="utf-8"?>
+<p:sld xmlns:a="http://schemas.openxmlformats.org/drawingml/2006/main" xmlns:r="http://schemas.openxmlformats.org/officeDocument/2006/relationships" xmlns:p="http://schemas.openxmlformats.org/presentationml/2006/main">
+  <p:cSld>
+    <p:spTree>
+      <p:nvGrpSpPr>
+        <p:cNvPr id="1" name="">
+          <a:extLst>
+            <a:ext uri="{FF2B5EF4-FFF2-40B4-BE49-F238E27FC236}">
+              <a16:creationId xmlns:a16="http://schemas.microsoft.com/office/drawing/2014/main" id="{022EF5C0-C5D7-22B1-5B55-0F2700BB0340}"/>
+            </a:ext>
+          </a:extLst>
+        </p:cNvPr>
+        <p:cNvGrpSpPr/>
+        <p:nvPr/>
+      </p:nvGrpSpPr>
+      <p:grpSpPr>
+        <a:xfrm>
+          <a:off x="0" y="0"/>
+          <a:ext cx="0" cy="0"/>
+          <a:chOff x="0" y="0"/>
+          <a:chExt cx="0" cy="0"/>
+        </a:xfrm>
+      </p:grpSpPr>
+      <p:sp>
+        <p:nvSpPr>
+          <p:cNvPr id="2" name="Title 1">
+            <a:extLst>
+              <a:ext uri="{FF2B5EF4-FFF2-40B4-BE49-F238E27FC236}">
+                <a16:creationId xmlns:a16="http://schemas.microsoft.com/office/drawing/2014/main" id="{91FFB5FC-FCE0-428F-ED87-A023CA830465}"/>
+              </a:ext>
+            </a:extLst>
+          </p:cNvPr>
+          <p:cNvSpPr>
+            <a:spLocks noGrp="1"/>
+          </p:cNvSpPr>
+          <p:nvPr>
+            <p:ph type="title"/>
+          </p:nvPr>
+        </p:nvSpPr>
+        <p:spPr>
+          <a:xfrm>
+            <a:off x="566928" y="1001018"/>
+            <a:ext cx="7550990" cy="1089529"/>
+          </a:xfrm>
+        </p:spPr>
+        <p:txBody>
+          <a:bodyPr/>
+          <a:lstStyle/>
+          <a:p>
+            <a:r>
+              <a:rPr lang="en-US" dirty="0"/>
+              <a:t>Lunar Lander: DDQN (Evaluation)</a:t>
+            </a:r>
+          </a:p>
+        </p:txBody>
+      </p:sp>
+      <p:pic>
+        <p:nvPicPr>
+          <p:cNvPr id="6" name="Content Placeholder 5">
+            <a:extLst>
+              <a:ext uri="{FF2B5EF4-FFF2-40B4-BE49-F238E27FC236}">
+                <a16:creationId xmlns:a16="http://schemas.microsoft.com/office/drawing/2014/main" id="{EDF36AB1-8C48-E461-86F5-9D0C264303E3}"/>
+              </a:ext>
+            </a:extLst>
+          </p:cNvPr>
+          <p:cNvPicPr>
+            <a:picLocks noGrp="1" noChangeAspect="1"/>
+          </p:cNvPicPr>
+          <p:nvPr>
+            <p:ph idx="1"/>
+          </p:nvPr>
+        </p:nvPicPr>
+        <p:blipFill>
+          <a:blip r:embed="rId2">
+            <a:extLst>
+              <a:ext uri="{28A0092B-C50C-407E-A947-70E740481C1C}">
+                <a14:useLocalDpi xmlns:a14="http://schemas.microsoft.com/office/drawing/2010/main" val="0"/>
+              </a:ext>
+            </a:extLst>
+          </a:blip>
+          <a:stretch>
+            <a:fillRect/>
+          </a:stretch>
+        </p:blipFill>
+        <p:spPr>
+          <a:xfrm>
+            <a:off x="566928" y="2152621"/>
+            <a:ext cx="4925112" cy="3810532"/>
+          </a:xfrm>
+        </p:spPr>
+      </p:pic>
+      <p:sp>
+        <p:nvSpPr>
+          <p:cNvPr id="4" name="Footer Placeholder 3">
+            <a:extLst>
+              <a:ext uri="{FF2B5EF4-FFF2-40B4-BE49-F238E27FC236}">
+                <a16:creationId xmlns:a16="http://schemas.microsoft.com/office/drawing/2014/main" id="{77C63D24-84E6-37B1-DE53-0B03DD94063F}"/>
+              </a:ext>
+            </a:extLst>
+          </p:cNvPr>
+          <p:cNvSpPr>
+            <a:spLocks noGrp="1"/>
+          </p:cNvSpPr>
+          <p:nvPr>
+            <p:ph type="ftr" sz="quarter" idx="10"/>
+          </p:nvPr>
+        </p:nvSpPr>
+        <p:spPr/>
+        <p:txBody>
+          <a:bodyPr/>
+          <a:lstStyle/>
+          <a:p>
+            <a:fld id="{EB53C135-CEC6-A548-8917-8F7FEB82358B}" type="slidenum">
+              <a:rPr lang="en-US" smtClean="0"/>
+              <a:pPr/>
+              <a:t>20</a:t>
+            </a:fld>
+            <a:endParaRPr lang="en-US" dirty="0"/>
+          </a:p>
+        </p:txBody>
+      </p:sp>
+      <p:pic>
+        <p:nvPicPr>
+          <p:cNvPr id="8" name="Picture 7">
+            <a:extLst>
+              <a:ext uri="{FF2B5EF4-FFF2-40B4-BE49-F238E27FC236}">
+                <a16:creationId xmlns:a16="http://schemas.microsoft.com/office/drawing/2014/main" id="{4B61ACA2-7965-DFD0-1D14-4757734C4435}"/>
+              </a:ext>
+            </a:extLst>
+          </p:cNvPr>
+          <p:cNvPicPr>
+            <a:picLocks noChangeAspect="1"/>
+          </p:cNvPicPr>
+          <p:nvPr/>
+        </p:nvPicPr>
+        <p:blipFill>
+          <a:blip r:embed="rId3">
+            <a:extLst>
+              <a:ext uri="{28A0092B-C50C-407E-A947-70E740481C1C}">
+                <a14:useLocalDpi xmlns:a14="http://schemas.microsoft.com/office/drawing/2010/main" val="0"/>
+              </a:ext>
+            </a:extLst>
+          </a:blip>
+          <a:stretch>
+            <a:fillRect/>
+          </a:stretch>
+        </p:blipFill>
+        <p:spPr>
+          <a:xfrm>
+            <a:off x="5569625" y="2152621"/>
+            <a:ext cx="5096586" cy="3801005"/>
+          </a:xfrm>
+          <a:prstGeom prst="rect">
+            <a:avLst/>
+          </a:prstGeom>
+        </p:spPr>
+      </p:pic>
+    </p:spTree>
+    <p:extLst>
+      <p:ext uri="{BB962C8B-B14F-4D97-AF65-F5344CB8AC3E}">
+        <p14:creationId xmlns:p14="http://schemas.microsoft.com/office/powerpoint/2010/main" val="3278904843"/>
+      </p:ext>
+    </p:extLst>
+  </p:cSld>
+  <p:clrMapOvr>
+    <a:masterClrMapping/>
+  </p:clrMapOvr>
+</p:sld>
+</file>
+
+<file path=ppt/slides/slide21.xml><?xml version="1.0" encoding="utf-8"?>
+<p:sld xmlns:a="http://schemas.openxmlformats.org/drawingml/2006/main" xmlns:r="http://schemas.openxmlformats.org/officeDocument/2006/relationships" xmlns:p="http://schemas.openxmlformats.org/presentationml/2006/main">
+  <p:cSld>
+    <p:spTree>
+      <p:nvGrpSpPr>
+        <p:cNvPr id="1" name="">
+          <a:extLst>
+            <a:ext uri="{FF2B5EF4-FFF2-40B4-BE49-F238E27FC236}">
+              <a16:creationId xmlns:a16="http://schemas.microsoft.com/office/drawing/2014/main" id="{E25B2717-4019-2363-FF13-5F30EEACAAA7}"/>
+            </a:ext>
+          </a:extLst>
+        </p:cNvPr>
+        <p:cNvGrpSpPr/>
+        <p:nvPr/>
+      </p:nvGrpSpPr>
+      <p:grpSpPr>
+        <a:xfrm>
+          <a:off x="0" y="0"/>
+          <a:ext cx="0" cy="0"/>
+          <a:chOff x="0" y="0"/>
+          <a:chExt cx="0" cy="0"/>
+        </a:xfrm>
+      </p:grpSpPr>
+      <p:sp>
+        <p:nvSpPr>
+          <p:cNvPr id="2" name="Title 1">
+            <a:extLst>
+              <a:ext uri="{FF2B5EF4-FFF2-40B4-BE49-F238E27FC236}">
+                <a16:creationId xmlns:a16="http://schemas.microsoft.com/office/drawing/2014/main" id="{6AE29A9B-D3AE-1B5B-B27E-B418CCE91CD5}"/>
+              </a:ext>
+            </a:extLst>
+          </p:cNvPr>
+          <p:cNvSpPr>
+            <a:spLocks noGrp="1"/>
+          </p:cNvSpPr>
+          <p:nvPr>
+            <p:ph type="title"/>
+          </p:nvPr>
+        </p:nvSpPr>
+        <p:spPr>
+          <a:xfrm>
+            <a:off x="566928" y="1001018"/>
+            <a:ext cx="8409548" cy="1089529"/>
+          </a:xfrm>
+        </p:spPr>
+        <p:txBody>
+          <a:bodyPr/>
+          <a:lstStyle/>
+          <a:p>
+            <a:r>
+              <a:rPr lang="en-US" dirty="0"/>
+              <a:t>Lunar Lander: Dueling DQN (Training)</a:t>
+            </a:r>
+          </a:p>
+        </p:txBody>
+      </p:sp>
+      <p:pic>
+        <p:nvPicPr>
+          <p:cNvPr id="6" name="Content Placeholder 5">
+            <a:extLst>
+              <a:ext uri="{FF2B5EF4-FFF2-40B4-BE49-F238E27FC236}">
+                <a16:creationId xmlns:a16="http://schemas.microsoft.com/office/drawing/2014/main" id="{7389EF9E-57D9-E7EE-A60E-8CFD0E45291F}"/>
+              </a:ext>
+            </a:extLst>
+          </p:cNvPr>
+          <p:cNvPicPr>
+            <a:picLocks noGrp="1" noChangeAspect="1"/>
+          </p:cNvPicPr>
+          <p:nvPr>
+            <p:ph idx="1"/>
+          </p:nvPr>
+        </p:nvPicPr>
+        <p:blipFill>
+          <a:blip r:embed="rId2">
+            <a:extLst>
+              <a:ext uri="{28A0092B-C50C-407E-A947-70E740481C1C}">
+                <a14:useLocalDpi xmlns:a14="http://schemas.microsoft.com/office/drawing/2010/main" val="0"/>
+              </a:ext>
+            </a:extLst>
+          </a:blip>
+          <a:stretch>
+            <a:fillRect/>
+          </a:stretch>
+        </p:blipFill>
+        <p:spPr>
+          <a:xfrm>
+            <a:off x="566928" y="2230061"/>
+            <a:ext cx="5039428" cy="3753374"/>
+          </a:xfrm>
+        </p:spPr>
+      </p:pic>
+      <p:sp>
+        <p:nvSpPr>
+          <p:cNvPr id="4" name="Footer Placeholder 3">
+            <a:extLst>
+              <a:ext uri="{FF2B5EF4-FFF2-40B4-BE49-F238E27FC236}">
+                <a16:creationId xmlns:a16="http://schemas.microsoft.com/office/drawing/2014/main" id="{1968909C-6367-4216-C46F-61ADC10026A6}"/>
+              </a:ext>
+            </a:extLst>
+          </p:cNvPr>
+          <p:cNvSpPr>
+            <a:spLocks noGrp="1"/>
+          </p:cNvSpPr>
+          <p:nvPr>
+            <p:ph type="ftr" sz="quarter" idx="10"/>
+          </p:nvPr>
+        </p:nvSpPr>
+        <p:spPr/>
+        <p:txBody>
+          <a:bodyPr/>
+          <a:lstStyle/>
+          <a:p>
+            <a:fld id="{EB53C135-CEC6-A548-8917-8F7FEB82358B}" type="slidenum">
+              <a:rPr lang="en-US" smtClean="0"/>
+              <a:pPr/>
+              <a:t>21</a:t>
+            </a:fld>
+            <a:endParaRPr lang="en-US" dirty="0"/>
+          </a:p>
+        </p:txBody>
+      </p:sp>
+      <p:pic>
+        <p:nvPicPr>
+          <p:cNvPr id="8" name="Picture 7">
+            <a:extLst>
+              <a:ext uri="{FF2B5EF4-FFF2-40B4-BE49-F238E27FC236}">
+                <a16:creationId xmlns:a16="http://schemas.microsoft.com/office/drawing/2014/main" id="{49AB77F9-5087-D06C-5420-CD1C9E3CAEE9}"/>
+              </a:ext>
+            </a:extLst>
+          </p:cNvPr>
+          <p:cNvPicPr>
+            <a:picLocks noChangeAspect="1"/>
+          </p:cNvPicPr>
+          <p:nvPr/>
+        </p:nvPicPr>
+        <p:blipFill>
+          <a:blip r:embed="rId3">
+            <a:extLst>
+              <a:ext uri="{28A0092B-C50C-407E-A947-70E740481C1C}">
+                <a14:useLocalDpi xmlns:a14="http://schemas.microsoft.com/office/drawing/2010/main" val="0"/>
+              </a:ext>
+            </a:extLst>
+          </a:blip>
+          <a:stretch>
+            <a:fillRect/>
+          </a:stretch>
+        </p:blipFill>
+        <p:spPr>
+          <a:xfrm>
+            <a:off x="5794386" y="2230061"/>
+            <a:ext cx="4867954" cy="3753374"/>
+          </a:xfrm>
+          <a:prstGeom prst="rect">
+            <a:avLst/>
+          </a:prstGeom>
+        </p:spPr>
+      </p:pic>
+    </p:spTree>
+    <p:extLst>
+      <p:ext uri="{BB962C8B-B14F-4D97-AF65-F5344CB8AC3E}">
+        <p14:creationId xmlns:p14="http://schemas.microsoft.com/office/powerpoint/2010/main" val="643904891"/>
+      </p:ext>
+    </p:extLst>
+  </p:cSld>
+  <p:clrMapOvr>
+    <a:masterClrMapping/>
+  </p:clrMapOvr>
+</p:sld>
+</file>
+
+<file path=ppt/slides/slide22.xml><?xml version="1.0" encoding="utf-8"?>
+<p:sld xmlns:a="http://schemas.openxmlformats.org/drawingml/2006/main" xmlns:r="http://schemas.openxmlformats.org/officeDocument/2006/relationships" xmlns:p="http://schemas.openxmlformats.org/presentationml/2006/main">
+  <p:cSld>
+    <p:spTree>
+      <p:nvGrpSpPr>
+        <p:cNvPr id="1" name="">
+          <a:extLst>
+            <a:ext uri="{FF2B5EF4-FFF2-40B4-BE49-F238E27FC236}">
+              <a16:creationId xmlns:a16="http://schemas.microsoft.com/office/drawing/2014/main" id="{ACF4D60C-5F1F-F37E-7C29-15F966500D06}"/>
+            </a:ext>
+          </a:extLst>
+        </p:cNvPr>
+        <p:cNvGrpSpPr/>
+        <p:nvPr/>
+      </p:nvGrpSpPr>
+      <p:grpSpPr>
+        <a:xfrm>
+          <a:off x="0" y="0"/>
+          <a:ext cx="0" cy="0"/>
+          <a:chOff x="0" y="0"/>
+          <a:chExt cx="0" cy="0"/>
+        </a:xfrm>
+      </p:grpSpPr>
+      <p:sp>
+        <p:nvSpPr>
+          <p:cNvPr id="2" name="Title 1">
+            <a:extLst>
+              <a:ext uri="{FF2B5EF4-FFF2-40B4-BE49-F238E27FC236}">
+                <a16:creationId xmlns:a16="http://schemas.microsoft.com/office/drawing/2014/main" id="{7BDA0077-5261-3DE6-5900-CFE017841430}"/>
+              </a:ext>
+            </a:extLst>
+          </p:cNvPr>
+          <p:cNvSpPr>
+            <a:spLocks noGrp="1"/>
+          </p:cNvSpPr>
+          <p:nvPr>
+            <p:ph type="title"/>
+          </p:nvPr>
+        </p:nvSpPr>
+        <p:spPr>
+          <a:xfrm>
+            <a:off x="566927" y="1001018"/>
+            <a:ext cx="9533353" cy="1089529"/>
+          </a:xfrm>
+        </p:spPr>
+        <p:txBody>
+          <a:bodyPr/>
+          <a:lstStyle/>
+          <a:p>
+            <a:r>
+              <a:rPr lang="en-US" dirty="0"/>
+              <a:t>Lunar Lander: Dueling DQN (Evaluation)</a:t>
+            </a:r>
+          </a:p>
+        </p:txBody>
+      </p:sp>
+      <p:pic>
+        <p:nvPicPr>
+          <p:cNvPr id="6" name="Content Placeholder 5">
+            <a:extLst>
+              <a:ext uri="{FF2B5EF4-FFF2-40B4-BE49-F238E27FC236}">
+                <a16:creationId xmlns:a16="http://schemas.microsoft.com/office/drawing/2014/main" id="{CE87999B-091D-57E2-168D-E1E91C5DDEFB}"/>
+              </a:ext>
+            </a:extLst>
+          </p:cNvPr>
+          <p:cNvPicPr>
+            <a:picLocks noGrp="1" noChangeAspect="1"/>
+          </p:cNvPicPr>
+          <p:nvPr>
+            <p:ph idx="1"/>
+          </p:nvPr>
+        </p:nvPicPr>
+        <p:blipFill>
+          <a:blip r:embed="rId2">
+            <a:extLst>
+              <a:ext uri="{28A0092B-C50C-407E-A947-70E740481C1C}">
+                <a14:useLocalDpi xmlns:a14="http://schemas.microsoft.com/office/drawing/2010/main" val="0"/>
+              </a:ext>
+            </a:extLst>
+          </a:blip>
+          <a:stretch>
+            <a:fillRect/>
+          </a:stretch>
+        </p:blipFill>
+        <p:spPr>
+          <a:xfrm>
+            <a:off x="566927" y="2225626"/>
+            <a:ext cx="4867954" cy="3734321"/>
+          </a:xfrm>
+        </p:spPr>
+      </p:pic>
+      <p:sp>
+        <p:nvSpPr>
+          <p:cNvPr id="4" name="Footer Placeholder 3">
+            <a:extLst>
+              <a:ext uri="{FF2B5EF4-FFF2-40B4-BE49-F238E27FC236}">
+                <a16:creationId xmlns:a16="http://schemas.microsoft.com/office/drawing/2014/main" id="{3642B120-AC21-FCDE-0A71-737C39F62CA6}"/>
+              </a:ext>
+            </a:extLst>
+          </p:cNvPr>
+          <p:cNvSpPr>
+            <a:spLocks noGrp="1"/>
+          </p:cNvSpPr>
+          <p:nvPr>
+            <p:ph type="ftr" sz="quarter" idx="10"/>
+          </p:nvPr>
+        </p:nvSpPr>
+        <p:spPr/>
+        <p:txBody>
+          <a:bodyPr/>
+          <a:lstStyle/>
+          <a:p>
+            <a:fld id="{EB53C135-CEC6-A548-8917-8F7FEB82358B}" type="slidenum">
+              <a:rPr lang="en-US" smtClean="0"/>
+              <a:pPr/>
+              <a:t>22</a:t>
+            </a:fld>
+            <a:endParaRPr lang="en-US" dirty="0"/>
+          </a:p>
+        </p:txBody>
+      </p:sp>
+      <p:pic>
+        <p:nvPicPr>
+          <p:cNvPr id="8" name="Picture 7">
+            <a:extLst>
+              <a:ext uri="{FF2B5EF4-FFF2-40B4-BE49-F238E27FC236}">
+                <a16:creationId xmlns:a16="http://schemas.microsoft.com/office/drawing/2014/main" id="{32E8BAF8-066E-B412-0504-F84049A7E208}"/>
+              </a:ext>
+            </a:extLst>
+          </p:cNvPr>
+          <p:cNvPicPr>
+            <a:picLocks noChangeAspect="1"/>
+          </p:cNvPicPr>
+          <p:nvPr/>
+        </p:nvPicPr>
+        <p:blipFill>
+          <a:blip r:embed="rId3">
+            <a:extLst>
+              <a:ext uri="{28A0092B-C50C-407E-A947-70E740481C1C}">
+                <a14:useLocalDpi xmlns:a14="http://schemas.microsoft.com/office/drawing/2010/main" val="0"/>
+              </a:ext>
+            </a:extLst>
+          </a:blip>
+          <a:stretch>
+            <a:fillRect/>
+          </a:stretch>
+        </p:blipFill>
+        <p:spPr>
+          <a:xfrm>
+            <a:off x="5666846" y="2177994"/>
+            <a:ext cx="4982270" cy="3781953"/>
+          </a:xfrm>
+          <a:prstGeom prst="rect">
+            <a:avLst/>
+          </a:prstGeom>
+        </p:spPr>
+      </p:pic>
+    </p:spTree>
+    <p:extLst>
+      <p:ext uri="{BB962C8B-B14F-4D97-AF65-F5344CB8AC3E}">
+        <p14:creationId xmlns:p14="http://schemas.microsoft.com/office/powerpoint/2010/main" val="4071645767"/>
+      </p:ext>
+    </p:extLst>
+  </p:cSld>
+  <p:clrMapOvr>
+    <a:masterClrMapping/>
+  </p:clrMapOvr>
+</p:sld>
+</file>
+
+<file path=ppt/slides/slide23.xml><?xml version="1.0" encoding="utf-8"?>
+<p:sld xmlns:a="http://schemas.openxmlformats.org/drawingml/2006/main" xmlns:r="http://schemas.openxmlformats.org/officeDocument/2006/relationships" xmlns:p="http://schemas.openxmlformats.org/presentationml/2006/main">
+  <p:cSld>
+    <p:spTree>
+      <p:nvGrpSpPr>
+        <p:cNvPr id="1" name="">
+          <a:extLst>
+            <a:ext uri="{FF2B5EF4-FFF2-40B4-BE49-F238E27FC236}">
+              <a16:creationId xmlns:a16="http://schemas.microsoft.com/office/drawing/2014/main" id="{576718EF-F293-B67E-73BA-475DDA0B114B}"/>
+            </a:ext>
+          </a:extLst>
+        </p:cNvPr>
+        <p:cNvGrpSpPr/>
+        <p:nvPr/>
+      </p:nvGrpSpPr>
+      <p:grpSpPr>
+        <a:xfrm>
+          <a:off x="0" y="0"/>
+          <a:ext cx="0" cy="0"/>
+          <a:chOff x="0" y="0"/>
+          <a:chExt cx="0" cy="0"/>
+        </a:xfrm>
+      </p:grpSpPr>
+      <p:sp>
+        <p:nvSpPr>
+          <p:cNvPr id="2" name="Title 1">
+            <a:extLst>
+              <a:ext uri="{FF2B5EF4-FFF2-40B4-BE49-F238E27FC236}">
+                <a16:creationId xmlns:a16="http://schemas.microsoft.com/office/drawing/2014/main" id="{B88E909B-0D60-A8FD-109E-DC46830A9FD9}"/>
+              </a:ext>
+            </a:extLst>
+          </p:cNvPr>
+          <p:cNvSpPr>
+            <a:spLocks noGrp="1"/>
+          </p:cNvSpPr>
+          <p:nvPr>
+            <p:ph type="title"/>
+          </p:nvPr>
+        </p:nvSpPr>
+        <p:spPr>
+          <a:xfrm>
+            <a:off x="566928" y="1001018"/>
+            <a:ext cx="8402568" cy="1089529"/>
+          </a:xfrm>
+        </p:spPr>
+        <p:txBody>
+          <a:bodyPr/>
+          <a:lstStyle/>
+          <a:p>
+            <a:r>
+              <a:rPr lang="en-US" dirty="0"/>
+              <a:t>Lunar Lander: Rainbow DQN (Training)</a:t>
+            </a:r>
+          </a:p>
+        </p:txBody>
+      </p:sp>
+      <p:pic>
+        <p:nvPicPr>
+          <p:cNvPr id="6" name="Content Placeholder 5">
+            <a:extLst>
+              <a:ext uri="{FF2B5EF4-FFF2-40B4-BE49-F238E27FC236}">
+                <a16:creationId xmlns:a16="http://schemas.microsoft.com/office/drawing/2014/main" id="{744A46C9-CE48-193A-F930-AA0E5E41B58B}"/>
+              </a:ext>
+            </a:extLst>
+          </p:cNvPr>
+          <p:cNvPicPr>
+            <a:picLocks noGrp="1" noChangeAspect="1"/>
+          </p:cNvPicPr>
+          <p:nvPr>
+            <p:ph idx="1"/>
+          </p:nvPr>
+        </p:nvPicPr>
+        <p:blipFill>
+          <a:blip r:embed="rId2">
+            <a:extLst>
+              <a:ext uri="{28A0092B-C50C-407E-A947-70E740481C1C}">
+                <a14:useLocalDpi xmlns:a14="http://schemas.microsoft.com/office/drawing/2010/main" val="0"/>
+              </a:ext>
+            </a:extLst>
+          </a:blip>
+          <a:stretch>
+            <a:fillRect/>
+          </a:stretch>
+        </p:blipFill>
+        <p:spPr>
+          <a:xfrm>
+            <a:off x="566928" y="2138179"/>
+            <a:ext cx="5039428" cy="3772426"/>
+          </a:xfrm>
+        </p:spPr>
+      </p:pic>
+      <p:sp>
+        <p:nvSpPr>
+          <p:cNvPr id="4" name="Footer Placeholder 3">
+            <a:extLst>
+              <a:ext uri="{FF2B5EF4-FFF2-40B4-BE49-F238E27FC236}">
+                <a16:creationId xmlns:a16="http://schemas.microsoft.com/office/drawing/2014/main" id="{B78476BF-F81F-2483-2378-E51A8739F1D9}"/>
+              </a:ext>
+            </a:extLst>
+          </p:cNvPr>
+          <p:cNvSpPr>
+            <a:spLocks noGrp="1"/>
+          </p:cNvSpPr>
+          <p:nvPr>
+            <p:ph type="ftr" sz="quarter" idx="10"/>
+          </p:nvPr>
+        </p:nvSpPr>
+        <p:spPr/>
+        <p:txBody>
+          <a:bodyPr/>
+          <a:lstStyle/>
+          <a:p>
+            <a:fld id="{EB53C135-CEC6-A548-8917-8F7FEB82358B}" type="slidenum">
+              <a:rPr lang="en-US" smtClean="0"/>
+              <a:pPr/>
+              <a:t>23</a:t>
+            </a:fld>
+            <a:endParaRPr lang="en-US" dirty="0"/>
+          </a:p>
+        </p:txBody>
+      </p:sp>
+      <p:pic>
+        <p:nvPicPr>
+          <p:cNvPr id="8" name="Picture 7">
+            <a:extLst>
+              <a:ext uri="{FF2B5EF4-FFF2-40B4-BE49-F238E27FC236}">
+                <a16:creationId xmlns:a16="http://schemas.microsoft.com/office/drawing/2014/main" id="{09B1AFFB-F987-28CB-7638-5B45E6A313D4}"/>
+              </a:ext>
+            </a:extLst>
+          </p:cNvPr>
+          <p:cNvPicPr>
+            <a:picLocks noChangeAspect="1"/>
+          </p:cNvPicPr>
+          <p:nvPr/>
+        </p:nvPicPr>
+        <p:blipFill>
+          <a:blip r:embed="rId3">
+            <a:extLst>
+              <a:ext uri="{28A0092B-C50C-407E-A947-70E740481C1C}">
+                <a14:useLocalDpi xmlns:a14="http://schemas.microsoft.com/office/drawing/2010/main" val="0"/>
+              </a:ext>
+            </a:extLst>
+          </a:blip>
+          <a:stretch>
+            <a:fillRect/>
+          </a:stretch>
+        </p:blipFill>
+        <p:spPr>
+          <a:xfrm>
+            <a:off x="5862300" y="2090547"/>
+            <a:ext cx="4829849" cy="3867690"/>
+          </a:xfrm>
+          <a:prstGeom prst="rect">
+            <a:avLst/>
+          </a:prstGeom>
+        </p:spPr>
+      </p:pic>
+    </p:spTree>
+    <p:extLst>
+      <p:ext uri="{BB962C8B-B14F-4D97-AF65-F5344CB8AC3E}">
+        <p14:creationId xmlns:p14="http://schemas.microsoft.com/office/powerpoint/2010/main" val="864535051"/>
+      </p:ext>
+    </p:extLst>
+  </p:cSld>
+  <p:clrMapOvr>
+    <a:masterClrMapping/>
+  </p:clrMapOvr>
+</p:sld>
+</file>
+
+<file path=ppt/slides/slide24.xml><?xml version="1.0" encoding="utf-8"?>
+<p:sld xmlns:a="http://schemas.openxmlformats.org/drawingml/2006/main" xmlns:r="http://schemas.openxmlformats.org/officeDocument/2006/relationships" xmlns:p="http://schemas.openxmlformats.org/presentationml/2006/main">
+  <p:cSld>
+    <p:spTree>
+      <p:nvGrpSpPr>
+        <p:cNvPr id="1" name="">
+          <a:extLst>
+            <a:ext uri="{FF2B5EF4-FFF2-40B4-BE49-F238E27FC236}">
+              <a16:creationId xmlns:a16="http://schemas.microsoft.com/office/drawing/2014/main" id="{8B44AB73-2D81-8050-69F6-E64B4B2A2844}"/>
+            </a:ext>
+          </a:extLst>
+        </p:cNvPr>
+        <p:cNvGrpSpPr/>
+        <p:nvPr/>
+      </p:nvGrpSpPr>
+      <p:grpSpPr>
+        <a:xfrm>
+          <a:off x="0" y="0"/>
+          <a:ext cx="0" cy="0"/>
+          <a:chOff x="0" y="0"/>
+          <a:chExt cx="0" cy="0"/>
+        </a:xfrm>
+      </p:grpSpPr>
+      <p:sp>
+        <p:nvSpPr>
+          <p:cNvPr id="2" name="Title 1">
+            <a:extLst>
+              <a:ext uri="{FF2B5EF4-FFF2-40B4-BE49-F238E27FC236}">
+                <a16:creationId xmlns:a16="http://schemas.microsoft.com/office/drawing/2014/main" id="{7726C861-62FB-CA2B-4EBD-ED860D09117D}"/>
+              </a:ext>
+            </a:extLst>
+          </p:cNvPr>
+          <p:cNvSpPr>
+            <a:spLocks noGrp="1"/>
+          </p:cNvSpPr>
+          <p:nvPr>
+            <p:ph type="title"/>
+          </p:nvPr>
+        </p:nvSpPr>
+        <p:spPr>
+          <a:xfrm>
+            <a:off x="566927" y="1001018"/>
+            <a:ext cx="9344889" cy="1089529"/>
+          </a:xfrm>
+        </p:spPr>
+        <p:txBody>
+          <a:bodyPr/>
+          <a:lstStyle/>
+          <a:p>
+            <a:r>
+              <a:rPr lang="en-US" dirty="0"/>
+              <a:t>Lunar Lander: Rainbow DQN (Evaluation)</a:t>
+            </a:r>
+          </a:p>
+        </p:txBody>
+      </p:sp>
+      <p:pic>
+        <p:nvPicPr>
+          <p:cNvPr id="6" name="Content Placeholder 5">
+            <a:extLst>
+              <a:ext uri="{FF2B5EF4-FFF2-40B4-BE49-F238E27FC236}">
+                <a16:creationId xmlns:a16="http://schemas.microsoft.com/office/drawing/2014/main" id="{9A4020E9-9CE0-5237-2255-DB8CB0834800}"/>
+              </a:ext>
+            </a:extLst>
+          </p:cNvPr>
+          <p:cNvPicPr>
+            <a:picLocks noGrp="1" noChangeAspect="1"/>
+          </p:cNvPicPr>
+          <p:nvPr>
+            <p:ph idx="1"/>
+          </p:nvPr>
+        </p:nvPicPr>
+        <p:blipFill>
+          <a:blip r:embed="rId2">
+            <a:extLst>
+              <a:ext uri="{28A0092B-C50C-407E-A947-70E740481C1C}">
+                <a14:useLocalDpi xmlns:a14="http://schemas.microsoft.com/office/drawing/2010/main" val="0"/>
+              </a:ext>
+            </a:extLst>
+          </a:blip>
+          <a:stretch>
+            <a:fillRect/>
+          </a:stretch>
+        </p:blipFill>
+        <p:spPr>
+          <a:xfrm>
+            <a:off x="566927" y="2157713"/>
+            <a:ext cx="4963218" cy="3772426"/>
+          </a:xfrm>
+        </p:spPr>
+      </p:pic>
+      <p:sp>
+        <p:nvSpPr>
+          <p:cNvPr id="4" name="Footer Placeholder 3">
+            <a:extLst>
+              <a:ext uri="{FF2B5EF4-FFF2-40B4-BE49-F238E27FC236}">
+                <a16:creationId xmlns:a16="http://schemas.microsoft.com/office/drawing/2014/main" id="{A894F488-3750-85C9-9AA6-076FA47918C7}"/>
+              </a:ext>
+            </a:extLst>
+          </p:cNvPr>
+          <p:cNvSpPr>
+            <a:spLocks noGrp="1"/>
+          </p:cNvSpPr>
+          <p:nvPr>
+            <p:ph type="ftr" sz="quarter" idx="10"/>
+          </p:nvPr>
+        </p:nvSpPr>
+        <p:spPr/>
+        <p:txBody>
+          <a:bodyPr/>
+          <a:lstStyle/>
+          <a:p>
+            <a:fld id="{EB53C135-CEC6-A548-8917-8F7FEB82358B}" type="slidenum">
+              <a:rPr lang="en-US" smtClean="0"/>
+              <a:pPr/>
+              <a:t>24</a:t>
+            </a:fld>
+            <a:endParaRPr lang="en-US" dirty="0"/>
+          </a:p>
+        </p:txBody>
+      </p:sp>
+      <p:pic>
+        <p:nvPicPr>
+          <p:cNvPr id="8" name="Picture 7">
+            <a:extLst>
+              <a:ext uri="{FF2B5EF4-FFF2-40B4-BE49-F238E27FC236}">
+                <a16:creationId xmlns:a16="http://schemas.microsoft.com/office/drawing/2014/main" id="{B8AE6B44-BF77-2DF7-E20C-47F2987D1A92}"/>
+              </a:ext>
+            </a:extLst>
+          </p:cNvPr>
+          <p:cNvPicPr>
+            <a:picLocks noChangeAspect="1"/>
+          </p:cNvPicPr>
+          <p:nvPr/>
+        </p:nvPicPr>
+        <p:blipFill>
+          <a:blip r:embed="rId3">
+            <a:extLst>
+              <a:ext uri="{28A0092B-C50C-407E-A947-70E740481C1C}">
+                <a14:useLocalDpi xmlns:a14="http://schemas.microsoft.com/office/drawing/2010/main" val="0"/>
+              </a:ext>
+            </a:extLst>
+          </a:blip>
+          <a:stretch>
+            <a:fillRect/>
+          </a:stretch>
+        </p:blipFill>
+        <p:spPr>
+          <a:xfrm>
+            <a:off x="5599947" y="2210259"/>
+            <a:ext cx="5058481" cy="3801005"/>
+          </a:xfrm>
+          <a:prstGeom prst="rect">
+            <a:avLst/>
+          </a:prstGeom>
+        </p:spPr>
+      </p:pic>
+    </p:spTree>
+    <p:extLst>
+      <p:ext uri="{BB962C8B-B14F-4D97-AF65-F5344CB8AC3E}">
+        <p14:creationId xmlns:p14="http://schemas.microsoft.com/office/powerpoint/2010/main" val="1283808657"/>
+      </p:ext>
+    </p:extLst>
+  </p:cSld>
+  <p:clrMapOvr>
+    <a:masterClrMapping/>
+  </p:clrMapOvr>
+</p:sld>
+</file>
+
+<file path=ppt/slides/slide25.xml><?xml version="1.0" encoding="utf-8"?>
+<p:sld xmlns:a="http://schemas.openxmlformats.org/drawingml/2006/main" xmlns:r="http://schemas.openxmlformats.org/officeDocument/2006/relationships" xmlns:p="http://schemas.openxmlformats.org/presentationml/2006/main">
+  <p:cSld>
+    <p:spTree>
+      <p:nvGrpSpPr>
+        <p:cNvPr id="1" name="">
+          <a:extLst>
+            <a:ext uri="{FF2B5EF4-FFF2-40B4-BE49-F238E27FC236}">
+              <a16:creationId xmlns:a16="http://schemas.microsoft.com/office/drawing/2014/main" id="{94C29A4D-E284-2025-D7A0-178E3FFAC9BE}"/>
+            </a:ext>
+          </a:extLst>
+        </p:cNvPr>
+        <p:cNvGrpSpPr/>
+        <p:nvPr/>
+      </p:nvGrpSpPr>
+      <p:grpSpPr>
+        <a:xfrm>
+          <a:off x="0" y="0"/>
+          <a:ext cx="0" cy="0"/>
+          <a:chOff x="0" y="0"/>
+          <a:chExt cx="0" cy="0"/>
+        </a:xfrm>
+      </p:grpSpPr>
+      <p:sp>
+        <p:nvSpPr>
+          <p:cNvPr id="2" name="Title 1">
+            <a:extLst>
+              <a:ext uri="{FF2B5EF4-FFF2-40B4-BE49-F238E27FC236}">
+                <a16:creationId xmlns:a16="http://schemas.microsoft.com/office/drawing/2014/main" id="{E92BCC4D-7227-3F81-BF01-3D884EC2D00C}"/>
+              </a:ext>
+            </a:extLst>
+          </p:cNvPr>
+          <p:cNvSpPr>
+            <a:spLocks noGrp="1"/>
+          </p:cNvSpPr>
+          <p:nvPr>
+            <p:ph type="title"/>
+          </p:nvPr>
+        </p:nvSpPr>
+        <p:spPr/>
+        <p:txBody>
+          <a:bodyPr/>
+          <a:lstStyle/>
+          <a:p>
+            <a:r>
+              <a:rPr lang="en-US" dirty="0"/>
+              <a:t>Lunar Lander: PPO (Training)</a:t>
+            </a:r>
+          </a:p>
+        </p:txBody>
+      </p:sp>
+      <p:pic>
+        <p:nvPicPr>
+          <p:cNvPr id="7" name="Content Placeholder 6">
+            <a:extLst>
+              <a:ext uri="{FF2B5EF4-FFF2-40B4-BE49-F238E27FC236}">
+                <a16:creationId xmlns:a16="http://schemas.microsoft.com/office/drawing/2014/main" id="{FF8940AA-CFE3-1A61-34AC-6227F329C8AE}"/>
+              </a:ext>
+            </a:extLst>
+          </p:cNvPr>
+          <p:cNvPicPr>
+            <a:picLocks noGrp="1" noChangeAspect="1"/>
+          </p:cNvPicPr>
+          <p:nvPr>
+            <p:ph idx="1"/>
+          </p:nvPr>
+        </p:nvPicPr>
+        <p:blipFill>
+          <a:blip r:embed="rId2">
+            <a:extLst>
+              <a:ext uri="{28A0092B-C50C-407E-A947-70E740481C1C}">
+                <a14:useLocalDpi xmlns:a14="http://schemas.microsoft.com/office/drawing/2010/main" val="0"/>
+              </a:ext>
+            </a:extLst>
+          </a:blip>
+          <a:stretch>
+            <a:fillRect/>
+          </a:stretch>
+        </p:blipFill>
+        <p:spPr>
+          <a:xfrm>
+            <a:off x="566928" y="2174220"/>
+            <a:ext cx="5191850" cy="3753374"/>
+          </a:xfrm>
+        </p:spPr>
+      </p:pic>
+      <p:sp>
+        <p:nvSpPr>
+          <p:cNvPr id="4" name="Footer Placeholder 3">
+            <a:extLst>
+              <a:ext uri="{FF2B5EF4-FFF2-40B4-BE49-F238E27FC236}">
+                <a16:creationId xmlns:a16="http://schemas.microsoft.com/office/drawing/2014/main" id="{FF8F2144-8651-8D21-787F-26B6B8202858}"/>
+              </a:ext>
+            </a:extLst>
+          </p:cNvPr>
+          <p:cNvSpPr>
+            <a:spLocks noGrp="1"/>
+          </p:cNvSpPr>
+          <p:nvPr>
+            <p:ph type="ftr" sz="quarter" idx="10"/>
+          </p:nvPr>
+        </p:nvSpPr>
+        <p:spPr/>
+        <p:txBody>
+          <a:bodyPr/>
+          <a:lstStyle/>
+          <a:p>
+            <a:fld id="{EB53C135-CEC6-A548-8917-8F7FEB82358B}" type="slidenum">
+              <a:rPr lang="en-US" smtClean="0"/>
+              <a:pPr/>
+              <a:t>25</a:t>
+            </a:fld>
+            <a:endParaRPr lang="en-US" dirty="0"/>
+          </a:p>
+        </p:txBody>
+      </p:sp>
+      <p:pic>
+        <p:nvPicPr>
+          <p:cNvPr id="10" name="Picture 9">
+            <a:extLst>
+              <a:ext uri="{FF2B5EF4-FFF2-40B4-BE49-F238E27FC236}">
+                <a16:creationId xmlns:a16="http://schemas.microsoft.com/office/drawing/2014/main" id="{E825C59B-38B9-5440-6C89-B4C8AEC1DB67}"/>
+              </a:ext>
+            </a:extLst>
+          </p:cNvPr>
+          <p:cNvPicPr>
+            <a:picLocks noChangeAspect="1"/>
+          </p:cNvPicPr>
+          <p:nvPr/>
+        </p:nvPicPr>
+        <p:blipFill>
+          <a:blip r:embed="rId3">
+            <a:extLst>
+              <a:ext uri="{28A0092B-C50C-407E-A947-70E740481C1C}">
+                <a14:useLocalDpi xmlns:a14="http://schemas.microsoft.com/office/drawing/2010/main" val="0"/>
+              </a:ext>
+            </a:extLst>
+          </a:blip>
+          <a:stretch>
+            <a:fillRect/>
+          </a:stretch>
+        </p:blipFill>
+        <p:spPr>
+          <a:xfrm>
+            <a:off x="5758778" y="2141064"/>
+            <a:ext cx="4953691" cy="3753374"/>
+          </a:xfrm>
+          <a:prstGeom prst="rect">
+            <a:avLst/>
+          </a:prstGeom>
+        </p:spPr>
+      </p:pic>
+    </p:spTree>
+    <p:extLst>
+      <p:ext uri="{BB962C8B-B14F-4D97-AF65-F5344CB8AC3E}">
+        <p14:creationId xmlns:p14="http://schemas.microsoft.com/office/powerpoint/2010/main" val="4020020268"/>
+      </p:ext>
+    </p:extLst>
+  </p:cSld>
+  <p:clrMapOvr>
+    <a:masterClrMapping/>
+  </p:clrMapOvr>
+</p:sld>
+</file>
+
+<file path=ppt/slides/slide26.xml><?xml version="1.0" encoding="utf-8"?>
+<p:sld xmlns:a="http://schemas.openxmlformats.org/drawingml/2006/main" xmlns:r="http://schemas.openxmlformats.org/officeDocument/2006/relationships" xmlns:p="http://schemas.openxmlformats.org/presentationml/2006/main">
+  <p:cSld>
+    <p:spTree>
+      <p:nvGrpSpPr>
+        <p:cNvPr id="1" name="">
+          <a:extLst>
+            <a:ext uri="{FF2B5EF4-FFF2-40B4-BE49-F238E27FC236}">
+              <a16:creationId xmlns:a16="http://schemas.microsoft.com/office/drawing/2014/main" id="{A76960D2-BF73-EA72-D080-024DFE87AB58}"/>
+            </a:ext>
+          </a:extLst>
+        </p:cNvPr>
+        <p:cNvGrpSpPr/>
+        <p:nvPr/>
+      </p:nvGrpSpPr>
+      <p:grpSpPr>
+        <a:xfrm>
+          <a:off x="0" y="0"/>
+          <a:ext cx="0" cy="0"/>
+          <a:chOff x="0" y="0"/>
+          <a:chExt cx="0" cy="0"/>
+        </a:xfrm>
+      </p:grpSpPr>
+      <p:sp>
+        <p:nvSpPr>
+          <p:cNvPr id="2" name="Title 1">
+            <a:extLst>
+              <a:ext uri="{FF2B5EF4-FFF2-40B4-BE49-F238E27FC236}">
+                <a16:creationId xmlns:a16="http://schemas.microsoft.com/office/drawing/2014/main" id="{DA383266-3C04-D729-1AB6-FB762922B54A}"/>
+              </a:ext>
+            </a:extLst>
+          </p:cNvPr>
+          <p:cNvSpPr>
+            <a:spLocks noGrp="1"/>
+          </p:cNvSpPr>
+          <p:nvPr>
+            <p:ph type="title"/>
+          </p:nvPr>
+        </p:nvSpPr>
+        <p:spPr/>
+        <p:txBody>
+          <a:bodyPr/>
+          <a:lstStyle/>
+          <a:p>
+            <a:r>
+              <a:rPr lang="en-US" dirty="0"/>
+              <a:t>Lunar Lander: PPO (Evaluation)</a:t>
+            </a:r>
+          </a:p>
+        </p:txBody>
+      </p:sp>
+      <p:sp>
+        <p:nvSpPr>
+          <p:cNvPr id="4" name="Footer Placeholder 3">
+            <a:extLst>
+              <a:ext uri="{FF2B5EF4-FFF2-40B4-BE49-F238E27FC236}">
+                <a16:creationId xmlns:a16="http://schemas.microsoft.com/office/drawing/2014/main" id="{AD29D234-BE31-E1E9-659A-EB12F018FD36}"/>
+              </a:ext>
+            </a:extLst>
+          </p:cNvPr>
+          <p:cNvSpPr>
+            <a:spLocks noGrp="1"/>
+          </p:cNvSpPr>
+          <p:nvPr>
+            <p:ph type="ftr" sz="quarter" idx="10"/>
+          </p:nvPr>
+        </p:nvSpPr>
+        <p:spPr/>
+        <p:txBody>
+          <a:bodyPr/>
+          <a:lstStyle/>
+          <a:p>
+            <a:fld id="{EB53C135-CEC6-A548-8917-8F7FEB82358B}" type="slidenum">
+              <a:rPr lang="en-US" smtClean="0"/>
+              <a:pPr/>
+              <a:t>26</a:t>
+            </a:fld>
+            <a:endParaRPr lang="en-US" dirty="0"/>
+          </a:p>
+        </p:txBody>
+      </p:sp>
+      <p:pic>
+        <p:nvPicPr>
+          <p:cNvPr id="12" name="Content Placeholder 11">
+            <a:extLst>
+              <a:ext uri="{FF2B5EF4-FFF2-40B4-BE49-F238E27FC236}">
+                <a16:creationId xmlns:a16="http://schemas.microsoft.com/office/drawing/2014/main" id="{D049DEAC-AC95-BF56-013E-370F75FF3C6E}"/>
+              </a:ext>
+            </a:extLst>
+          </p:cNvPr>
+          <p:cNvPicPr>
+            <a:picLocks noGrp="1" noChangeAspect="1"/>
+          </p:cNvPicPr>
+          <p:nvPr>
+            <p:ph idx="1"/>
+          </p:nvPr>
+        </p:nvPicPr>
+        <p:blipFill>
+          <a:blip r:embed="rId2">
+            <a:extLst>
+              <a:ext uri="{28A0092B-C50C-407E-A947-70E740481C1C}">
+                <a14:useLocalDpi xmlns:a14="http://schemas.microsoft.com/office/drawing/2010/main" val="0"/>
+              </a:ext>
+            </a:extLst>
+          </a:blip>
+          <a:stretch>
+            <a:fillRect/>
+          </a:stretch>
+        </p:blipFill>
+        <p:spPr>
+          <a:xfrm>
+            <a:off x="566928" y="2255820"/>
+            <a:ext cx="5048955" cy="3781953"/>
+          </a:xfrm>
+        </p:spPr>
+      </p:pic>
+      <p:pic>
+        <p:nvPicPr>
+          <p:cNvPr id="14" name="Picture 13">
+            <a:extLst>
+              <a:ext uri="{FF2B5EF4-FFF2-40B4-BE49-F238E27FC236}">
+                <a16:creationId xmlns:a16="http://schemas.microsoft.com/office/drawing/2014/main" id="{E1AB25F0-0291-06C3-30B8-78E7BDF586E0}"/>
+              </a:ext>
+            </a:extLst>
+          </p:cNvPr>
+          <p:cNvPicPr>
+            <a:picLocks noChangeAspect="1"/>
+          </p:cNvPicPr>
+          <p:nvPr/>
+        </p:nvPicPr>
+        <p:blipFill>
+          <a:blip r:embed="rId3">
+            <a:extLst>
+              <a:ext uri="{28A0092B-C50C-407E-A947-70E740481C1C}">
+                <a14:useLocalDpi xmlns:a14="http://schemas.microsoft.com/office/drawing/2010/main" val="0"/>
+              </a:ext>
+            </a:extLst>
+          </a:blip>
+          <a:stretch>
+            <a:fillRect/>
+          </a:stretch>
+        </p:blipFill>
+        <p:spPr>
+          <a:xfrm>
+            <a:off x="5852469" y="2255820"/>
+            <a:ext cx="4915586" cy="3820058"/>
+          </a:xfrm>
+          <a:prstGeom prst="rect">
+            <a:avLst/>
+          </a:prstGeom>
+        </p:spPr>
+      </p:pic>
+    </p:spTree>
+    <p:extLst>
+      <p:ext uri="{BB962C8B-B14F-4D97-AF65-F5344CB8AC3E}">
+        <p14:creationId xmlns:p14="http://schemas.microsoft.com/office/powerpoint/2010/main" val="3839036036"/>
+      </p:ext>
+    </p:extLst>
+  </p:cSld>
+  <p:clrMapOvr>
+    <a:masterClrMapping/>
+  </p:clrMapOvr>
+</p:sld>
+</file>
+
+<file path=ppt/slides/slide27.xml><?xml version="1.0" encoding="utf-8"?>
+<p:sld xmlns:a="http://schemas.openxmlformats.org/drawingml/2006/main" xmlns:r="http://schemas.openxmlformats.org/officeDocument/2006/relationships" xmlns:p="http://schemas.openxmlformats.org/presentationml/2006/main">
+  <p:cSld>
+    <p:spTree>
+      <p:nvGrpSpPr>
+        <p:cNvPr id="1" name="">
+          <a:extLst>
+            <a:ext uri="{FF2B5EF4-FFF2-40B4-BE49-F238E27FC236}">
+              <a16:creationId xmlns:a16="http://schemas.microsoft.com/office/drawing/2014/main" id="{8AF58EBE-DF5A-AD58-26CD-FB6D26EFF2E9}"/>
+            </a:ext>
+          </a:extLst>
+        </p:cNvPr>
+        <p:cNvGrpSpPr/>
+        <p:nvPr/>
+      </p:nvGrpSpPr>
+      <p:grpSpPr>
+        <a:xfrm>
+          <a:off x="0" y="0"/>
+          <a:ext cx="0" cy="0"/>
+          <a:chOff x="0" y="0"/>
+          <a:chExt cx="0" cy="0"/>
+        </a:xfrm>
+      </p:grpSpPr>
+      <p:sp>
+        <p:nvSpPr>
+          <p:cNvPr id="2" name="Title 1">
+            <a:extLst>
+              <a:ext uri="{FF2B5EF4-FFF2-40B4-BE49-F238E27FC236}">
+                <a16:creationId xmlns:a16="http://schemas.microsoft.com/office/drawing/2014/main" id="{DCBF3E1D-B09E-9DC8-1C1F-36F7609139A8}"/>
+              </a:ext>
+            </a:extLst>
+          </p:cNvPr>
+          <p:cNvSpPr>
+            <a:spLocks noGrp="1"/>
+          </p:cNvSpPr>
+          <p:nvPr>
+            <p:ph type="title"/>
+          </p:nvPr>
+        </p:nvSpPr>
+        <p:spPr/>
+        <p:txBody>
+          <a:bodyPr/>
+          <a:lstStyle/>
+          <a:p>
+            <a:r>
+              <a:rPr lang="en-US" dirty="0" err="1"/>
+              <a:t>Acrobot</a:t>
+            </a:r>
+            <a:r>
+              <a:rPr lang="en-US" dirty="0"/>
+              <a:t>: DQN (Training)</a:t>
+            </a:r>
+          </a:p>
+        </p:txBody>
+      </p:sp>
+      <p:sp>
+        <p:nvSpPr>
+          <p:cNvPr id="4" name="Footer Placeholder 3">
+            <a:extLst>
+              <a:ext uri="{FF2B5EF4-FFF2-40B4-BE49-F238E27FC236}">
+                <a16:creationId xmlns:a16="http://schemas.microsoft.com/office/drawing/2014/main" id="{A20FF98E-997E-1B42-6637-0B0AC7D7D881}"/>
+              </a:ext>
+            </a:extLst>
+          </p:cNvPr>
+          <p:cNvSpPr>
+            <a:spLocks noGrp="1"/>
+          </p:cNvSpPr>
+          <p:nvPr>
+            <p:ph type="ftr" sz="quarter" idx="10"/>
+          </p:nvPr>
+        </p:nvSpPr>
+        <p:spPr/>
+        <p:txBody>
+          <a:bodyPr/>
+          <a:lstStyle/>
+          <a:p>
+            <a:fld id="{EB53C135-CEC6-A548-8917-8F7FEB82358B}" type="slidenum">
+              <a:rPr lang="en-US" smtClean="0"/>
+              <a:pPr/>
+              <a:t>27</a:t>
+            </a:fld>
+            <a:endParaRPr lang="en-US" dirty="0"/>
+          </a:p>
+        </p:txBody>
+      </p:sp>
+      <p:pic>
+        <p:nvPicPr>
+          <p:cNvPr id="9" name="Content Placeholder 8">
+            <a:extLst>
+              <a:ext uri="{FF2B5EF4-FFF2-40B4-BE49-F238E27FC236}">
+                <a16:creationId xmlns:a16="http://schemas.microsoft.com/office/drawing/2014/main" id="{EE009A78-A370-D373-6C3F-C82D6CEC91BB}"/>
+              </a:ext>
+            </a:extLst>
+          </p:cNvPr>
+          <p:cNvPicPr>
+            <a:picLocks noGrp="1" noChangeAspect="1"/>
+          </p:cNvPicPr>
+          <p:nvPr>
+            <p:ph idx="1"/>
+          </p:nvPr>
+        </p:nvPicPr>
+        <p:blipFill>
+          <a:blip r:embed="rId2">
+            <a:extLst>
+              <a:ext uri="{28A0092B-C50C-407E-A947-70E740481C1C}">
+                <a14:useLocalDpi xmlns:a14="http://schemas.microsoft.com/office/drawing/2010/main" val="0"/>
+              </a:ext>
+            </a:extLst>
+          </a:blip>
+          <a:stretch>
+            <a:fillRect/>
+          </a:stretch>
+        </p:blipFill>
+        <p:spPr>
+          <a:xfrm>
+            <a:off x="566928" y="2161994"/>
+            <a:ext cx="4991797" cy="3734321"/>
+          </a:xfrm>
+        </p:spPr>
+      </p:pic>
+      <p:pic>
+        <p:nvPicPr>
+          <p:cNvPr id="11" name="Picture 10">
+            <a:extLst>
+              <a:ext uri="{FF2B5EF4-FFF2-40B4-BE49-F238E27FC236}">
+                <a16:creationId xmlns:a16="http://schemas.microsoft.com/office/drawing/2014/main" id="{AB103A1E-F45C-86CC-0907-7A9C2C5489A9}"/>
+              </a:ext>
+            </a:extLst>
+          </p:cNvPr>
+          <p:cNvPicPr>
+            <a:picLocks noChangeAspect="1"/>
+          </p:cNvPicPr>
+          <p:nvPr/>
+        </p:nvPicPr>
+        <p:blipFill>
+          <a:blip r:embed="rId3">
+            <a:extLst>
+              <a:ext uri="{28A0092B-C50C-407E-A947-70E740481C1C}">
+                <a14:useLocalDpi xmlns:a14="http://schemas.microsoft.com/office/drawing/2010/main" val="0"/>
+              </a:ext>
+            </a:extLst>
+          </a:blip>
+          <a:stretch>
+            <a:fillRect/>
+          </a:stretch>
+        </p:blipFill>
+        <p:spPr>
+          <a:xfrm>
+            <a:off x="5910253" y="2090546"/>
+            <a:ext cx="4887007" cy="3877216"/>
+          </a:xfrm>
+          <a:prstGeom prst="rect">
+            <a:avLst/>
+          </a:prstGeom>
+        </p:spPr>
+      </p:pic>
+    </p:spTree>
+    <p:extLst>
+      <p:ext uri="{BB962C8B-B14F-4D97-AF65-F5344CB8AC3E}">
+        <p14:creationId xmlns:p14="http://schemas.microsoft.com/office/powerpoint/2010/main" val="2834537142"/>
+      </p:ext>
+    </p:extLst>
+  </p:cSld>
+  <p:clrMapOvr>
+    <a:masterClrMapping/>
+  </p:clrMapOvr>
+</p:sld>
+</file>
+
+<file path=ppt/slides/slide28.xml><?xml version="1.0" encoding="utf-8"?>
+<p:sld xmlns:a="http://schemas.openxmlformats.org/drawingml/2006/main" xmlns:r="http://schemas.openxmlformats.org/officeDocument/2006/relationships" xmlns:p="http://schemas.openxmlformats.org/presentationml/2006/main">
+  <p:cSld>
+    <p:spTree>
+      <p:nvGrpSpPr>
+        <p:cNvPr id="1" name="">
+          <a:extLst>
+            <a:ext uri="{FF2B5EF4-FFF2-40B4-BE49-F238E27FC236}">
+              <a16:creationId xmlns:a16="http://schemas.microsoft.com/office/drawing/2014/main" id="{673704DD-9A75-988A-7818-CF0976161B34}"/>
+            </a:ext>
+          </a:extLst>
+        </p:cNvPr>
+        <p:cNvGrpSpPr/>
+        <p:nvPr/>
+      </p:nvGrpSpPr>
+      <p:grpSpPr>
+        <a:xfrm>
+          <a:off x="0" y="0"/>
+          <a:ext cx="0" cy="0"/>
+          <a:chOff x="0" y="0"/>
+          <a:chExt cx="0" cy="0"/>
+        </a:xfrm>
+      </p:grpSpPr>
+      <p:sp>
+        <p:nvSpPr>
+          <p:cNvPr id="2" name="Title 1">
+            <a:extLst>
+              <a:ext uri="{FF2B5EF4-FFF2-40B4-BE49-F238E27FC236}">
+                <a16:creationId xmlns:a16="http://schemas.microsoft.com/office/drawing/2014/main" id="{B75DE7BF-3D6E-82CB-1B8F-1EC883640D93}"/>
+              </a:ext>
+            </a:extLst>
+          </p:cNvPr>
+          <p:cNvSpPr>
+            <a:spLocks noGrp="1"/>
+          </p:cNvSpPr>
+          <p:nvPr>
+            <p:ph type="title"/>
+          </p:nvPr>
+        </p:nvSpPr>
+        <p:spPr>
+          <a:xfrm>
+            <a:off x="566928" y="1499616"/>
+            <a:ext cx="6951472" cy="590931"/>
+          </a:xfrm>
+        </p:spPr>
+        <p:txBody>
+          <a:bodyPr/>
+          <a:lstStyle/>
+          <a:p>
+            <a:r>
+              <a:rPr lang="en-US" dirty="0" err="1"/>
+              <a:t>Acrobot</a:t>
+            </a:r>
+            <a:r>
+              <a:rPr lang="en-US" dirty="0"/>
+              <a:t>: DQN (Evaluation)</a:t>
+            </a:r>
+          </a:p>
+        </p:txBody>
+      </p:sp>
+      <p:sp>
+        <p:nvSpPr>
+          <p:cNvPr id="4" name="Footer Placeholder 3">
+            <a:extLst>
+              <a:ext uri="{FF2B5EF4-FFF2-40B4-BE49-F238E27FC236}">
+                <a16:creationId xmlns:a16="http://schemas.microsoft.com/office/drawing/2014/main" id="{05F9D0AE-6184-F8F3-9937-846FD8FF4B13}"/>
+              </a:ext>
+            </a:extLst>
+          </p:cNvPr>
+          <p:cNvSpPr>
+            <a:spLocks noGrp="1"/>
+          </p:cNvSpPr>
+          <p:nvPr>
+            <p:ph type="ftr" sz="quarter" idx="10"/>
+          </p:nvPr>
+        </p:nvSpPr>
+        <p:spPr/>
+        <p:txBody>
+          <a:bodyPr/>
+          <a:lstStyle/>
+          <a:p>
+            <a:fld id="{EB53C135-CEC6-A548-8917-8F7FEB82358B}" type="slidenum">
+              <a:rPr lang="en-US" smtClean="0"/>
+              <a:pPr/>
+              <a:t>28</a:t>
+            </a:fld>
+            <a:endParaRPr lang="en-US" dirty="0"/>
+          </a:p>
+        </p:txBody>
+      </p:sp>
+      <p:pic>
+        <p:nvPicPr>
+          <p:cNvPr id="9" name="Content Placeholder 8">
+            <a:extLst>
+              <a:ext uri="{FF2B5EF4-FFF2-40B4-BE49-F238E27FC236}">
+                <a16:creationId xmlns:a16="http://schemas.microsoft.com/office/drawing/2014/main" id="{362D90A0-D9C2-62EE-ADF3-2ACF3F3A3415}"/>
+              </a:ext>
+            </a:extLst>
+          </p:cNvPr>
+          <p:cNvPicPr>
+            <a:picLocks noGrp="1" noChangeAspect="1"/>
+          </p:cNvPicPr>
+          <p:nvPr>
+            <p:ph idx="1"/>
+          </p:nvPr>
+        </p:nvPicPr>
+        <p:blipFill>
+          <a:blip r:embed="rId2">
+            <a:extLst>
+              <a:ext uri="{28A0092B-C50C-407E-A947-70E740481C1C}">
+                <a14:useLocalDpi xmlns:a14="http://schemas.microsoft.com/office/drawing/2010/main" val="0"/>
+              </a:ext>
+            </a:extLst>
+          </a:blip>
+          <a:stretch>
+            <a:fillRect/>
+          </a:stretch>
+        </p:blipFill>
+        <p:spPr>
+          <a:xfrm>
+            <a:off x="566928" y="2234165"/>
+            <a:ext cx="5020376" cy="3801005"/>
+          </a:xfrm>
+        </p:spPr>
+      </p:pic>
+      <p:pic>
+        <p:nvPicPr>
+          <p:cNvPr id="11" name="Picture 10">
+            <a:extLst>
+              <a:ext uri="{FF2B5EF4-FFF2-40B4-BE49-F238E27FC236}">
+                <a16:creationId xmlns:a16="http://schemas.microsoft.com/office/drawing/2014/main" id="{74450EAB-14EF-8E60-DD5C-8B1991AED58D}"/>
+              </a:ext>
+            </a:extLst>
+          </p:cNvPr>
+          <p:cNvPicPr>
+            <a:picLocks noChangeAspect="1"/>
+          </p:cNvPicPr>
+          <p:nvPr/>
+        </p:nvPicPr>
+        <p:blipFill>
+          <a:blip r:embed="rId3">
+            <a:extLst>
+              <a:ext uri="{28A0092B-C50C-407E-A947-70E740481C1C}">
+                <a14:useLocalDpi xmlns:a14="http://schemas.microsoft.com/office/drawing/2010/main" val="0"/>
+              </a:ext>
+            </a:extLst>
+          </a:blip>
+          <a:stretch>
+            <a:fillRect/>
+          </a:stretch>
+        </p:blipFill>
+        <p:spPr>
+          <a:xfrm>
+            <a:off x="5717300" y="2196059"/>
+            <a:ext cx="4906060" cy="3839111"/>
+          </a:xfrm>
+          <a:prstGeom prst="rect">
+            <a:avLst/>
+          </a:prstGeom>
+        </p:spPr>
+      </p:pic>
+    </p:spTree>
+    <p:extLst>
+      <p:ext uri="{BB962C8B-B14F-4D97-AF65-F5344CB8AC3E}">
+        <p14:creationId xmlns:p14="http://schemas.microsoft.com/office/powerpoint/2010/main" val="3625705755"/>
+      </p:ext>
+    </p:extLst>
+  </p:cSld>
+  <p:clrMapOvr>
+    <a:masterClrMapping/>
+  </p:clrMapOvr>
+</p:sld>
+</file>
+
+<file path=ppt/slides/slide29.xml><?xml version="1.0" encoding="utf-8"?>
+<p:sld xmlns:a="http://schemas.openxmlformats.org/drawingml/2006/main" xmlns:r="http://schemas.openxmlformats.org/officeDocument/2006/relationships" xmlns:p="http://schemas.openxmlformats.org/presentationml/2006/main">
+  <p:cSld>
+    <p:spTree>
+      <p:nvGrpSpPr>
+        <p:cNvPr id="1" name="">
+          <a:extLst>
+            <a:ext uri="{FF2B5EF4-FFF2-40B4-BE49-F238E27FC236}">
+              <a16:creationId xmlns:a16="http://schemas.microsoft.com/office/drawing/2014/main" id="{7441E1EB-A75C-2A12-F56D-1D02C5E18D5C}"/>
+            </a:ext>
+          </a:extLst>
+        </p:cNvPr>
+        <p:cNvGrpSpPr/>
+        <p:nvPr/>
+      </p:nvGrpSpPr>
+      <p:grpSpPr>
+        <a:xfrm>
+          <a:off x="0" y="0"/>
+          <a:ext cx="0" cy="0"/>
+          <a:chOff x="0" y="0"/>
+          <a:chExt cx="0" cy="0"/>
+        </a:xfrm>
+      </p:grpSpPr>
+      <p:sp>
+        <p:nvSpPr>
+          <p:cNvPr id="2" name="Title 1">
+            <a:extLst>
+              <a:ext uri="{FF2B5EF4-FFF2-40B4-BE49-F238E27FC236}">
+                <a16:creationId xmlns:a16="http://schemas.microsoft.com/office/drawing/2014/main" id="{3D34A677-39FF-7F41-3844-96C59DDD1F0B}"/>
+              </a:ext>
+            </a:extLst>
+          </p:cNvPr>
+          <p:cNvSpPr>
+            <a:spLocks noGrp="1"/>
+          </p:cNvSpPr>
+          <p:nvPr>
+            <p:ph type="title"/>
+          </p:nvPr>
+        </p:nvSpPr>
+        <p:spPr/>
+        <p:txBody>
+          <a:bodyPr/>
+          <a:lstStyle/>
+          <a:p>
+            <a:r>
+              <a:rPr lang="en-US" dirty="0" err="1"/>
+              <a:t>Acrobot</a:t>
+            </a:r>
+            <a:r>
+              <a:rPr lang="en-US" dirty="0"/>
+              <a:t>: DDQN (Training)</a:t>
+            </a:r>
+          </a:p>
+        </p:txBody>
+      </p:sp>
+      <p:sp>
+        <p:nvSpPr>
+          <p:cNvPr id="4" name="Footer Placeholder 3">
+            <a:extLst>
+              <a:ext uri="{FF2B5EF4-FFF2-40B4-BE49-F238E27FC236}">
+                <a16:creationId xmlns:a16="http://schemas.microsoft.com/office/drawing/2014/main" id="{ACCF1F6E-2B87-D13A-D825-888230425743}"/>
+              </a:ext>
+            </a:extLst>
+          </p:cNvPr>
+          <p:cNvSpPr>
+            <a:spLocks noGrp="1"/>
+          </p:cNvSpPr>
+          <p:nvPr>
+            <p:ph type="ftr" sz="quarter" idx="10"/>
+          </p:nvPr>
+        </p:nvSpPr>
+        <p:spPr/>
+        <p:txBody>
+          <a:bodyPr/>
+          <a:lstStyle/>
+          <a:p>
+            <a:fld id="{EB53C135-CEC6-A548-8917-8F7FEB82358B}" type="slidenum">
+              <a:rPr lang="en-US" smtClean="0"/>
+              <a:pPr/>
+              <a:t>29</a:t>
+            </a:fld>
+            <a:endParaRPr lang="en-US" dirty="0"/>
+          </a:p>
+        </p:txBody>
+      </p:sp>
+      <p:pic>
+        <p:nvPicPr>
+          <p:cNvPr id="9" name="Content Placeholder 8">
+            <a:extLst>
+              <a:ext uri="{FF2B5EF4-FFF2-40B4-BE49-F238E27FC236}">
+                <a16:creationId xmlns:a16="http://schemas.microsoft.com/office/drawing/2014/main" id="{6933D911-0A2D-04DA-233B-7CE78CE6BFE0}"/>
+              </a:ext>
+            </a:extLst>
+          </p:cNvPr>
+          <p:cNvPicPr>
+            <a:picLocks noGrp="1" noChangeAspect="1"/>
+          </p:cNvPicPr>
+          <p:nvPr>
+            <p:ph idx="1"/>
+          </p:nvPr>
+        </p:nvPicPr>
+        <p:blipFill>
+          <a:blip r:embed="rId2">
+            <a:extLst>
+              <a:ext uri="{28A0092B-C50C-407E-A947-70E740481C1C}">
+                <a14:useLocalDpi xmlns:a14="http://schemas.microsoft.com/office/drawing/2010/main" val="0"/>
+              </a:ext>
+            </a:extLst>
+          </a:blip>
+          <a:stretch>
+            <a:fillRect/>
+          </a:stretch>
+        </p:blipFill>
+        <p:spPr>
+          <a:xfrm>
+            <a:off x="566928" y="2211007"/>
+            <a:ext cx="5020376" cy="3791479"/>
+          </a:xfrm>
+        </p:spPr>
+      </p:pic>
+      <p:pic>
+        <p:nvPicPr>
+          <p:cNvPr id="11" name="Picture 10">
+            <a:extLst>
+              <a:ext uri="{FF2B5EF4-FFF2-40B4-BE49-F238E27FC236}">
+                <a16:creationId xmlns:a16="http://schemas.microsoft.com/office/drawing/2014/main" id="{3FBCF023-95D8-D7EA-5729-8D91C720DB3E}"/>
+              </a:ext>
+            </a:extLst>
+          </p:cNvPr>
+          <p:cNvPicPr>
+            <a:picLocks noChangeAspect="1"/>
+          </p:cNvPicPr>
+          <p:nvPr/>
+        </p:nvPicPr>
+        <p:blipFill>
+          <a:blip r:embed="rId3">
+            <a:extLst>
+              <a:ext uri="{28A0092B-C50C-407E-A947-70E740481C1C}">
+                <a14:useLocalDpi xmlns:a14="http://schemas.microsoft.com/office/drawing/2010/main" val="0"/>
+              </a:ext>
+            </a:extLst>
+          </a:blip>
+          <a:stretch>
+            <a:fillRect/>
+          </a:stretch>
+        </p:blipFill>
+        <p:spPr>
+          <a:xfrm>
+            <a:off x="5873055" y="2211007"/>
+            <a:ext cx="4906060" cy="3820058"/>
+          </a:xfrm>
+          <a:prstGeom prst="rect">
+            <a:avLst/>
+          </a:prstGeom>
+        </p:spPr>
+      </p:pic>
+    </p:spTree>
+    <p:extLst>
+      <p:ext uri="{BB962C8B-B14F-4D97-AF65-F5344CB8AC3E}">
+        <p14:creationId xmlns:p14="http://schemas.microsoft.com/office/powerpoint/2010/main" val="695351452"/>
+      </p:ext>
+    </p:extLst>
+  </p:cSld>
+  <p:clrMapOvr>
+    <a:masterClrMapping/>
+  </p:clrMapOvr>
+</p:sld>
+</file>
+
 <file path=ppt/slides/slide3.xml><?xml version="1.0" encoding="utf-8"?>
 <p:sld xmlns:a="http://schemas.openxmlformats.org/drawingml/2006/main" xmlns:r="http://schemas.openxmlformats.org/officeDocument/2006/relationships" xmlns:p="http://schemas.openxmlformats.org/presentationml/2006/main">
   <p:cSld>
@@ -10239,6 +12144,1537 @@
     <p:extLst>
       <p:ext uri="{BB962C8B-B14F-4D97-AF65-F5344CB8AC3E}">
         <p14:creationId xmlns:p14="http://schemas.microsoft.com/office/powerpoint/2010/main" val="995868431"/>
+      </p:ext>
+    </p:extLst>
+  </p:cSld>
+  <p:clrMapOvr>
+    <a:masterClrMapping/>
+  </p:clrMapOvr>
+</p:sld>
+</file>
+
+<file path=ppt/slides/slide30.xml><?xml version="1.0" encoding="utf-8"?>
+<p:sld xmlns:a="http://schemas.openxmlformats.org/drawingml/2006/main" xmlns:r="http://schemas.openxmlformats.org/officeDocument/2006/relationships" xmlns:p="http://schemas.openxmlformats.org/presentationml/2006/main">
+  <p:cSld>
+    <p:spTree>
+      <p:nvGrpSpPr>
+        <p:cNvPr id="1" name="">
+          <a:extLst>
+            <a:ext uri="{FF2B5EF4-FFF2-40B4-BE49-F238E27FC236}">
+              <a16:creationId xmlns:a16="http://schemas.microsoft.com/office/drawing/2014/main" id="{8DDBD55C-3480-5904-697F-3DEB64DB012A}"/>
+            </a:ext>
+          </a:extLst>
+        </p:cNvPr>
+        <p:cNvGrpSpPr/>
+        <p:nvPr/>
+      </p:nvGrpSpPr>
+      <p:grpSpPr>
+        <a:xfrm>
+          <a:off x="0" y="0"/>
+          <a:ext cx="0" cy="0"/>
+          <a:chOff x="0" y="0"/>
+          <a:chExt cx="0" cy="0"/>
+        </a:xfrm>
+      </p:grpSpPr>
+      <p:sp>
+        <p:nvSpPr>
+          <p:cNvPr id="2" name="Title 1">
+            <a:extLst>
+              <a:ext uri="{FF2B5EF4-FFF2-40B4-BE49-F238E27FC236}">
+                <a16:creationId xmlns:a16="http://schemas.microsoft.com/office/drawing/2014/main" id="{97694495-D8E8-EDCC-DE64-E01801020395}"/>
+              </a:ext>
+            </a:extLst>
+          </p:cNvPr>
+          <p:cNvSpPr>
+            <a:spLocks noGrp="1"/>
+          </p:cNvSpPr>
+          <p:nvPr>
+            <p:ph type="title"/>
+          </p:nvPr>
+        </p:nvSpPr>
+        <p:spPr>
+          <a:xfrm>
+            <a:off x="566928" y="1499616"/>
+            <a:ext cx="7550990" cy="590931"/>
+          </a:xfrm>
+        </p:spPr>
+        <p:txBody>
+          <a:bodyPr/>
+          <a:lstStyle/>
+          <a:p>
+            <a:r>
+              <a:rPr lang="en-US" dirty="0" err="1"/>
+              <a:t>Acrobot</a:t>
+            </a:r>
+            <a:r>
+              <a:rPr lang="en-US" dirty="0"/>
+              <a:t>: DDQN (Evaluation)</a:t>
+            </a:r>
+          </a:p>
+        </p:txBody>
+      </p:sp>
+      <p:sp>
+        <p:nvSpPr>
+          <p:cNvPr id="4" name="Footer Placeholder 3">
+            <a:extLst>
+              <a:ext uri="{FF2B5EF4-FFF2-40B4-BE49-F238E27FC236}">
+                <a16:creationId xmlns:a16="http://schemas.microsoft.com/office/drawing/2014/main" id="{D2D56A12-F53E-3284-79BF-EDA0313B1320}"/>
+              </a:ext>
+            </a:extLst>
+          </p:cNvPr>
+          <p:cNvSpPr>
+            <a:spLocks noGrp="1"/>
+          </p:cNvSpPr>
+          <p:nvPr>
+            <p:ph type="ftr" sz="quarter" idx="10"/>
+          </p:nvPr>
+        </p:nvSpPr>
+        <p:spPr/>
+        <p:txBody>
+          <a:bodyPr/>
+          <a:lstStyle/>
+          <a:p>
+            <a:fld id="{EB53C135-CEC6-A548-8917-8F7FEB82358B}" type="slidenum">
+              <a:rPr lang="en-US" smtClean="0"/>
+              <a:pPr/>
+              <a:t>30</a:t>
+            </a:fld>
+            <a:endParaRPr lang="en-US" dirty="0"/>
+          </a:p>
+        </p:txBody>
+      </p:sp>
+      <p:pic>
+        <p:nvPicPr>
+          <p:cNvPr id="9" name="Content Placeholder 8">
+            <a:extLst>
+              <a:ext uri="{FF2B5EF4-FFF2-40B4-BE49-F238E27FC236}">
+                <a16:creationId xmlns:a16="http://schemas.microsoft.com/office/drawing/2014/main" id="{D6027315-5712-C805-6EE9-240FCB374768}"/>
+              </a:ext>
+            </a:extLst>
+          </p:cNvPr>
+          <p:cNvPicPr>
+            <a:picLocks noGrp="1" noChangeAspect="1"/>
+          </p:cNvPicPr>
+          <p:nvPr>
+            <p:ph idx="1"/>
+          </p:nvPr>
+        </p:nvPicPr>
+        <p:blipFill>
+          <a:blip r:embed="rId2">
+            <a:extLst>
+              <a:ext uri="{28A0092B-C50C-407E-A947-70E740481C1C}">
+                <a14:useLocalDpi xmlns:a14="http://schemas.microsoft.com/office/drawing/2010/main" val="0"/>
+              </a:ext>
+            </a:extLst>
+          </a:blip>
+          <a:stretch>
+            <a:fillRect/>
+          </a:stretch>
+        </p:blipFill>
+        <p:spPr>
+          <a:xfrm>
+            <a:off x="566928" y="2218318"/>
+            <a:ext cx="4934639" cy="3762900"/>
+          </a:xfrm>
+        </p:spPr>
+      </p:pic>
+      <p:pic>
+        <p:nvPicPr>
+          <p:cNvPr id="11" name="Picture 10">
+            <a:extLst>
+              <a:ext uri="{FF2B5EF4-FFF2-40B4-BE49-F238E27FC236}">
+                <a16:creationId xmlns:a16="http://schemas.microsoft.com/office/drawing/2014/main" id="{1727925D-DBD4-A483-1CEF-EA1467B4E864}"/>
+              </a:ext>
+            </a:extLst>
+          </p:cNvPr>
+          <p:cNvPicPr>
+            <a:picLocks noChangeAspect="1"/>
+          </p:cNvPicPr>
+          <p:nvPr/>
+        </p:nvPicPr>
+        <p:blipFill>
+          <a:blip r:embed="rId3">
+            <a:extLst>
+              <a:ext uri="{28A0092B-C50C-407E-A947-70E740481C1C}">
+                <a14:useLocalDpi xmlns:a14="http://schemas.microsoft.com/office/drawing/2010/main" val="0"/>
+              </a:ext>
+            </a:extLst>
+          </a:blip>
+          <a:stretch>
+            <a:fillRect/>
+          </a:stretch>
+        </p:blipFill>
+        <p:spPr>
+          <a:xfrm>
+            <a:off x="5734538" y="2218318"/>
+            <a:ext cx="4944165" cy="3753374"/>
+          </a:xfrm>
+          <a:prstGeom prst="rect">
+            <a:avLst/>
+          </a:prstGeom>
+        </p:spPr>
+      </p:pic>
+    </p:spTree>
+    <p:extLst>
+      <p:ext uri="{BB962C8B-B14F-4D97-AF65-F5344CB8AC3E}">
+        <p14:creationId xmlns:p14="http://schemas.microsoft.com/office/powerpoint/2010/main" val="3492504036"/>
+      </p:ext>
+    </p:extLst>
+  </p:cSld>
+  <p:clrMapOvr>
+    <a:masterClrMapping/>
+  </p:clrMapOvr>
+</p:sld>
+</file>
+
+<file path=ppt/slides/slide31.xml><?xml version="1.0" encoding="utf-8"?>
+<p:sld xmlns:a="http://schemas.openxmlformats.org/drawingml/2006/main" xmlns:r="http://schemas.openxmlformats.org/officeDocument/2006/relationships" xmlns:p="http://schemas.openxmlformats.org/presentationml/2006/main">
+  <p:cSld>
+    <p:spTree>
+      <p:nvGrpSpPr>
+        <p:cNvPr id="1" name="">
+          <a:extLst>
+            <a:ext uri="{FF2B5EF4-FFF2-40B4-BE49-F238E27FC236}">
+              <a16:creationId xmlns:a16="http://schemas.microsoft.com/office/drawing/2014/main" id="{4E2A485D-13F7-3C7F-1847-114E97F7D28F}"/>
+            </a:ext>
+          </a:extLst>
+        </p:cNvPr>
+        <p:cNvGrpSpPr/>
+        <p:nvPr/>
+      </p:nvGrpSpPr>
+      <p:grpSpPr>
+        <a:xfrm>
+          <a:off x="0" y="0"/>
+          <a:ext cx="0" cy="0"/>
+          <a:chOff x="0" y="0"/>
+          <a:chExt cx="0" cy="0"/>
+        </a:xfrm>
+      </p:grpSpPr>
+      <p:sp>
+        <p:nvSpPr>
+          <p:cNvPr id="2" name="Title 1">
+            <a:extLst>
+              <a:ext uri="{FF2B5EF4-FFF2-40B4-BE49-F238E27FC236}">
+                <a16:creationId xmlns:a16="http://schemas.microsoft.com/office/drawing/2014/main" id="{319E03A0-A5D8-851A-C7C9-22F4D1419FBB}"/>
+              </a:ext>
+            </a:extLst>
+          </p:cNvPr>
+          <p:cNvSpPr>
+            <a:spLocks noGrp="1"/>
+          </p:cNvSpPr>
+          <p:nvPr>
+            <p:ph type="title"/>
+          </p:nvPr>
+        </p:nvSpPr>
+        <p:spPr>
+          <a:xfrm>
+            <a:off x="566928" y="1499616"/>
+            <a:ext cx="8409548" cy="590931"/>
+          </a:xfrm>
+        </p:spPr>
+        <p:txBody>
+          <a:bodyPr/>
+          <a:lstStyle/>
+          <a:p>
+            <a:r>
+              <a:rPr lang="en-US" dirty="0" err="1"/>
+              <a:t>Acrobot</a:t>
+            </a:r>
+            <a:r>
+              <a:rPr lang="en-US" dirty="0"/>
+              <a:t>: Dueling DQN (Training)</a:t>
+            </a:r>
+          </a:p>
+        </p:txBody>
+      </p:sp>
+      <p:sp>
+        <p:nvSpPr>
+          <p:cNvPr id="4" name="Footer Placeholder 3">
+            <a:extLst>
+              <a:ext uri="{FF2B5EF4-FFF2-40B4-BE49-F238E27FC236}">
+                <a16:creationId xmlns:a16="http://schemas.microsoft.com/office/drawing/2014/main" id="{C810E36D-199E-77C9-3EE3-C6FA9E034EDB}"/>
+              </a:ext>
+            </a:extLst>
+          </p:cNvPr>
+          <p:cNvSpPr>
+            <a:spLocks noGrp="1"/>
+          </p:cNvSpPr>
+          <p:nvPr>
+            <p:ph type="ftr" sz="quarter" idx="10"/>
+          </p:nvPr>
+        </p:nvSpPr>
+        <p:spPr/>
+        <p:txBody>
+          <a:bodyPr/>
+          <a:lstStyle/>
+          <a:p>
+            <a:fld id="{EB53C135-CEC6-A548-8917-8F7FEB82358B}" type="slidenum">
+              <a:rPr lang="en-US" smtClean="0"/>
+              <a:pPr/>
+              <a:t>31</a:t>
+            </a:fld>
+            <a:endParaRPr lang="en-US" dirty="0"/>
+          </a:p>
+        </p:txBody>
+      </p:sp>
+      <p:pic>
+        <p:nvPicPr>
+          <p:cNvPr id="9" name="Content Placeholder 8">
+            <a:extLst>
+              <a:ext uri="{FF2B5EF4-FFF2-40B4-BE49-F238E27FC236}">
+                <a16:creationId xmlns:a16="http://schemas.microsoft.com/office/drawing/2014/main" id="{56A0D754-4FE4-9A19-1A4B-39956C65113C}"/>
+              </a:ext>
+            </a:extLst>
+          </p:cNvPr>
+          <p:cNvPicPr>
+            <a:picLocks noGrp="1" noChangeAspect="1"/>
+          </p:cNvPicPr>
+          <p:nvPr>
+            <p:ph idx="1"/>
+          </p:nvPr>
+        </p:nvPicPr>
+        <p:blipFill>
+          <a:blip r:embed="rId2">
+            <a:extLst>
+              <a:ext uri="{28A0092B-C50C-407E-A947-70E740481C1C}">
+                <a14:useLocalDpi xmlns:a14="http://schemas.microsoft.com/office/drawing/2010/main" val="0"/>
+              </a:ext>
+            </a:extLst>
+          </a:blip>
+          <a:stretch>
+            <a:fillRect/>
+          </a:stretch>
+        </p:blipFill>
+        <p:spPr>
+          <a:xfrm>
+            <a:off x="566928" y="2208848"/>
+            <a:ext cx="5039428" cy="3772426"/>
+          </a:xfrm>
+        </p:spPr>
+      </p:pic>
+      <p:pic>
+        <p:nvPicPr>
+          <p:cNvPr id="11" name="Picture 10">
+            <a:extLst>
+              <a:ext uri="{FF2B5EF4-FFF2-40B4-BE49-F238E27FC236}">
+                <a16:creationId xmlns:a16="http://schemas.microsoft.com/office/drawing/2014/main" id="{723C77E9-EA73-ED82-0BB2-DD190791CFE4}"/>
+              </a:ext>
+            </a:extLst>
+          </p:cNvPr>
+          <p:cNvPicPr>
+            <a:picLocks noChangeAspect="1"/>
+          </p:cNvPicPr>
+          <p:nvPr/>
+        </p:nvPicPr>
+        <p:blipFill>
+          <a:blip r:embed="rId3">
+            <a:extLst>
+              <a:ext uri="{28A0092B-C50C-407E-A947-70E740481C1C}">
+                <a14:useLocalDpi xmlns:a14="http://schemas.microsoft.com/office/drawing/2010/main" val="0"/>
+              </a:ext>
+            </a:extLst>
+          </a:blip>
+          <a:stretch>
+            <a:fillRect/>
+          </a:stretch>
+        </p:blipFill>
+        <p:spPr>
+          <a:xfrm>
+            <a:off x="5836950" y="2208848"/>
+            <a:ext cx="4839375" cy="3772426"/>
+          </a:xfrm>
+          <a:prstGeom prst="rect">
+            <a:avLst/>
+          </a:prstGeom>
+        </p:spPr>
+      </p:pic>
+    </p:spTree>
+    <p:extLst>
+      <p:ext uri="{BB962C8B-B14F-4D97-AF65-F5344CB8AC3E}">
+        <p14:creationId xmlns:p14="http://schemas.microsoft.com/office/powerpoint/2010/main" val="2939773740"/>
+      </p:ext>
+    </p:extLst>
+  </p:cSld>
+  <p:clrMapOvr>
+    <a:masterClrMapping/>
+  </p:clrMapOvr>
+</p:sld>
+</file>
+
+<file path=ppt/slides/slide32.xml><?xml version="1.0" encoding="utf-8"?>
+<p:sld xmlns:a="http://schemas.openxmlformats.org/drawingml/2006/main" xmlns:r="http://schemas.openxmlformats.org/officeDocument/2006/relationships" xmlns:p="http://schemas.openxmlformats.org/presentationml/2006/main">
+  <p:cSld>
+    <p:spTree>
+      <p:nvGrpSpPr>
+        <p:cNvPr id="1" name="">
+          <a:extLst>
+            <a:ext uri="{FF2B5EF4-FFF2-40B4-BE49-F238E27FC236}">
+              <a16:creationId xmlns:a16="http://schemas.microsoft.com/office/drawing/2014/main" id="{9152E08C-1971-7329-86E9-6C8686055F9B}"/>
+            </a:ext>
+          </a:extLst>
+        </p:cNvPr>
+        <p:cNvGrpSpPr/>
+        <p:nvPr/>
+      </p:nvGrpSpPr>
+      <p:grpSpPr>
+        <a:xfrm>
+          <a:off x="0" y="0"/>
+          <a:ext cx="0" cy="0"/>
+          <a:chOff x="0" y="0"/>
+          <a:chExt cx="0" cy="0"/>
+        </a:xfrm>
+      </p:grpSpPr>
+      <p:sp>
+        <p:nvSpPr>
+          <p:cNvPr id="2" name="Title 1">
+            <a:extLst>
+              <a:ext uri="{FF2B5EF4-FFF2-40B4-BE49-F238E27FC236}">
+                <a16:creationId xmlns:a16="http://schemas.microsoft.com/office/drawing/2014/main" id="{859CB45E-E0FA-0E26-713F-FA0B4DF5A3D7}"/>
+              </a:ext>
+            </a:extLst>
+          </p:cNvPr>
+          <p:cNvSpPr>
+            <a:spLocks noGrp="1"/>
+          </p:cNvSpPr>
+          <p:nvPr>
+            <p:ph type="title"/>
+          </p:nvPr>
+        </p:nvSpPr>
+        <p:spPr>
+          <a:xfrm>
+            <a:off x="566927" y="1499616"/>
+            <a:ext cx="9533353" cy="590931"/>
+          </a:xfrm>
+        </p:spPr>
+        <p:txBody>
+          <a:bodyPr/>
+          <a:lstStyle/>
+          <a:p>
+            <a:r>
+              <a:rPr lang="en-US" dirty="0" err="1"/>
+              <a:t>Acrobot</a:t>
+            </a:r>
+            <a:r>
+              <a:rPr lang="en-US" dirty="0"/>
+              <a:t>: Dueling DQN (Evaluation)</a:t>
+            </a:r>
+          </a:p>
+        </p:txBody>
+      </p:sp>
+      <p:sp>
+        <p:nvSpPr>
+          <p:cNvPr id="4" name="Footer Placeholder 3">
+            <a:extLst>
+              <a:ext uri="{FF2B5EF4-FFF2-40B4-BE49-F238E27FC236}">
+                <a16:creationId xmlns:a16="http://schemas.microsoft.com/office/drawing/2014/main" id="{80CD7B20-C0C7-3E5B-FB00-84E09AA9A4C4}"/>
+              </a:ext>
+            </a:extLst>
+          </p:cNvPr>
+          <p:cNvSpPr>
+            <a:spLocks noGrp="1"/>
+          </p:cNvSpPr>
+          <p:nvPr>
+            <p:ph type="ftr" sz="quarter" idx="10"/>
+          </p:nvPr>
+        </p:nvSpPr>
+        <p:spPr/>
+        <p:txBody>
+          <a:bodyPr/>
+          <a:lstStyle/>
+          <a:p>
+            <a:fld id="{EB53C135-CEC6-A548-8917-8F7FEB82358B}" type="slidenum">
+              <a:rPr lang="en-US" smtClean="0"/>
+              <a:pPr/>
+              <a:t>32</a:t>
+            </a:fld>
+            <a:endParaRPr lang="en-US" dirty="0"/>
+          </a:p>
+        </p:txBody>
+      </p:sp>
+      <p:pic>
+        <p:nvPicPr>
+          <p:cNvPr id="9" name="Content Placeholder 8">
+            <a:extLst>
+              <a:ext uri="{FF2B5EF4-FFF2-40B4-BE49-F238E27FC236}">
+                <a16:creationId xmlns:a16="http://schemas.microsoft.com/office/drawing/2014/main" id="{3D0FBC6A-0F80-535D-101F-DCDBB5B0E0AE}"/>
+              </a:ext>
+            </a:extLst>
+          </p:cNvPr>
+          <p:cNvPicPr>
+            <a:picLocks noGrp="1" noChangeAspect="1"/>
+          </p:cNvPicPr>
+          <p:nvPr>
+            <p:ph idx="1"/>
+          </p:nvPr>
+        </p:nvPicPr>
+        <p:blipFill>
+          <a:blip r:embed="rId2">
+            <a:extLst>
+              <a:ext uri="{28A0092B-C50C-407E-A947-70E740481C1C}">
+                <a14:useLocalDpi xmlns:a14="http://schemas.microsoft.com/office/drawing/2010/main" val="0"/>
+              </a:ext>
+            </a:extLst>
+          </a:blip>
+          <a:stretch>
+            <a:fillRect/>
+          </a:stretch>
+        </p:blipFill>
+        <p:spPr>
+          <a:xfrm>
+            <a:off x="566927" y="2203941"/>
+            <a:ext cx="5096586" cy="3743847"/>
+          </a:xfrm>
+        </p:spPr>
+      </p:pic>
+      <p:pic>
+        <p:nvPicPr>
+          <p:cNvPr id="11" name="Picture 10">
+            <a:extLst>
+              <a:ext uri="{FF2B5EF4-FFF2-40B4-BE49-F238E27FC236}">
+                <a16:creationId xmlns:a16="http://schemas.microsoft.com/office/drawing/2014/main" id="{CA80EBBE-0FA9-FB0B-DE13-1E92CEDF6935}"/>
+              </a:ext>
+            </a:extLst>
+          </p:cNvPr>
+          <p:cNvPicPr>
+            <a:picLocks noChangeAspect="1"/>
+          </p:cNvPicPr>
+          <p:nvPr/>
+        </p:nvPicPr>
+        <p:blipFill>
+          <a:blip r:embed="rId3">
+            <a:extLst>
+              <a:ext uri="{28A0092B-C50C-407E-A947-70E740481C1C}">
+                <a14:useLocalDpi xmlns:a14="http://schemas.microsoft.com/office/drawing/2010/main" val="0"/>
+              </a:ext>
+            </a:extLst>
+          </a:blip>
+          <a:stretch>
+            <a:fillRect/>
+          </a:stretch>
+        </p:blipFill>
+        <p:spPr>
+          <a:xfrm>
+            <a:off x="5790633" y="2203941"/>
+            <a:ext cx="4877481" cy="3772426"/>
+          </a:xfrm>
+          <a:prstGeom prst="rect">
+            <a:avLst/>
+          </a:prstGeom>
+        </p:spPr>
+      </p:pic>
+    </p:spTree>
+    <p:extLst>
+      <p:ext uri="{BB962C8B-B14F-4D97-AF65-F5344CB8AC3E}">
+        <p14:creationId xmlns:p14="http://schemas.microsoft.com/office/powerpoint/2010/main" val="120850564"/>
+      </p:ext>
+    </p:extLst>
+  </p:cSld>
+  <p:clrMapOvr>
+    <a:masterClrMapping/>
+  </p:clrMapOvr>
+</p:sld>
+</file>
+
+<file path=ppt/slides/slide33.xml><?xml version="1.0" encoding="utf-8"?>
+<p:sld xmlns:a="http://schemas.openxmlformats.org/drawingml/2006/main" xmlns:r="http://schemas.openxmlformats.org/officeDocument/2006/relationships" xmlns:p="http://schemas.openxmlformats.org/presentationml/2006/main">
+  <p:cSld>
+    <p:spTree>
+      <p:nvGrpSpPr>
+        <p:cNvPr id="1" name="">
+          <a:extLst>
+            <a:ext uri="{FF2B5EF4-FFF2-40B4-BE49-F238E27FC236}">
+              <a16:creationId xmlns:a16="http://schemas.microsoft.com/office/drawing/2014/main" id="{FF9E35EA-51D7-085C-581A-46DAD31FCD6C}"/>
+            </a:ext>
+          </a:extLst>
+        </p:cNvPr>
+        <p:cNvGrpSpPr/>
+        <p:nvPr/>
+      </p:nvGrpSpPr>
+      <p:grpSpPr>
+        <a:xfrm>
+          <a:off x="0" y="0"/>
+          <a:ext cx="0" cy="0"/>
+          <a:chOff x="0" y="0"/>
+          <a:chExt cx="0" cy="0"/>
+        </a:xfrm>
+      </p:grpSpPr>
+      <p:sp>
+        <p:nvSpPr>
+          <p:cNvPr id="2" name="Title 1">
+            <a:extLst>
+              <a:ext uri="{FF2B5EF4-FFF2-40B4-BE49-F238E27FC236}">
+                <a16:creationId xmlns:a16="http://schemas.microsoft.com/office/drawing/2014/main" id="{FD0519EC-73F7-3D6A-42F0-05E60FCB2E46}"/>
+              </a:ext>
+            </a:extLst>
+          </p:cNvPr>
+          <p:cNvSpPr>
+            <a:spLocks noGrp="1"/>
+          </p:cNvSpPr>
+          <p:nvPr>
+            <p:ph type="title"/>
+          </p:nvPr>
+        </p:nvSpPr>
+        <p:spPr>
+          <a:xfrm>
+            <a:off x="566928" y="1499616"/>
+            <a:ext cx="8402568" cy="590931"/>
+          </a:xfrm>
+        </p:spPr>
+        <p:txBody>
+          <a:bodyPr/>
+          <a:lstStyle/>
+          <a:p>
+            <a:r>
+              <a:rPr lang="en-US" dirty="0" err="1"/>
+              <a:t>Acrobot</a:t>
+            </a:r>
+            <a:r>
+              <a:rPr lang="en-US" dirty="0"/>
+              <a:t>: Rainbow DQN (Training)</a:t>
+            </a:r>
+          </a:p>
+        </p:txBody>
+      </p:sp>
+      <p:pic>
+        <p:nvPicPr>
+          <p:cNvPr id="6" name="Content Placeholder 5">
+            <a:extLst>
+              <a:ext uri="{FF2B5EF4-FFF2-40B4-BE49-F238E27FC236}">
+                <a16:creationId xmlns:a16="http://schemas.microsoft.com/office/drawing/2014/main" id="{8C67F50C-47E6-F791-D4C5-A9F281033F7C}"/>
+              </a:ext>
+            </a:extLst>
+          </p:cNvPr>
+          <p:cNvPicPr>
+            <a:picLocks noGrp="1" noChangeAspect="1"/>
+          </p:cNvPicPr>
+          <p:nvPr>
+            <p:ph idx="1"/>
+          </p:nvPr>
+        </p:nvPicPr>
+        <p:blipFill>
+          <a:blip r:embed="rId2">
+            <a:extLst>
+              <a:ext uri="{28A0092B-C50C-407E-A947-70E740481C1C}">
+                <a14:useLocalDpi xmlns:a14="http://schemas.microsoft.com/office/drawing/2010/main" val="0"/>
+              </a:ext>
+            </a:extLst>
+          </a:blip>
+          <a:stretch>
+            <a:fillRect/>
+          </a:stretch>
+        </p:blipFill>
+        <p:spPr>
+          <a:xfrm>
+            <a:off x="566928" y="2202469"/>
+            <a:ext cx="5172797" cy="3724795"/>
+          </a:xfrm>
+        </p:spPr>
+      </p:pic>
+      <p:sp>
+        <p:nvSpPr>
+          <p:cNvPr id="4" name="Footer Placeholder 3">
+            <a:extLst>
+              <a:ext uri="{FF2B5EF4-FFF2-40B4-BE49-F238E27FC236}">
+                <a16:creationId xmlns:a16="http://schemas.microsoft.com/office/drawing/2014/main" id="{0EE1311D-0AA8-320D-EB03-C86977EF7880}"/>
+              </a:ext>
+            </a:extLst>
+          </p:cNvPr>
+          <p:cNvSpPr>
+            <a:spLocks noGrp="1"/>
+          </p:cNvSpPr>
+          <p:nvPr>
+            <p:ph type="ftr" sz="quarter" idx="10"/>
+          </p:nvPr>
+        </p:nvSpPr>
+        <p:spPr/>
+        <p:txBody>
+          <a:bodyPr/>
+          <a:lstStyle/>
+          <a:p>
+            <a:fld id="{EB53C135-CEC6-A548-8917-8F7FEB82358B}" type="slidenum">
+              <a:rPr lang="en-US" smtClean="0"/>
+              <a:pPr/>
+              <a:t>33</a:t>
+            </a:fld>
+            <a:endParaRPr lang="en-US" dirty="0"/>
+          </a:p>
+        </p:txBody>
+      </p:sp>
+      <p:pic>
+        <p:nvPicPr>
+          <p:cNvPr id="8" name="Picture 7">
+            <a:extLst>
+              <a:ext uri="{FF2B5EF4-FFF2-40B4-BE49-F238E27FC236}">
+                <a16:creationId xmlns:a16="http://schemas.microsoft.com/office/drawing/2014/main" id="{CDEA3713-0762-C9F2-554D-8C95577F60E0}"/>
+              </a:ext>
+            </a:extLst>
+          </p:cNvPr>
+          <p:cNvPicPr>
+            <a:picLocks noChangeAspect="1"/>
+          </p:cNvPicPr>
+          <p:nvPr/>
+        </p:nvPicPr>
+        <p:blipFill>
+          <a:blip r:embed="rId3">
+            <a:extLst>
+              <a:ext uri="{28A0092B-C50C-407E-A947-70E740481C1C}">
+                <a14:useLocalDpi xmlns:a14="http://schemas.microsoft.com/office/drawing/2010/main" val="0"/>
+              </a:ext>
+            </a:extLst>
+          </a:blip>
+          <a:stretch>
+            <a:fillRect/>
+          </a:stretch>
+        </p:blipFill>
+        <p:spPr>
+          <a:xfrm>
+            <a:off x="5962264" y="2188179"/>
+            <a:ext cx="5001323" cy="3753374"/>
+          </a:xfrm>
+          <a:prstGeom prst="rect">
+            <a:avLst/>
+          </a:prstGeom>
+        </p:spPr>
+      </p:pic>
+    </p:spTree>
+    <p:extLst>
+      <p:ext uri="{BB962C8B-B14F-4D97-AF65-F5344CB8AC3E}">
+        <p14:creationId xmlns:p14="http://schemas.microsoft.com/office/powerpoint/2010/main" val="3806951475"/>
+      </p:ext>
+    </p:extLst>
+  </p:cSld>
+  <p:clrMapOvr>
+    <a:masterClrMapping/>
+  </p:clrMapOvr>
+</p:sld>
+</file>
+
+<file path=ppt/slides/slide34.xml><?xml version="1.0" encoding="utf-8"?>
+<p:sld xmlns:a="http://schemas.openxmlformats.org/drawingml/2006/main" xmlns:r="http://schemas.openxmlformats.org/officeDocument/2006/relationships" xmlns:p="http://schemas.openxmlformats.org/presentationml/2006/main">
+  <p:cSld>
+    <p:spTree>
+      <p:nvGrpSpPr>
+        <p:cNvPr id="1" name="">
+          <a:extLst>
+            <a:ext uri="{FF2B5EF4-FFF2-40B4-BE49-F238E27FC236}">
+              <a16:creationId xmlns:a16="http://schemas.microsoft.com/office/drawing/2014/main" id="{AEB67D14-6A2D-A08B-B67E-DE59EC3E2CEC}"/>
+            </a:ext>
+          </a:extLst>
+        </p:cNvPr>
+        <p:cNvGrpSpPr/>
+        <p:nvPr/>
+      </p:nvGrpSpPr>
+      <p:grpSpPr>
+        <a:xfrm>
+          <a:off x="0" y="0"/>
+          <a:ext cx="0" cy="0"/>
+          <a:chOff x="0" y="0"/>
+          <a:chExt cx="0" cy="0"/>
+        </a:xfrm>
+      </p:grpSpPr>
+      <p:sp>
+        <p:nvSpPr>
+          <p:cNvPr id="2" name="Title 1">
+            <a:extLst>
+              <a:ext uri="{FF2B5EF4-FFF2-40B4-BE49-F238E27FC236}">
+                <a16:creationId xmlns:a16="http://schemas.microsoft.com/office/drawing/2014/main" id="{EA5B9A1F-03A9-E187-7168-B7222479CFBE}"/>
+              </a:ext>
+            </a:extLst>
+          </p:cNvPr>
+          <p:cNvSpPr>
+            <a:spLocks noGrp="1"/>
+          </p:cNvSpPr>
+          <p:nvPr>
+            <p:ph type="title"/>
+          </p:nvPr>
+        </p:nvSpPr>
+        <p:spPr>
+          <a:xfrm>
+            <a:off x="566927" y="1499616"/>
+            <a:ext cx="9344889" cy="590931"/>
+          </a:xfrm>
+        </p:spPr>
+        <p:txBody>
+          <a:bodyPr/>
+          <a:lstStyle/>
+          <a:p>
+            <a:r>
+              <a:rPr lang="en-US" dirty="0" err="1"/>
+              <a:t>Acrobot</a:t>
+            </a:r>
+            <a:r>
+              <a:rPr lang="en-US" dirty="0"/>
+              <a:t>: Rainbow DQN (Evaluation)</a:t>
+            </a:r>
+          </a:p>
+        </p:txBody>
+      </p:sp>
+      <p:pic>
+        <p:nvPicPr>
+          <p:cNvPr id="6" name="Content Placeholder 5">
+            <a:extLst>
+              <a:ext uri="{FF2B5EF4-FFF2-40B4-BE49-F238E27FC236}">
+                <a16:creationId xmlns:a16="http://schemas.microsoft.com/office/drawing/2014/main" id="{514D2AE6-3BD0-592A-0D07-ED89ECDAD154}"/>
+              </a:ext>
+            </a:extLst>
+          </p:cNvPr>
+          <p:cNvPicPr>
+            <a:picLocks noGrp="1" noChangeAspect="1"/>
+          </p:cNvPicPr>
+          <p:nvPr>
+            <p:ph idx="1"/>
+          </p:nvPr>
+        </p:nvPicPr>
+        <p:blipFill>
+          <a:blip r:embed="rId2">
+            <a:extLst>
+              <a:ext uri="{28A0092B-C50C-407E-A947-70E740481C1C}">
+                <a14:useLocalDpi xmlns:a14="http://schemas.microsoft.com/office/drawing/2010/main" val="0"/>
+              </a:ext>
+            </a:extLst>
+          </a:blip>
+          <a:stretch>
+            <a:fillRect/>
+          </a:stretch>
+        </p:blipFill>
+        <p:spPr>
+          <a:xfrm>
+            <a:off x="566927" y="2211337"/>
+            <a:ext cx="4982270" cy="3762900"/>
+          </a:xfrm>
+        </p:spPr>
+      </p:pic>
+      <p:sp>
+        <p:nvSpPr>
+          <p:cNvPr id="4" name="Footer Placeholder 3">
+            <a:extLst>
+              <a:ext uri="{FF2B5EF4-FFF2-40B4-BE49-F238E27FC236}">
+                <a16:creationId xmlns:a16="http://schemas.microsoft.com/office/drawing/2014/main" id="{38C8B635-03BD-B7A4-7E54-6D4D716CB367}"/>
+              </a:ext>
+            </a:extLst>
+          </p:cNvPr>
+          <p:cNvSpPr>
+            <a:spLocks noGrp="1"/>
+          </p:cNvSpPr>
+          <p:nvPr>
+            <p:ph type="ftr" sz="quarter" idx="10"/>
+          </p:nvPr>
+        </p:nvSpPr>
+        <p:spPr/>
+        <p:txBody>
+          <a:bodyPr/>
+          <a:lstStyle/>
+          <a:p>
+            <a:fld id="{EB53C135-CEC6-A548-8917-8F7FEB82358B}" type="slidenum">
+              <a:rPr lang="en-US" smtClean="0"/>
+              <a:pPr/>
+              <a:t>34</a:t>
+            </a:fld>
+            <a:endParaRPr lang="en-US" dirty="0"/>
+          </a:p>
+        </p:txBody>
+      </p:sp>
+      <p:pic>
+        <p:nvPicPr>
+          <p:cNvPr id="8" name="Picture 7">
+            <a:extLst>
+              <a:ext uri="{FF2B5EF4-FFF2-40B4-BE49-F238E27FC236}">
+                <a16:creationId xmlns:a16="http://schemas.microsoft.com/office/drawing/2014/main" id="{573B93D0-B520-88E0-D481-578937688A8B}"/>
+              </a:ext>
+            </a:extLst>
+          </p:cNvPr>
+          <p:cNvPicPr>
+            <a:picLocks noChangeAspect="1"/>
+          </p:cNvPicPr>
+          <p:nvPr/>
+        </p:nvPicPr>
+        <p:blipFill>
+          <a:blip r:embed="rId3">
+            <a:extLst>
+              <a:ext uri="{28A0092B-C50C-407E-A947-70E740481C1C}">
+                <a14:useLocalDpi xmlns:a14="http://schemas.microsoft.com/office/drawing/2010/main" val="0"/>
+              </a:ext>
+            </a:extLst>
+          </a:blip>
+          <a:stretch>
+            <a:fillRect/>
+          </a:stretch>
+        </p:blipFill>
+        <p:spPr>
+          <a:xfrm>
+            <a:off x="5847705" y="2211337"/>
+            <a:ext cx="4858428" cy="3801005"/>
+          </a:xfrm>
+          <a:prstGeom prst="rect">
+            <a:avLst/>
+          </a:prstGeom>
+        </p:spPr>
+      </p:pic>
+    </p:spTree>
+    <p:extLst>
+      <p:ext uri="{BB962C8B-B14F-4D97-AF65-F5344CB8AC3E}">
+        <p14:creationId xmlns:p14="http://schemas.microsoft.com/office/powerpoint/2010/main" val="3631910545"/>
+      </p:ext>
+    </p:extLst>
+  </p:cSld>
+  <p:clrMapOvr>
+    <a:masterClrMapping/>
+  </p:clrMapOvr>
+</p:sld>
+</file>
+
+<file path=ppt/slides/slide35.xml><?xml version="1.0" encoding="utf-8"?>
+<p:sld xmlns:a="http://schemas.openxmlformats.org/drawingml/2006/main" xmlns:r="http://schemas.openxmlformats.org/officeDocument/2006/relationships" xmlns:p="http://schemas.openxmlformats.org/presentationml/2006/main">
+  <p:cSld>
+    <p:spTree>
+      <p:nvGrpSpPr>
+        <p:cNvPr id="1" name="">
+          <a:extLst>
+            <a:ext uri="{FF2B5EF4-FFF2-40B4-BE49-F238E27FC236}">
+              <a16:creationId xmlns:a16="http://schemas.microsoft.com/office/drawing/2014/main" id="{B4E0E014-BF57-FDEA-7A3D-C21291B90609}"/>
+            </a:ext>
+          </a:extLst>
+        </p:cNvPr>
+        <p:cNvGrpSpPr/>
+        <p:nvPr/>
+      </p:nvGrpSpPr>
+      <p:grpSpPr>
+        <a:xfrm>
+          <a:off x="0" y="0"/>
+          <a:ext cx="0" cy="0"/>
+          <a:chOff x="0" y="0"/>
+          <a:chExt cx="0" cy="0"/>
+        </a:xfrm>
+      </p:grpSpPr>
+      <p:sp>
+        <p:nvSpPr>
+          <p:cNvPr id="2" name="Title 1">
+            <a:extLst>
+              <a:ext uri="{FF2B5EF4-FFF2-40B4-BE49-F238E27FC236}">
+                <a16:creationId xmlns:a16="http://schemas.microsoft.com/office/drawing/2014/main" id="{A1F0971D-87B1-6D01-118E-BB5F8CC82C67}"/>
+              </a:ext>
+            </a:extLst>
+          </p:cNvPr>
+          <p:cNvSpPr>
+            <a:spLocks noGrp="1"/>
+          </p:cNvSpPr>
+          <p:nvPr>
+            <p:ph type="title"/>
+          </p:nvPr>
+        </p:nvSpPr>
+        <p:spPr/>
+        <p:txBody>
+          <a:bodyPr/>
+          <a:lstStyle/>
+          <a:p>
+            <a:r>
+              <a:rPr lang="en-US" dirty="0" err="1"/>
+              <a:t>Acrobot</a:t>
+            </a:r>
+            <a:r>
+              <a:rPr lang="en-US" dirty="0"/>
+              <a:t>: PPO (Training)</a:t>
+            </a:r>
+          </a:p>
+        </p:txBody>
+      </p:sp>
+      <p:sp>
+        <p:nvSpPr>
+          <p:cNvPr id="4" name="Footer Placeholder 3">
+            <a:extLst>
+              <a:ext uri="{FF2B5EF4-FFF2-40B4-BE49-F238E27FC236}">
+                <a16:creationId xmlns:a16="http://schemas.microsoft.com/office/drawing/2014/main" id="{0EA4314E-5B15-FA3B-5EDC-9D51189D48E5}"/>
+              </a:ext>
+            </a:extLst>
+          </p:cNvPr>
+          <p:cNvSpPr>
+            <a:spLocks noGrp="1"/>
+          </p:cNvSpPr>
+          <p:nvPr>
+            <p:ph type="ftr" sz="quarter" idx="10"/>
+          </p:nvPr>
+        </p:nvSpPr>
+        <p:spPr/>
+        <p:txBody>
+          <a:bodyPr/>
+          <a:lstStyle/>
+          <a:p>
+            <a:fld id="{EB53C135-CEC6-A548-8917-8F7FEB82358B}" type="slidenum">
+              <a:rPr lang="en-US" smtClean="0"/>
+              <a:pPr/>
+              <a:t>35</a:t>
+            </a:fld>
+            <a:endParaRPr lang="en-US" dirty="0"/>
+          </a:p>
+        </p:txBody>
+      </p:sp>
+      <p:pic>
+        <p:nvPicPr>
+          <p:cNvPr id="8" name="Content Placeholder 7">
+            <a:extLst>
+              <a:ext uri="{FF2B5EF4-FFF2-40B4-BE49-F238E27FC236}">
+                <a16:creationId xmlns:a16="http://schemas.microsoft.com/office/drawing/2014/main" id="{5F9100CA-05D3-45DC-3440-6C32298B4586}"/>
+              </a:ext>
+            </a:extLst>
+          </p:cNvPr>
+          <p:cNvPicPr>
+            <a:picLocks noGrp="1" noChangeAspect="1"/>
+          </p:cNvPicPr>
+          <p:nvPr>
+            <p:ph idx="1"/>
+          </p:nvPr>
+        </p:nvPicPr>
+        <p:blipFill>
+          <a:blip r:embed="rId2">
+            <a:extLst>
+              <a:ext uri="{28A0092B-C50C-407E-A947-70E740481C1C}">
+                <a14:useLocalDpi xmlns:a14="http://schemas.microsoft.com/office/drawing/2010/main" val="0"/>
+              </a:ext>
+            </a:extLst>
+          </a:blip>
+          <a:stretch>
+            <a:fillRect/>
+          </a:stretch>
+        </p:blipFill>
+        <p:spPr>
+          <a:xfrm>
+            <a:off x="566928" y="2122397"/>
+            <a:ext cx="4991797" cy="3772426"/>
+          </a:xfrm>
+        </p:spPr>
+      </p:pic>
+      <p:pic>
+        <p:nvPicPr>
+          <p:cNvPr id="11" name="Picture 10">
+            <a:extLst>
+              <a:ext uri="{FF2B5EF4-FFF2-40B4-BE49-F238E27FC236}">
+                <a16:creationId xmlns:a16="http://schemas.microsoft.com/office/drawing/2014/main" id="{97CCACAF-DF94-3D32-7D8E-BC4AF62FB1B9}"/>
+              </a:ext>
+            </a:extLst>
+          </p:cNvPr>
+          <p:cNvPicPr>
+            <a:picLocks noChangeAspect="1"/>
+          </p:cNvPicPr>
+          <p:nvPr/>
+        </p:nvPicPr>
+        <p:blipFill>
+          <a:blip r:embed="rId3">
+            <a:extLst>
+              <a:ext uri="{28A0092B-C50C-407E-A947-70E740481C1C}">
+                <a14:useLocalDpi xmlns:a14="http://schemas.microsoft.com/office/drawing/2010/main" val="0"/>
+              </a:ext>
+            </a:extLst>
+          </a:blip>
+          <a:stretch>
+            <a:fillRect/>
+          </a:stretch>
+        </p:blipFill>
+        <p:spPr>
+          <a:xfrm>
+            <a:off x="5792106" y="2090547"/>
+            <a:ext cx="5048955" cy="3791479"/>
+          </a:xfrm>
+          <a:prstGeom prst="rect">
+            <a:avLst/>
+          </a:prstGeom>
+        </p:spPr>
+      </p:pic>
+    </p:spTree>
+    <p:extLst>
+      <p:ext uri="{BB962C8B-B14F-4D97-AF65-F5344CB8AC3E}">
+        <p14:creationId xmlns:p14="http://schemas.microsoft.com/office/powerpoint/2010/main" val="3443460314"/>
+      </p:ext>
+    </p:extLst>
+  </p:cSld>
+  <p:clrMapOvr>
+    <a:masterClrMapping/>
+  </p:clrMapOvr>
+</p:sld>
+</file>
+
+<file path=ppt/slides/slide36.xml><?xml version="1.0" encoding="utf-8"?>
+<p:sld xmlns:a="http://schemas.openxmlformats.org/drawingml/2006/main" xmlns:r="http://schemas.openxmlformats.org/officeDocument/2006/relationships" xmlns:p="http://schemas.openxmlformats.org/presentationml/2006/main">
+  <p:cSld>
+    <p:spTree>
+      <p:nvGrpSpPr>
+        <p:cNvPr id="1" name="">
+          <a:extLst>
+            <a:ext uri="{FF2B5EF4-FFF2-40B4-BE49-F238E27FC236}">
+              <a16:creationId xmlns:a16="http://schemas.microsoft.com/office/drawing/2014/main" id="{1D8363A0-DF6C-6D66-1AF1-4BB112B30823}"/>
+            </a:ext>
+          </a:extLst>
+        </p:cNvPr>
+        <p:cNvGrpSpPr/>
+        <p:nvPr/>
+      </p:nvGrpSpPr>
+      <p:grpSpPr>
+        <a:xfrm>
+          <a:off x="0" y="0"/>
+          <a:ext cx="0" cy="0"/>
+          <a:chOff x="0" y="0"/>
+          <a:chExt cx="0" cy="0"/>
+        </a:xfrm>
+      </p:grpSpPr>
+      <p:sp>
+        <p:nvSpPr>
+          <p:cNvPr id="2" name="Title 1">
+            <a:extLst>
+              <a:ext uri="{FF2B5EF4-FFF2-40B4-BE49-F238E27FC236}">
+                <a16:creationId xmlns:a16="http://schemas.microsoft.com/office/drawing/2014/main" id="{8C17E4D6-7E45-6381-7523-90710F245D99}"/>
+              </a:ext>
+            </a:extLst>
+          </p:cNvPr>
+          <p:cNvSpPr>
+            <a:spLocks noGrp="1"/>
+          </p:cNvSpPr>
+          <p:nvPr>
+            <p:ph type="title"/>
+          </p:nvPr>
+        </p:nvSpPr>
+        <p:spPr/>
+        <p:txBody>
+          <a:bodyPr/>
+          <a:lstStyle/>
+          <a:p>
+            <a:r>
+              <a:rPr lang="en-US" dirty="0" err="1"/>
+              <a:t>Acrobot</a:t>
+            </a:r>
+            <a:r>
+              <a:rPr lang="en-US" dirty="0"/>
+              <a:t>: PPO (Evaluation)</a:t>
+            </a:r>
+          </a:p>
+        </p:txBody>
+      </p:sp>
+      <p:sp>
+        <p:nvSpPr>
+          <p:cNvPr id="4" name="Footer Placeholder 3">
+            <a:extLst>
+              <a:ext uri="{FF2B5EF4-FFF2-40B4-BE49-F238E27FC236}">
+                <a16:creationId xmlns:a16="http://schemas.microsoft.com/office/drawing/2014/main" id="{AEB53841-E1CD-5D28-27CC-32F46E355863}"/>
+              </a:ext>
+            </a:extLst>
+          </p:cNvPr>
+          <p:cNvSpPr>
+            <a:spLocks noGrp="1"/>
+          </p:cNvSpPr>
+          <p:nvPr>
+            <p:ph type="ftr" sz="quarter" idx="10"/>
+          </p:nvPr>
+        </p:nvSpPr>
+        <p:spPr/>
+        <p:txBody>
+          <a:bodyPr/>
+          <a:lstStyle/>
+          <a:p>
+            <a:fld id="{EB53C135-CEC6-A548-8917-8F7FEB82358B}" type="slidenum">
+              <a:rPr lang="en-US" smtClean="0"/>
+              <a:pPr/>
+              <a:t>36</a:t>
+            </a:fld>
+            <a:endParaRPr lang="en-US" dirty="0"/>
+          </a:p>
+        </p:txBody>
+      </p:sp>
+      <p:pic>
+        <p:nvPicPr>
+          <p:cNvPr id="7" name="Content Placeholder 6">
+            <a:extLst>
+              <a:ext uri="{FF2B5EF4-FFF2-40B4-BE49-F238E27FC236}">
+                <a16:creationId xmlns:a16="http://schemas.microsoft.com/office/drawing/2014/main" id="{7B6B6A5B-6F67-2510-306C-896D47CB1527}"/>
+              </a:ext>
+            </a:extLst>
+          </p:cNvPr>
+          <p:cNvPicPr>
+            <a:picLocks noGrp="1" noChangeAspect="1"/>
+          </p:cNvPicPr>
+          <p:nvPr>
+            <p:ph idx="1"/>
+          </p:nvPr>
+        </p:nvPicPr>
+        <p:blipFill>
+          <a:blip r:embed="rId2">
+            <a:extLst>
+              <a:ext uri="{28A0092B-C50C-407E-A947-70E740481C1C}">
+                <a14:useLocalDpi xmlns:a14="http://schemas.microsoft.com/office/drawing/2010/main" val="0"/>
+              </a:ext>
+            </a:extLst>
+          </a:blip>
+          <a:stretch>
+            <a:fillRect/>
+          </a:stretch>
+        </p:blipFill>
+        <p:spPr>
+          <a:xfrm>
+            <a:off x="566928" y="2118764"/>
+            <a:ext cx="4953691" cy="3772426"/>
+          </a:xfrm>
+        </p:spPr>
+      </p:pic>
+      <p:pic>
+        <p:nvPicPr>
+          <p:cNvPr id="9" name="Picture 8">
+            <a:extLst>
+              <a:ext uri="{FF2B5EF4-FFF2-40B4-BE49-F238E27FC236}">
+                <a16:creationId xmlns:a16="http://schemas.microsoft.com/office/drawing/2014/main" id="{92E3AEC9-5B29-731D-ACB1-1D7898BEA38D}"/>
+              </a:ext>
+            </a:extLst>
+          </p:cNvPr>
+          <p:cNvPicPr>
+            <a:picLocks noChangeAspect="1"/>
+          </p:cNvPicPr>
+          <p:nvPr/>
+        </p:nvPicPr>
+        <p:blipFill>
+          <a:blip r:embed="rId3">
+            <a:extLst>
+              <a:ext uri="{28A0092B-C50C-407E-A947-70E740481C1C}">
+                <a14:useLocalDpi xmlns:a14="http://schemas.microsoft.com/office/drawing/2010/main" val="0"/>
+              </a:ext>
+            </a:extLst>
+          </a:blip>
+          <a:stretch>
+            <a:fillRect/>
+          </a:stretch>
+        </p:blipFill>
+        <p:spPr>
+          <a:xfrm>
+            <a:off x="5899684" y="2090185"/>
+            <a:ext cx="4963218" cy="3829584"/>
+          </a:xfrm>
+          <a:prstGeom prst="rect">
+            <a:avLst/>
+          </a:prstGeom>
+        </p:spPr>
+      </p:pic>
+    </p:spTree>
+    <p:extLst>
+      <p:ext uri="{BB962C8B-B14F-4D97-AF65-F5344CB8AC3E}">
+        <p14:creationId xmlns:p14="http://schemas.microsoft.com/office/powerpoint/2010/main" val="154251278"/>
+      </p:ext>
+    </p:extLst>
+  </p:cSld>
+  <p:clrMapOvr>
+    <a:masterClrMapping/>
+  </p:clrMapOvr>
+</p:sld>
+</file>
+
+<file path=ppt/slides/slide37.xml><?xml version="1.0" encoding="utf-8"?>
+<p:sld xmlns:a="http://schemas.openxmlformats.org/drawingml/2006/main" xmlns:r="http://schemas.openxmlformats.org/officeDocument/2006/relationships" xmlns:p="http://schemas.openxmlformats.org/presentationml/2006/main">
+  <p:cSld>
+    <p:spTree>
+      <p:nvGrpSpPr>
+        <p:cNvPr id="1" name="">
+          <a:extLst>
+            <a:ext uri="{FF2B5EF4-FFF2-40B4-BE49-F238E27FC236}">
+              <a16:creationId xmlns:a16="http://schemas.microsoft.com/office/drawing/2014/main" id="{9159CA42-E54B-4158-A290-1688BD730C41}"/>
+            </a:ext>
+          </a:extLst>
+        </p:cNvPr>
+        <p:cNvGrpSpPr/>
+        <p:nvPr/>
+      </p:nvGrpSpPr>
+      <p:grpSpPr>
+        <a:xfrm>
+          <a:off x="0" y="0"/>
+          <a:ext cx="0" cy="0"/>
+          <a:chOff x="0" y="0"/>
+          <a:chExt cx="0" cy="0"/>
+        </a:xfrm>
+      </p:grpSpPr>
+      <p:sp>
+        <p:nvSpPr>
+          <p:cNvPr id="4" name="Sub-topic">
+            <a:extLst>
+              <a:ext uri="{FF2B5EF4-FFF2-40B4-BE49-F238E27FC236}">
+                <a16:creationId xmlns:a16="http://schemas.microsoft.com/office/drawing/2014/main" id="{7338BDB3-59AA-9059-7996-A2F01752888B}"/>
+              </a:ext>
+            </a:extLst>
+          </p:cNvPr>
+          <p:cNvSpPr>
+            <a:spLocks noGrp="1"/>
+          </p:cNvSpPr>
+          <p:nvPr>
+            <p:ph type="ctrTitle"/>
+          </p:nvPr>
+        </p:nvSpPr>
+        <p:spPr/>
+        <p:txBody>
+          <a:bodyPr/>
+          <a:lstStyle/>
+          <a:p>
+            <a:r>
+              <a:rPr lang="en-US" dirty="0"/>
+              <a:t>Demo</a:t>
+            </a:r>
+          </a:p>
+        </p:txBody>
+      </p:sp>
+      <p:sp>
+        <p:nvSpPr>
+          <p:cNvPr id="5" name="Section Divider Title">
+            <a:extLst>
+              <a:ext uri="{FF2B5EF4-FFF2-40B4-BE49-F238E27FC236}">
+                <a16:creationId xmlns:a16="http://schemas.microsoft.com/office/drawing/2014/main" id="{667A348B-801F-F6C1-BCB1-CF9A3F4498D0}"/>
+              </a:ext>
+            </a:extLst>
+          </p:cNvPr>
+          <p:cNvSpPr>
+            <a:spLocks noGrp="1"/>
+          </p:cNvSpPr>
+          <p:nvPr>
+            <p:ph type="subTitle" idx="1"/>
+          </p:nvPr>
+        </p:nvSpPr>
+        <p:spPr/>
+        <p:txBody>
+          <a:bodyPr/>
+          <a:lstStyle/>
+          <a:p>
+            <a:endParaRPr lang="en-US" dirty="0"/>
+          </a:p>
+        </p:txBody>
+      </p:sp>
+    </p:spTree>
+    <p:extLst>
+      <p:ext uri="{BB962C8B-B14F-4D97-AF65-F5344CB8AC3E}">
+        <p14:creationId xmlns:p14="http://schemas.microsoft.com/office/powerpoint/2010/main" val="1698194335"/>
+      </p:ext>
+    </p:extLst>
+  </p:cSld>
+  <p:clrMapOvr>
+    <a:masterClrMapping/>
+  </p:clrMapOvr>
+</p:sld>
+</file>
+
+<file path=ppt/slides/slide38.xml><?xml version="1.0" encoding="utf-8"?>
+<p:sld xmlns:a="http://schemas.openxmlformats.org/drawingml/2006/main" xmlns:r="http://schemas.openxmlformats.org/officeDocument/2006/relationships" xmlns:p="http://schemas.openxmlformats.org/presentationml/2006/main">
+  <p:cSld>
+    <p:spTree>
+      <p:nvGrpSpPr>
+        <p:cNvPr id="1" name="">
+          <a:extLst>
+            <a:ext uri="{FF2B5EF4-FFF2-40B4-BE49-F238E27FC236}">
+              <a16:creationId xmlns:a16="http://schemas.microsoft.com/office/drawing/2014/main" id="{13F16B6F-AF95-EB09-E2B1-477ED4A38E50}"/>
+            </a:ext>
+          </a:extLst>
+        </p:cNvPr>
+        <p:cNvGrpSpPr/>
+        <p:nvPr/>
+      </p:nvGrpSpPr>
+      <p:grpSpPr>
+        <a:xfrm>
+          <a:off x="0" y="0"/>
+          <a:ext cx="0" cy="0"/>
+          <a:chOff x="0" y="0"/>
+          <a:chExt cx="0" cy="0"/>
+        </a:xfrm>
+      </p:grpSpPr>
+      <p:sp>
+        <p:nvSpPr>
+          <p:cNvPr id="2" name="Title 1">
+            <a:extLst>
+              <a:ext uri="{FF2B5EF4-FFF2-40B4-BE49-F238E27FC236}">
+                <a16:creationId xmlns:a16="http://schemas.microsoft.com/office/drawing/2014/main" id="{8ADDB04F-3D8D-BB07-A54A-DC7CACFD7555}"/>
+              </a:ext>
+            </a:extLst>
+          </p:cNvPr>
+          <p:cNvSpPr>
+            <a:spLocks noGrp="1"/>
+          </p:cNvSpPr>
+          <p:nvPr>
+            <p:ph type="title"/>
+          </p:nvPr>
+        </p:nvSpPr>
+        <p:spPr/>
+        <p:txBody>
+          <a:bodyPr/>
+          <a:lstStyle/>
+          <a:p>
+            <a:r>
+              <a:rPr lang="en-US" dirty="0"/>
+              <a:t>Challenges</a:t>
+            </a:r>
+            <a:endParaRPr lang="en-IN" dirty="0"/>
+          </a:p>
+        </p:txBody>
+      </p:sp>
+      <p:sp>
+        <p:nvSpPr>
+          <p:cNvPr id="3" name="Content Placeholder 2">
+            <a:extLst>
+              <a:ext uri="{FF2B5EF4-FFF2-40B4-BE49-F238E27FC236}">
+                <a16:creationId xmlns:a16="http://schemas.microsoft.com/office/drawing/2014/main" id="{1FF5E961-7D49-296A-D9AD-FB39DBF99E80}"/>
+              </a:ext>
+            </a:extLst>
+          </p:cNvPr>
+          <p:cNvSpPr>
+            <a:spLocks noGrp="1"/>
+          </p:cNvSpPr>
+          <p:nvPr>
+            <p:ph idx="1"/>
+          </p:nvPr>
+        </p:nvSpPr>
+        <p:spPr/>
+        <p:txBody>
+          <a:bodyPr/>
+          <a:lstStyle/>
+          <a:p>
+            <a:endParaRPr lang="en-IN"/>
+          </a:p>
+        </p:txBody>
+      </p:sp>
+      <p:sp>
+        <p:nvSpPr>
+          <p:cNvPr id="4" name="Footer Placeholder 3">
+            <a:extLst>
+              <a:ext uri="{FF2B5EF4-FFF2-40B4-BE49-F238E27FC236}">
+                <a16:creationId xmlns:a16="http://schemas.microsoft.com/office/drawing/2014/main" id="{1FB69A47-1EB5-4657-4814-90645E8799D8}"/>
+              </a:ext>
+            </a:extLst>
+          </p:cNvPr>
+          <p:cNvSpPr>
+            <a:spLocks noGrp="1"/>
+          </p:cNvSpPr>
+          <p:nvPr>
+            <p:ph type="ftr" sz="quarter" idx="10"/>
+          </p:nvPr>
+        </p:nvSpPr>
+        <p:spPr/>
+        <p:txBody>
+          <a:bodyPr/>
+          <a:lstStyle/>
+          <a:p>
+            <a:fld id="{EB53C135-CEC6-A548-8917-8F7FEB82358B}" type="slidenum">
+              <a:rPr lang="en-US" smtClean="0"/>
+              <a:pPr/>
+              <a:t>38</a:t>
+            </a:fld>
+            <a:endParaRPr lang="en-US" dirty="0"/>
+          </a:p>
+        </p:txBody>
+      </p:sp>
+    </p:spTree>
+    <p:extLst>
+      <p:ext uri="{BB962C8B-B14F-4D97-AF65-F5344CB8AC3E}">
+        <p14:creationId xmlns:p14="http://schemas.microsoft.com/office/powerpoint/2010/main" val="929824031"/>
+      </p:ext>
+    </p:extLst>
+  </p:cSld>
+  <p:clrMapOvr>
+    <a:masterClrMapping/>
+  </p:clrMapOvr>
+</p:sld>
+</file>
+
+<file path=ppt/slides/slide39.xml><?xml version="1.0" encoding="utf-8"?>
+<p:sld xmlns:a="http://schemas.openxmlformats.org/drawingml/2006/main" xmlns:r="http://schemas.openxmlformats.org/officeDocument/2006/relationships" xmlns:p="http://schemas.openxmlformats.org/presentationml/2006/main">
+  <p:cSld>
+    <p:spTree>
+      <p:nvGrpSpPr>
+        <p:cNvPr id="1" name=""/>
+        <p:cNvGrpSpPr/>
+        <p:nvPr/>
+      </p:nvGrpSpPr>
+      <p:grpSpPr>
+        <a:xfrm>
+          <a:off x="0" y="0"/>
+          <a:ext cx="0" cy="0"/>
+          <a:chOff x="0" y="0"/>
+          <a:chExt cx="0" cy="0"/>
+        </a:xfrm>
+      </p:grpSpPr>
+      <p:sp>
+        <p:nvSpPr>
+          <p:cNvPr id="2" name="Title 1">
+            <a:extLst>
+              <a:ext uri="{FF2B5EF4-FFF2-40B4-BE49-F238E27FC236}">
+                <a16:creationId xmlns:a16="http://schemas.microsoft.com/office/drawing/2014/main" id="{3741CAEC-B05F-C1F0-3356-1C899FA4C902}"/>
+              </a:ext>
+            </a:extLst>
+          </p:cNvPr>
+          <p:cNvSpPr>
+            <a:spLocks noGrp="1"/>
+          </p:cNvSpPr>
+          <p:nvPr>
+            <p:ph type="title"/>
+          </p:nvPr>
+        </p:nvSpPr>
+        <p:spPr/>
+        <p:txBody>
+          <a:bodyPr/>
+          <a:lstStyle/>
+          <a:p>
+            <a:r>
+              <a:rPr lang="en-US" dirty="0"/>
+              <a:t>Contribution Table</a:t>
+            </a:r>
+            <a:endParaRPr lang="en-IN" dirty="0"/>
+          </a:p>
+        </p:txBody>
+      </p:sp>
+      <p:sp>
+        <p:nvSpPr>
+          <p:cNvPr id="3" name="Content Placeholder 2">
+            <a:extLst>
+              <a:ext uri="{FF2B5EF4-FFF2-40B4-BE49-F238E27FC236}">
+                <a16:creationId xmlns:a16="http://schemas.microsoft.com/office/drawing/2014/main" id="{2A364488-7B55-16E2-77B9-C220CFF03DA8}"/>
+              </a:ext>
+            </a:extLst>
+          </p:cNvPr>
+          <p:cNvSpPr>
+            <a:spLocks noGrp="1"/>
+          </p:cNvSpPr>
+          <p:nvPr>
+            <p:ph idx="1"/>
+          </p:nvPr>
+        </p:nvSpPr>
+        <p:spPr/>
+        <p:txBody>
+          <a:bodyPr/>
+          <a:lstStyle/>
+          <a:p>
+            <a:endParaRPr lang="en-IN" dirty="0"/>
+          </a:p>
+        </p:txBody>
+      </p:sp>
+      <p:sp>
+        <p:nvSpPr>
+          <p:cNvPr id="4" name="Footer Placeholder 3">
+            <a:extLst>
+              <a:ext uri="{FF2B5EF4-FFF2-40B4-BE49-F238E27FC236}">
+                <a16:creationId xmlns:a16="http://schemas.microsoft.com/office/drawing/2014/main" id="{3DFCB9C5-D32C-D27E-AACF-640851B30F8B}"/>
+              </a:ext>
+            </a:extLst>
+          </p:cNvPr>
+          <p:cNvSpPr>
+            <a:spLocks noGrp="1"/>
+          </p:cNvSpPr>
+          <p:nvPr>
+            <p:ph type="ftr" sz="quarter" idx="10"/>
+          </p:nvPr>
+        </p:nvSpPr>
+        <p:spPr/>
+        <p:txBody>
+          <a:bodyPr/>
+          <a:lstStyle/>
+          <a:p>
+            <a:fld id="{EB53C135-CEC6-A548-8917-8F7FEB82358B}" type="slidenum">
+              <a:rPr lang="en-US" smtClean="0"/>
+              <a:pPr/>
+              <a:t>39</a:t>
+            </a:fld>
+            <a:endParaRPr lang="en-US" dirty="0"/>
+          </a:p>
+        </p:txBody>
+      </p:sp>
+    </p:spTree>
+    <p:extLst>
+      <p:ext uri="{BB962C8B-B14F-4D97-AF65-F5344CB8AC3E}">
+        <p14:creationId xmlns:p14="http://schemas.microsoft.com/office/powerpoint/2010/main" val="3290968601"/>
       </p:ext>
     </p:extLst>
   </p:cSld>
@@ -10330,6 +13766,10 @@
             <a:r>
               <a:rPr lang="en-US" dirty="0" err="1"/>
               <a:t>Acrobot</a:t>
+            </a:r>
+            <a:r>
+              <a:rPr lang="en-US" dirty="0"/>
+              <a:t> – v1</a:t>
             </a:r>
             <a:endParaRPr lang="en-IN" dirty="0"/>
           </a:p>

</xml_diff>

<commit_message>
GitHub Link and Screenshots added to PPT
</commit_message>
<xml_diff>
--- a/Final Project Presentation.pptx
+++ b/Final Project Presentation.pptx
@@ -5,6 +5,9 @@
     <p:sldMasterId id="2147483648" r:id="rId1"/>
     <p:sldMasterId id="2147483661" r:id="rId2"/>
   </p:sldMasterIdLst>
+  <p:notesMasterIdLst>
+    <p:notesMasterId r:id="rId45"/>
+  </p:notesMasterIdLst>
   <p:sldIdLst>
     <p:sldId id="257" r:id="rId3"/>
     <p:sldId id="266" r:id="rId4"/>
@@ -46,6 +49,8 @@
     <p:sldId id="274" r:id="rId40"/>
     <p:sldId id="275" r:id="rId41"/>
     <p:sldId id="282" r:id="rId42"/>
+    <p:sldId id="304" r:id="rId43"/>
+    <p:sldId id="305" r:id="rId44"/>
   </p:sldIdLst>
   <p:sldSz cx="12192000" cy="6858000"/>
   <p:notesSz cx="6858000" cy="9144000"/>
@@ -150,6 +155,440 @@
     </p:ext>
   </p:extLst>
 </p:presentation>
+</file>
+
+<file path=ppt/notesMasters/notesMaster1.xml><?xml version="1.0" encoding="utf-8"?>
+<p:notesMaster xmlns:a="http://schemas.openxmlformats.org/drawingml/2006/main" xmlns:r="http://schemas.openxmlformats.org/officeDocument/2006/relationships" xmlns:p="http://schemas.openxmlformats.org/presentationml/2006/main">
+  <p:cSld>
+    <p:bg>
+      <p:bgRef idx="1001">
+        <a:schemeClr val="bg1"/>
+      </p:bgRef>
+    </p:bg>
+    <p:spTree>
+      <p:nvGrpSpPr>
+        <p:cNvPr id="1" name=""/>
+        <p:cNvGrpSpPr/>
+        <p:nvPr/>
+      </p:nvGrpSpPr>
+      <p:grpSpPr>
+        <a:xfrm>
+          <a:off x="0" y="0"/>
+          <a:ext cx="0" cy="0"/>
+          <a:chOff x="0" y="0"/>
+          <a:chExt cx="0" cy="0"/>
+        </a:xfrm>
+      </p:grpSpPr>
+      <p:sp>
+        <p:nvSpPr>
+          <p:cNvPr id="2" name="Header Placeholder 1"/>
+          <p:cNvSpPr>
+            <a:spLocks noGrp="1"/>
+          </p:cNvSpPr>
+          <p:nvPr>
+            <p:ph type="hdr" sz="quarter"/>
+          </p:nvPr>
+        </p:nvSpPr>
+        <p:spPr>
+          <a:xfrm>
+            <a:off x="0" y="0"/>
+            <a:ext cx="2971800" cy="458788"/>
+          </a:xfrm>
+          <a:prstGeom prst="rect">
+            <a:avLst/>
+          </a:prstGeom>
+        </p:spPr>
+        <p:txBody>
+          <a:bodyPr vert="horz" lIns="91440" tIns="45720" rIns="91440" bIns="45720" rtlCol="0"/>
+          <a:lstStyle>
+            <a:lvl1pPr algn="l">
+              <a:defRPr sz="1200"/>
+            </a:lvl1pPr>
+          </a:lstStyle>
+          <a:p>
+            <a:endParaRPr lang="en-IN"/>
+          </a:p>
+        </p:txBody>
+      </p:sp>
+      <p:sp>
+        <p:nvSpPr>
+          <p:cNvPr id="3" name="Date Placeholder 2"/>
+          <p:cNvSpPr>
+            <a:spLocks noGrp="1"/>
+          </p:cNvSpPr>
+          <p:nvPr>
+            <p:ph type="dt" idx="1"/>
+          </p:nvPr>
+        </p:nvSpPr>
+        <p:spPr>
+          <a:xfrm>
+            <a:off x="3884613" y="0"/>
+            <a:ext cx="2971800" cy="458788"/>
+          </a:xfrm>
+          <a:prstGeom prst="rect">
+            <a:avLst/>
+          </a:prstGeom>
+        </p:spPr>
+        <p:txBody>
+          <a:bodyPr vert="horz" lIns="91440" tIns="45720" rIns="91440" bIns="45720" rtlCol="0"/>
+          <a:lstStyle>
+            <a:lvl1pPr algn="r">
+              <a:defRPr sz="1200"/>
+            </a:lvl1pPr>
+          </a:lstStyle>
+          <a:p>
+            <a:fld id="{8BF6BA77-2476-473E-89EB-9E57F59DAA33}" type="datetimeFigureOut">
+              <a:rPr lang="en-IN" smtClean="0"/>
+              <a:t>04-05-2025</a:t>
+            </a:fld>
+            <a:endParaRPr lang="en-IN"/>
+          </a:p>
+        </p:txBody>
+      </p:sp>
+      <p:sp>
+        <p:nvSpPr>
+          <p:cNvPr id="4" name="Slide Image Placeholder 3"/>
+          <p:cNvSpPr>
+            <a:spLocks noGrp="1" noRot="1" noChangeAspect="1"/>
+          </p:cNvSpPr>
+          <p:nvPr>
+            <p:ph type="sldImg" idx="2"/>
+          </p:nvPr>
+        </p:nvSpPr>
+        <p:spPr>
+          <a:xfrm>
+            <a:off x="685800" y="1143000"/>
+            <a:ext cx="5486400" cy="3086100"/>
+          </a:xfrm>
+          <a:prstGeom prst="rect">
+            <a:avLst/>
+          </a:prstGeom>
+          <a:noFill/>
+          <a:ln w="12700">
+            <a:solidFill>
+              <a:prstClr val="black"/>
+            </a:solidFill>
+          </a:ln>
+        </p:spPr>
+        <p:txBody>
+          <a:bodyPr vert="horz" lIns="91440" tIns="45720" rIns="91440" bIns="45720" rtlCol="0" anchor="ctr"/>
+          <a:lstStyle/>
+          <a:p>
+            <a:endParaRPr lang="en-IN"/>
+          </a:p>
+        </p:txBody>
+      </p:sp>
+      <p:sp>
+        <p:nvSpPr>
+          <p:cNvPr id="5" name="Notes Placeholder 4"/>
+          <p:cNvSpPr>
+            <a:spLocks noGrp="1"/>
+          </p:cNvSpPr>
+          <p:nvPr>
+            <p:ph type="body" sz="quarter" idx="3"/>
+          </p:nvPr>
+        </p:nvSpPr>
+        <p:spPr>
+          <a:xfrm>
+            <a:off x="685800" y="4400550"/>
+            <a:ext cx="5486400" cy="3600450"/>
+          </a:xfrm>
+          <a:prstGeom prst="rect">
+            <a:avLst/>
+          </a:prstGeom>
+        </p:spPr>
+        <p:txBody>
+          <a:bodyPr vert="horz" lIns="91440" tIns="45720" rIns="91440" bIns="45720" rtlCol="0"/>
+          <a:lstStyle/>
+          <a:p>
+            <a:pPr lvl="0"/>
+            <a:r>
+              <a:rPr lang="en-US"/>
+              <a:t>Click to edit Master text styles</a:t>
+            </a:r>
+          </a:p>
+          <a:p>
+            <a:pPr lvl="1"/>
+            <a:r>
+              <a:rPr lang="en-US"/>
+              <a:t>Second level</a:t>
+            </a:r>
+          </a:p>
+          <a:p>
+            <a:pPr lvl="2"/>
+            <a:r>
+              <a:rPr lang="en-US"/>
+              <a:t>Third level</a:t>
+            </a:r>
+          </a:p>
+          <a:p>
+            <a:pPr lvl="3"/>
+            <a:r>
+              <a:rPr lang="en-US"/>
+              <a:t>Fourth level</a:t>
+            </a:r>
+          </a:p>
+          <a:p>
+            <a:pPr lvl="4"/>
+            <a:r>
+              <a:rPr lang="en-US"/>
+              <a:t>Fifth level</a:t>
+            </a:r>
+            <a:endParaRPr lang="en-IN"/>
+          </a:p>
+        </p:txBody>
+      </p:sp>
+      <p:sp>
+        <p:nvSpPr>
+          <p:cNvPr id="6" name="Footer Placeholder 5"/>
+          <p:cNvSpPr>
+            <a:spLocks noGrp="1"/>
+          </p:cNvSpPr>
+          <p:nvPr>
+            <p:ph type="ftr" sz="quarter" idx="4"/>
+          </p:nvPr>
+        </p:nvSpPr>
+        <p:spPr>
+          <a:xfrm>
+            <a:off x="0" y="8685213"/>
+            <a:ext cx="2971800" cy="458787"/>
+          </a:xfrm>
+          <a:prstGeom prst="rect">
+            <a:avLst/>
+          </a:prstGeom>
+        </p:spPr>
+        <p:txBody>
+          <a:bodyPr vert="horz" lIns="91440" tIns="45720" rIns="91440" bIns="45720" rtlCol="0" anchor="b"/>
+          <a:lstStyle>
+            <a:lvl1pPr algn="l">
+              <a:defRPr sz="1200"/>
+            </a:lvl1pPr>
+          </a:lstStyle>
+          <a:p>
+            <a:endParaRPr lang="en-IN"/>
+          </a:p>
+        </p:txBody>
+      </p:sp>
+      <p:sp>
+        <p:nvSpPr>
+          <p:cNvPr id="7" name="Slide Number Placeholder 6"/>
+          <p:cNvSpPr>
+            <a:spLocks noGrp="1"/>
+          </p:cNvSpPr>
+          <p:nvPr>
+            <p:ph type="sldNum" sz="quarter" idx="5"/>
+          </p:nvPr>
+        </p:nvSpPr>
+        <p:spPr>
+          <a:xfrm>
+            <a:off x="3884613" y="8685213"/>
+            <a:ext cx="2971800" cy="458787"/>
+          </a:xfrm>
+          <a:prstGeom prst="rect">
+            <a:avLst/>
+          </a:prstGeom>
+        </p:spPr>
+        <p:txBody>
+          <a:bodyPr vert="horz" lIns="91440" tIns="45720" rIns="91440" bIns="45720" rtlCol="0" anchor="b"/>
+          <a:lstStyle>
+            <a:lvl1pPr algn="r">
+              <a:defRPr sz="1200"/>
+            </a:lvl1pPr>
+          </a:lstStyle>
+          <a:p>
+            <a:fld id="{B620DCEA-F05E-4E52-8F87-F891EEBC7FC5}" type="slidenum">
+              <a:rPr lang="en-IN" smtClean="0"/>
+              <a:t>‹#›</a:t>
+            </a:fld>
+            <a:endParaRPr lang="en-IN"/>
+          </a:p>
+        </p:txBody>
+      </p:sp>
+    </p:spTree>
+    <p:extLst>
+      <p:ext uri="{BB962C8B-B14F-4D97-AF65-F5344CB8AC3E}">
+        <p14:creationId xmlns:p14="http://schemas.microsoft.com/office/powerpoint/2010/main" val="4209556818"/>
+      </p:ext>
+    </p:extLst>
+  </p:cSld>
+  <p:clrMap bg1="lt1" tx1="dk1" bg2="lt2" tx2="dk2" accent1="accent1" accent2="accent2" accent3="accent3" accent4="accent4" accent5="accent5" accent6="accent6" hlink="hlink" folHlink="folHlink"/>
+  <p:notesStyle>
+    <a:lvl1pPr marL="0" algn="l" defTabSz="914400" rtl="0" eaLnBrk="1" latinLnBrk="0" hangingPunct="1">
+      <a:defRPr sz="1200" kern="1200">
+        <a:solidFill>
+          <a:schemeClr val="tx1"/>
+        </a:solidFill>
+        <a:latin typeface="+mn-lt"/>
+        <a:ea typeface="+mn-ea"/>
+        <a:cs typeface="+mn-cs"/>
+      </a:defRPr>
+    </a:lvl1pPr>
+    <a:lvl2pPr marL="457200" algn="l" defTabSz="914400" rtl="0" eaLnBrk="1" latinLnBrk="0" hangingPunct="1">
+      <a:defRPr sz="1200" kern="1200">
+        <a:solidFill>
+          <a:schemeClr val="tx1"/>
+        </a:solidFill>
+        <a:latin typeface="+mn-lt"/>
+        <a:ea typeface="+mn-ea"/>
+        <a:cs typeface="+mn-cs"/>
+      </a:defRPr>
+    </a:lvl2pPr>
+    <a:lvl3pPr marL="914400" algn="l" defTabSz="914400" rtl="0" eaLnBrk="1" latinLnBrk="0" hangingPunct="1">
+      <a:defRPr sz="1200" kern="1200">
+        <a:solidFill>
+          <a:schemeClr val="tx1"/>
+        </a:solidFill>
+        <a:latin typeface="+mn-lt"/>
+        <a:ea typeface="+mn-ea"/>
+        <a:cs typeface="+mn-cs"/>
+      </a:defRPr>
+    </a:lvl3pPr>
+    <a:lvl4pPr marL="1371600" algn="l" defTabSz="914400" rtl="0" eaLnBrk="1" latinLnBrk="0" hangingPunct="1">
+      <a:defRPr sz="1200" kern="1200">
+        <a:solidFill>
+          <a:schemeClr val="tx1"/>
+        </a:solidFill>
+        <a:latin typeface="+mn-lt"/>
+        <a:ea typeface="+mn-ea"/>
+        <a:cs typeface="+mn-cs"/>
+      </a:defRPr>
+    </a:lvl4pPr>
+    <a:lvl5pPr marL="1828800" algn="l" defTabSz="914400" rtl="0" eaLnBrk="1" latinLnBrk="0" hangingPunct="1">
+      <a:defRPr sz="1200" kern="1200">
+        <a:solidFill>
+          <a:schemeClr val="tx1"/>
+        </a:solidFill>
+        <a:latin typeface="+mn-lt"/>
+        <a:ea typeface="+mn-ea"/>
+        <a:cs typeface="+mn-cs"/>
+      </a:defRPr>
+    </a:lvl5pPr>
+    <a:lvl6pPr marL="2286000" algn="l" defTabSz="914400" rtl="0" eaLnBrk="1" latinLnBrk="0" hangingPunct="1">
+      <a:defRPr sz="1200" kern="1200">
+        <a:solidFill>
+          <a:schemeClr val="tx1"/>
+        </a:solidFill>
+        <a:latin typeface="+mn-lt"/>
+        <a:ea typeface="+mn-ea"/>
+        <a:cs typeface="+mn-cs"/>
+      </a:defRPr>
+    </a:lvl6pPr>
+    <a:lvl7pPr marL="2743200" algn="l" defTabSz="914400" rtl="0" eaLnBrk="1" latinLnBrk="0" hangingPunct="1">
+      <a:defRPr sz="1200" kern="1200">
+        <a:solidFill>
+          <a:schemeClr val="tx1"/>
+        </a:solidFill>
+        <a:latin typeface="+mn-lt"/>
+        <a:ea typeface="+mn-ea"/>
+        <a:cs typeface="+mn-cs"/>
+      </a:defRPr>
+    </a:lvl7pPr>
+    <a:lvl8pPr marL="3200400" algn="l" defTabSz="914400" rtl="0" eaLnBrk="1" latinLnBrk="0" hangingPunct="1">
+      <a:defRPr sz="1200" kern="1200">
+        <a:solidFill>
+          <a:schemeClr val="tx1"/>
+        </a:solidFill>
+        <a:latin typeface="+mn-lt"/>
+        <a:ea typeface="+mn-ea"/>
+        <a:cs typeface="+mn-cs"/>
+      </a:defRPr>
+    </a:lvl8pPr>
+    <a:lvl9pPr marL="3657600" algn="l" defTabSz="914400" rtl="0" eaLnBrk="1" latinLnBrk="0" hangingPunct="1">
+      <a:defRPr sz="1200" kern="1200">
+        <a:solidFill>
+          <a:schemeClr val="tx1"/>
+        </a:solidFill>
+        <a:latin typeface="+mn-lt"/>
+        <a:ea typeface="+mn-ea"/>
+        <a:cs typeface="+mn-cs"/>
+      </a:defRPr>
+    </a:lvl9pPr>
+  </p:notesStyle>
+</p:notesMaster>
+</file>
+
+<file path=ppt/notesSlides/notesSlide1.xml><?xml version="1.0" encoding="utf-8"?>
+<p:notes xmlns:a="http://schemas.openxmlformats.org/drawingml/2006/main" xmlns:r="http://schemas.openxmlformats.org/officeDocument/2006/relationships" xmlns:p="http://schemas.openxmlformats.org/presentationml/2006/main">
+  <p:cSld>
+    <p:spTree>
+      <p:nvGrpSpPr>
+        <p:cNvPr id="1" name=""/>
+        <p:cNvGrpSpPr/>
+        <p:nvPr/>
+      </p:nvGrpSpPr>
+      <p:grpSpPr>
+        <a:xfrm>
+          <a:off x="0" y="0"/>
+          <a:ext cx="0" cy="0"/>
+          <a:chOff x="0" y="0"/>
+          <a:chExt cx="0" cy="0"/>
+        </a:xfrm>
+      </p:grpSpPr>
+      <p:sp>
+        <p:nvSpPr>
+          <p:cNvPr id="2" name="Slide Image Placeholder 1"/>
+          <p:cNvSpPr>
+            <a:spLocks noGrp="1" noRot="1" noChangeAspect="1"/>
+          </p:cNvSpPr>
+          <p:nvPr>
+            <p:ph type="sldImg"/>
+          </p:nvPr>
+        </p:nvSpPr>
+        <p:spPr/>
+      </p:sp>
+      <p:sp>
+        <p:nvSpPr>
+          <p:cNvPr id="3" name="Notes Placeholder 2"/>
+          <p:cNvSpPr>
+            <a:spLocks noGrp="1"/>
+          </p:cNvSpPr>
+          <p:nvPr>
+            <p:ph type="body" idx="1"/>
+          </p:nvPr>
+        </p:nvSpPr>
+        <p:spPr/>
+        <p:txBody>
+          <a:bodyPr/>
+          <a:lstStyle/>
+          <a:p>
+            <a:endParaRPr lang="en-IN"/>
+          </a:p>
+        </p:txBody>
+      </p:sp>
+      <p:sp>
+        <p:nvSpPr>
+          <p:cNvPr id="4" name="Slide Number Placeholder 3"/>
+          <p:cNvSpPr>
+            <a:spLocks noGrp="1"/>
+          </p:cNvSpPr>
+          <p:nvPr>
+            <p:ph type="sldNum" sz="quarter" idx="5"/>
+          </p:nvPr>
+        </p:nvSpPr>
+        <p:spPr/>
+        <p:txBody>
+          <a:bodyPr/>
+          <a:lstStyle/>
+          <a:p>
+            <a:fld id="{B620DCEA-F05E-4E52-8F87-F891EEBC7FC5}" type="slidenum">
+              <a:rPr lang="en-IN" smtClean="0"/>
+              <a:t>41</a:t>
+            </a:fld>
+            <a:endParaRPr lang="en-IN"/>
+          </a:p>
+        </p:txBody>
+      </p:sp>
+    </p:spTree>
+    <p:extLst>
+      <p:ext uri="{BB962C8B-B14F-4D97-AF65-F5344CB8AC3E}">
+        <p14:creationId xmlns:p14="http://schemas.microsoft.com/office/powerpoint/2010/main" val="284967525"/>
+      </p:ext>
+    </p:extLst>
+  </p:cSld>
+  <p:clrMapOvr>
+    <a:masterClrMapping/>
+  </p:clrMapOvr>
+</p:notes>
 </file>
 
 <file path=ppt/slideLayouts/slideLayout1.xml><?xml version="1.0" encoding="utf-8"?>
@@ -8139,7 +8578,7 @@
           <p:nvPr>
             <p:extLst>
               <p:ext uri="{D42A27DB-BD31-4B8C-83A1-F6EECF244321}">
-                <p14:modId xmlns:p14="http://schemas.microsoft.com/office/powerpoint/2010/main" val="1108700988"/>
+                <p14:modId xmlns:p14="http://schemas.microsoft.com/office/powerpoint/2010/main" val="4251893370"/>
               </p:ext>
             </p:extLst>
           </p:nvPr>
@@ -14446,12 +14885,41 @@
             <p:ph idx="1"/>
           </p:nvPr>
         </p:nvSpPr>
-        <p:spPr/>
+        <p:spPr>
+          <a:xfrm>
+            <a:off x="566927" y="2185416"/>
+            <a:ext cx="9744391" cy="3968249"/>
+          </a:xfrm>
+        </p:spPr>
         <p:txBody>
           <a:bodyPr/>
           <a:lstStyle/>
           <a:p>
-            <a:endParaRPr lang="en-IN"/>
+            <a:r>
+              <a:rPr lang="en-US" dirty="0"/>
+              <a:t>Training Pong requires a lot of computational power. We overcame this challenge by using </a:t>
+            </a:r>
+            <a:r>
+              <a:rPr lang="en-US" dirty="0" err="1"/>
+              <a:t>RunPod</a:t>
+            </a:r>
+            <a:r>
+              <a:rPr lang="en-US" dirty="0"/>
+              <a:t> for training purposes</a:t>
+            </a:r>
+          </a:p>
+          <a:p>
+            <a:r>
+              <a:rPr lang="en-US" dirty="0"/>
+              <a:t>For all the models we had spend time to tune the hyperparameters</a:t>
+            </a:r>
+          </a:p>
+          <a:p>
+            <a:r>
+              <a:rPr lang="en-US" dirty="0"/>
+              <a:t>PPO didn’t converge in case of Lunar Lander</a:t>
+            </a:r>
+            <a:endParaRPr lang="en-IN" dirty="0"/>
           </a:p>
         </p:txBody>
       </p:sp>
@@ -14907,6 +15375,384 @@
     <p:extLst>
       <p:ext uri="{BB962C8B-B14F-4D97-AF65-F5344CB8AC3E}">
         <p14:creationId xmlns:p14="http://schemas.microsoft.com/office/powerpoint/2010/main" val="3290968601"/>
+      </p:ext>
+    </p:extLst>
+  </p:cSld>
+  <p:clrMapOvr>
+    <a:masterClrMapping/>
+  </p:clrMapOvr>
+</p:sld>
+</file>
+
+<file path=ppt/slides/slide41.xml><?xml version="1.0" encoding="utf-8"?>
+<p:sld xmlns:a="http://schemas.openxmlformats.org/drawingml/2006/main" xmlns:r="http://schemas.openxmlformats.org/officeDocument/2006/relationships" xmlns:p="http://schemas.openxmlformats.org/presentationml/2006/main">
+  <p:cSld>
+    <p:spTree>
+      <p:nvGrpSpPr>
+        <p:cNvPr id="1" name=""/>
+        <p:cNvGrpSpPr/>
+        <p:nvPr/>
+      </p:nvGrpSpPr>
+      <p:grpSpPr>
+        <a:xfrm>
+          <a:off x="0" y="0"/>
+          <a:ext cx="0" cy="0"/>
+          <a:chOff x="0" y="0"/>
+          <a:chExt cx="0" cy="0"/>
+        </a:xfrm>
+      </p:grpSpPr>
+      <p:sp>
+        <p:nvSpPr>
+          <p:cNvPr id="2" name="Title 1">
+            <a:extLst>
+              <a:ext uri="{FF2B5EF4-FFF2-40B4-BE49-F238E27FC236}">
+                <a16:creationId xmlns:a16="http://schemas.microsoft.com/office/drawing/2014/main" id="{5E79F49B-F4A5-A948-4371-341B449F2E74}"/>
+              </a:ext>
+            </a:extLst>
+          </p:cNvPr>
+          <p:cNvSpPr>
+            <a:spLocks noGrp="1"/>
+          </p:cNvSpPr>
+          <p:nvPr>
+            <p:ph type="title"/>
+          </p:nvPr>
+        </p:nvSpPr>
+        <p:spPr>
+          <a:xfrm>
+            <a:off x="566928" y="1317475"/>
+            <a:ext cx="10318322" cy="694839"/>
+          </a:xfrm>
+        </p:spPr>
+        <p:txBody>
+          <a:bodyPr/>
+          <a:lstStyle/>
+          <a:p>
+            <a:r>
+              <a:rPr lang="en-US" dirty="0"/>
+              <a:t>GitHub Repository Link and Commit History</a:t>
+            </a:r>
+            <a:endParaRPr lang="en-IN" dirty="0"/>
+          </a:p>
+        </p:txBody>
+      </p:sp>
+      <p:sp>
+        <p:nvSpPr>
+          <p:cNvPr id="3" name="Content Placeholder 2">
+            <a:extLst>
+              <a:ext uri="{FF2B5EF4-FFF2-40B4-BE49-F238E27FC236}">
+                <a16:creationId xmlns:a16="http://schemas.microsoft.com/office/drawing/2014/main" id="{7F4ED775-5401-145F-EBE9-4E2AA273DC13}"/>
+              </a:ext>
+            </a:extLst>
+          </p:cNvPr>
+          <p:cNvSpPr>
+            <a:spLocks noGrp="1"/>
+          </p:cNvSpPr>
+          <p:nvPr>
+            <p:ph idx="1"/>
+          </p:nvPr>
+        </p:nvSpPr>
+        <p:spPr>
+          <a:xfrm>
+            <a:off x="566927" y="2185416"/>
+            <a:ext cx="10318323" cy="693971"/>
+          </a:xfrm>
+        </p:spPr>
+        <p:txBody>
+          <a:bodyPr/>
+          <a:lstStyle/>
+          <a:p>
+            <a:r>
+              <a:rPr lang="en-US" dirty="0"/>
+              <a:t>Link to Repository: </a:t>
+            </a:r>
+            <a:r>
+              <a:rPr lang="en-US" dirty="0">
+                <a:hlinkClick r:id="rId3"/>
+              </a:rPr>
+              <a:t>https://github.com/vivek-viswam-rv/cse-546-final-project/tree/main</a:t>
+            </a:r>
+            <a:endParaRPr lang="en-US" dirty="0"/>
+          </a:p>
+          <a:p>
+            <a:pPr marL="0" indent="0">
+              <a:buNone/>
+            </a:pPr>
+            <a:endParaRPr lang="en-IN" dirty="0"/>
+          </a:p>
+        </p:txBody>
+      </p:sp>
+      <p:sp>
+        <p:nvSpPr>
+          <p:cNvPr id="4" name="Footer Placeholder 3">
+            <a:extLst>
+              <a:ext uri="{FF2B5EF4-FFF2-40B4-BE49-F238E27FC236}">
+                <a16:creationId xmlns:a16="http://schemas.microsoft.com/office/drawing/2014/main" id="{F461664C-D3A6-DAB0-8948-39178D659DDE}"/>
+              </a:ext>
+            </a:extLst>
+          </p:cNvPr>
+          <p:cNvSpPr>
+            <a:spLocks noGrp="1"/>
+          </p:cNvSpPr>
+          <p:nvPr>
+            <p:ph type="ftr" sz="quarter" idx="10"/>
+          </p:nvPr>
+        </p:nvSpPr>
+        <p:spPr/>
+        <p:txBody>
+          <a:bodyPr/>
+          <a:lstStyle/>
+          <a:p>
+            <a:fld id="{EB53C135-CEC6-A548-8917-8F7FEB82358B}" type="slidenum">
+              <a:rPr lang="en-US" smtClean="0"/>
+              <a:pPr/>
+              <a:t>41</a:t>
+            </a:fld>
+            <a:endParaRPr lang="en-US" dirty="0"/>
+          </a:p>
+        </p:txBody>
+      </p:sp>
+      <p:pic>
+        <p:nvPicPr>
+          <p:cNvPr id="6" name="Picture 5">
+            <a:extLst>
+              <a:ext uri="{FF2B5EF4-FFF2-40B4-BE49-F238E27FC236}">
+                <a16:creationId xmlns:a16="http://schemas.microsoft.com/office/drawing/2014/main" id="{862D3CE5-3A1D-8456-82CF-5EBF24A3E3A1}"/>
+              </a:ext>
+            </a:extLst>
+          </p:cNvPr>
+          <p:cNvPicPr>
+            <a:picLocks noChangeAspect="1"/>
+          </p:cNvPicPr>
+          <p:nvPr/>
+        </p:nvPicPr>
+        <p:blipFill>
+          <a:blip r:embed="rId4"/>
+          <a:stretch>
+            <a:fillRect/>
+          </a:stretch>
+        </p:blipFill>
+        <p:spPr>
+          <a:xfrm>
+            <a:off x="0" y="3143454"/>
+            <a:ext cx="4339573" cy="3541444"/>
+          </a:xfrm>
+          <a:prstGeom prst="rect">
+            <a:avLst/>
+          </a:prstGeom>
+        </p:spPr>
+      </p:pic>
+      <p:pic>
+        <p:nvPicPr>
+          <p:cNvPr id="8" name="Picture 7">
+            <a:extLst>
+              <a:ext uri="{FF2B5EF4-FFF2-40B4-BE49-F238E27FC236}">
+                <a16:creationId xmlns:a16="http://schemas.microsoft.com/office/drawing/2014/main" id="{4E8CA1F9-2D71-F5F9-3A30-CDD29B59A826}"/>
+              </a:ext>
+            </a:extLst>
+          </p:cNvPr>
+          <p:cNvPicPr>
+            <a:picLocks noChangeAspect="1"/>
+          </p:cNvPicPr>
+          <p:nvPr/>
+        </p:nvPicPr>
+        <p:blipFill>
+          <a:blip r:embed="rId5"/>
+          <a:stretch>
+            <a:fillRect/>
+          </a:stretch>
+        </p:blipFill>
+        <p:spPr>
+          <a:xfrm>
+            <a:off x="4339573" y="3143455"/>
+            <a:ext cx="4580717" cy="3714545"/>
+          </a:xfrm>
+          <a:prstGeom prst="rect">
+            <a:avLst/>
+          </a:prstGeom>
+        </p:spPr>
+      </p:pic>
+      <p:pic>
+        <p:nvPicPr>
+          <p:cNvPr id="10" name="Picture 9">
+            <a:extLst>
+              <a:ext uri="{FF2B5EF4-FFF2-40B4-BE49-F238E27FC236}">
+                <a16:creationId xmlns:a16="http://schemas.microsoft.com/office/drawing/2014/main" id="{480A96F1-C985-ED50-EE30-4F9F738A4E02}"/>
+              </a:ext>
+            </a:extLst>
+          </p:cNvPr>
+          <p:cNvPicPr>
+            <a:picLocks noChangeAspect="1"/>
+          </p:cNvPicPr>
+          <p:nvPr/>
+        </p:nvPicPr>
+        <p:blipFill>
+          <a:blip r:embed="rId6"/>
+          <a:srcRect r="41543"/>
+          <a:stretch/>
+        </p:blipFill>
+        <p:spPr>
+          <a:xfrm>
+            <a:off x="8754433" y="3115902"/>
+            <a:ext cx="3254687" cy="1483678"/>
+          </a:xfrm>
+          <a:prstGeom prst="rect">
+            <a:avLst/>
+          </a:prstGeom>
+        </p:spPr>
+      </p:pic>
+    </p:spTree>
+    <p:extLst>
+      <p:ext uri="{BB962C8B-B14F-4D97-AF65-F5344CB8AC3E}">
+        <p14:creationId xmlns:p14="http://schemas.microsoft.com/office/powerpoint/2010/main" val="2706536067"/>
+      </p:ext>
+    </p:extLst>
+  </p:cSld>
+  <p:clrMapOvr>
+    <a:masterClrMapping/>
+  </p:clrMapOvr>
+</p:sld>
+</file>
+
+<file path=ppt/slides/slide42.xml><?xml version="1.0" encoding="utf-8"?>
+<p:sld xmlns:a="http://schemas.openxmlformats.org/drawingml/2006/main" xmlns:r="http://schemas.openxmlformats.org/officeDocument/2006/relationships" xmlns:p="http://schemas.openxmlformats.org/presentationml/2006/main">
+  <p:cSld>
+    <p:spTree>
+      <p:nvGrpSpPr>
+        <p:cNvPr id="1" name=""/>
+        <p:cNvGrpSpPr/>
+        <p:nvPr/>
+      </p:nvGrpSpPr>
+      <p:grpSpPr>
+        <a:xfrm>
+          <a:off x="0" y="0"/>
+          <a:ext cx="0" cy="0"/>
+          <a:chOff x="0" y="0"/>
+          <a:chExt cx="0" cy="0"/>
+        </a:xfrm>
+      </p:grpSpPr>
+      <p:sp>
+        <p:nvSpPr>
+          <p:cNvPr id="4" name="Footer Placeholder 3">
+            <a:extLst>
+              <a:ext uri="{FF2B5EF4-FFF2-40B4-BE49-F238E27FC236}">
+                <a16:creationId xmlns:a16="http://schemas.microsoft.com/office/drawing/2014/main" id="{A69F773A-713A-C4D0-719E-B84D8ABBEF9E}"/>
+              </a:ext>
+            </a:extLst>
+          </p:cNvPr>
+          <p:cNvSpPr>
+            <a:spLocks noGrp="1"/>
+          </p:cNvSpPr>
+          <p:nvPr>
+            <p:ph type="ftr" sz="quarter" idx="10"/>
+          </p:nvPr>
+        </p:nvSpPr>
+        <p:spPr/>
+        <p:txBody>
+          <a:bodyPr/>
+          <a:lstStyle/>
+          <a:p>
+            <a:fld id="{EB53C135-CEC6-A548-8917-8F7FEB82358B}" type="slidenum">
+              <a:rPr lang="en-US" smtClean="0"/>
+              <a:pPr/>
+              <a:t>42</a:t>
+            </a:fld>
+            <a:endParaRPr lang="en-US" dirty="0"/>
+          </a:p>
+        </p:txBody>
+      </p:sp>
+      <p:pic>
+        <p:nvPicPr>
+          <p:cNvPr id="6" name="Picture 5">
+            <a:extLst>
+              <a:ext uri="{FF2B5EF4-FFF2-40B4-BE49-F238E27FC236}">
+                <a16:creationId xmlns:a16="http://schemas.microsoft.com/office/drawing/2014/main" id="{3BE7403E-9B85-EA33-F537-4D80B7B5CDBD}"/>
+              </a:ext>
+            </a:extLst>
+          </p:cNvPr>
+          <p:cNvPicPr>
+            <a:picLocks noChangeAspect="1"/>
+          </p:cNvPicPr>
+          <p:nvPr/>
+        </p:nvPicPr>
+        <p:blipFill>
+          <a:blip r:embed="rId2"/>
+          <a:stretch>
+            <a:fillRect/>
+          </a:stretch>
+        </p:blipFill>
+        <p:spPr>
+          <a:xfrm>
+            <a:off x="0" y="1794642"/>
+            <a:ext cx="5074060" cy="4525132"/>
+          </a:xfrm>
+          <a:prstGeom prst="rect">
+            <a:avLst/>
+          </a:prstGeom>
+        </p:spPr>
+      </p:pic>
+      <p:pic>
+        <p:nvPicPr>
+          <p:cNvPr id="8" name="Picture 7">
+            <a:extLst>
+              <a:ext uri="{FF2B5EF4-FFF2-40B4-BE49-F238E27FC236}">
+                <a16:creationId xmlns:a16="http://schemas.microsoft.com/office/drawing/2014/main" id="{1ADB579C-0347-EBDE-1CE7-2135E43F6CBA}"/>
+              </a:ext>
+            </a:extLst>
+          </p:cNvPr>
+          <p:cNvPicPr>
+            <a:picLocks noChangeAspect="1"/>
+          </p:cNvPicPr>
+          <p:nvPr/>
+        </p:nvPicPr>
+        <p:blipFill>
+          <a:blip r:embed="rId3"/>
+          <a:stretch>
+            <a:fillRect/>
+          </a:stretch>
+        </p:blipFill>
+        <p:spPr>
+          <a:xfrm>
+            <a:off x="4779994" y="1898208"/>
+            <a:ext cx="5117404" cy="4421566"/>
+          </a:xfrm>
+          <a:prstGeom prst="rect">
+            <a:avLst/>
+          </a:prstGeom>
+        </p:spPr>
+      </p:pic>
+      <p:pic>
+        <p:nvPicPr>
+          <p:cNvPr id="10" name="Picture 9">
+            <a:extLst>
+              <a:ext uri="{FF2B5EF4-FFF2-40B4-BE49-F238E27FC236}">
+                <a16:creationId xmlns:a16="http://schemas.microsoft.com/office/drawing/2014/main" id="{C745FF02-7268-FE60-6FCB-5268F899845F}"/>
+              </a:ext>
+            </a:extLst>
+          </p:cNvPr>
+          <p:cNvPicPr>
+            <a:picLocks noChangeAspect="1"/>
+          </p:cNvPicPr>
+          <p:nvPr/>
+        </p:nvPicPr>
+        <p:blipFill>
+          <a:blip r:embed="rId4"/>
+          <a:srcRect r="62840"/>
+          <a:stretch/>
+        </p:blipFill>
+        <p:spPr>
+          <a:xfrm>
+            <a:off x="9333230" y="1898208"/>
+            <a:ext cx="2498874" cy="1899920"/>
+          </a:xfrm>
+          <a:prstGeom prst="rect">
+            <a:avLst/>
+          </a:prstGeom>
+        </p:spPr>
+      </p:pic>
+    </p:spTree>
+    <p:extLst>
+      <p:ext uri="{BB962C8B-B14F-4D97-AF65-F5344CB8AC3E}">
+        <p14:creationId xmlns:p14="http://schemas.microsoft.com/office/powerpoint/2010/main" val="87537893"/>
       </p:ext>
     </p:extLst>
   </p:cSld>
@@ -16305,4 +17151,319 @@
     </a:ext>
   </a:extLst>
 </a:theme>
+</file>
+
+<file path=ppt/theme/theme3.xml><?xml version="1.0" encoding="utf-8"?>
+<a:theme xmlns:a="http://schemas.openxmlformats.org/drawingml/2006/main" name="Office Theme">
+  <a:themeElements>
+    <a:clrScheme name="Office">
+      <a:dk1>
+        <a:sysClr val="windowText" lastClr="000000"/>
+      </a:dk1>
+      <a:lt1>
+        <a:sysClr val="window" lastClr="FFFFFF"/>
+      </a:lt1>
+      <a:dk2>
+        <a:srgbClr val="0E2841"/>
+      </a:dk2>
+      <a:lt2>
+        <a:srgbClr val="E8E8E8"/>
+      </a:lt2>
+      <a:accent1>
+        <a:srgbClr val="156082"/>
+      </a:accent1>
+      <a:accent2>
+        <a:srgbClr val="E97132"/>
+      </a:accent2>
+      <a:accent3>
+        <a:srgbClr val="196B24"/>
+      </a:accent3>
+      <a:accent4>
+        <a:srgbClr val="0F9ED5"/>
+      </a:accent4>
+      <a:accent5>
+        <a:srgbClr val="A02B93"/>
+      </a:accent5>
+      <a:accent6>
+        <a:srgbClr val="4EA72E"/>
+      </a:accent6>
+      <a:hlink>
+        <a:srgbClr val="467886"/>
+      </a:hlink>
+      <a:folHlink>
+        <a:srgbClr val="96607D"/>
+      </a:folHlink>
+    </a:clrScheme>
+    <a:fontScheme name="Office">
+      <a:majorFont>
+        <a:latin typeface="Aptos Display" panose="02110004020202020204"/>
+        <a:ea typeface=""/>
+        <a:cs typeface=""/>
+        <a:font script="Jpan" typeface="游ゴシック Light"/>
+        <a:font script="Hang" typeface="맑은 고딕"/>
+        <a:font script="Hans" typeface="等线 Light"/>
+        <a:font script="Hant" typeface="新細明體"/>
+        <a:font script="Arab" typeface="Times New Roman"/>
+        <a:font script="Hebr" typeface="Times New Roman"/>
+        <a:font script="Thai" typeface="Angsana New"/>
+        <a:font script="Ethi" typeface="Nyala"/>
+        <a:font script="Beng" typeface="Vrinda"/>
+        <a:font script="Gujr" typeface="Shruti"/>
+        <a:font script="Khmr" typeface="MoolBoran"/>
+        <a:font script="Knda" typeface="Tunga"/>
+        <a:font script="Guru" typeface="Raavi"/>
+        <a:font script="Cans" typeface="Euphemia"/>
+        <a:font script="Cher" typeface="Plantagenet Cherokee"/>
+        <a:font script="Yiii" typeface="Microsoft Yi Baiti"/>
+        <a:font script="Tibt" typeface="Microsoft Himalaya"/>
+        <a:font script="Thaa" typeface="MV Boli"/>
+        <a:font script="Deva" typeface="Mangal"/>
+        <a:font script="Telu" typeface="Gautami"/>
+        <a:font script="Taml" typeface="Latha"/>
+        <a:font script="Syrc" typeface="Estrangelo Edessa"/>
+        <a:font script="Orya" typeface="Kalinga"/>
+        <a:font script="Mlym" typeface="Kartika"/>
+        <a:font script="Laoo" typeface="DokChampa"/>
+        <a:font script="Sinh" typeface="Iskoola Pota"/>
+        <a:font script="Mong" typeface="Mongolian Baiti"/>
+        <a:font script="Viet" typeface="Times New Roman"/>
+        <a:font script="Uigh" typeface="Microsoft Uighur"/>
+        <a:font script="Geor" typeface="Sylfaen"/>
+        <a:font script="Armn" typeface="Arial"/>
+        <a:font script="Bugi" typeface="Leelawadee UI"/>
+        <a:font script="Bopo" typeface="Microsoft JhengHei"/>
+        <a:font script="Java" typeface="Javanese Text"/>
+        <a:font script="Lisu" typeface="Segoe UI"/>
+        <a:font script="Mymr" typeface="Myanmar Text"/>
+        <a:font script="Nkoo" typeface="Ebrima"/>
+        <a:font script="Olck" typeface="Nirmala UI"/>
+        <a:font script="Osma" typeface="Ebrima"/>
+        <a:font script="Phag" typeface="Phagspa"/>
+        <a:font script="Syrn" typeface="Estrangelo Edessa"/>
+        <a:font script="Syrj" typeface="Estrangelo Edessa"/>
+        <a:font script="Syre" typeface="Estrangelo Edessa"/>
+        <a:font script="Sora" typeface="Nirmala UI"/>
+        <a:font script="Tale" typeface="Microsoft Tai Le"/>
+        <a:font script="Talu" typeface="Microsoft New Tai Lue"/>
+        <a:font script="Tfng" typeface="Ebrima"/>
+      </a:majorFont>
+      <a:minorFont>
+        <a:latin typeface="Aptos" panose="02110004020202020204"/>
+        <a:ea typeface=""/>
+        <a:cs typeface=""/>
+        <a:font script="Jpan" typeface="游ゴシック"/>
+        <a:font script="Hang" typeface="맑은 고딕"/>
+        <a:font script="Hans" typeface="等线"/>
+        <a:font script="Hant" typeface="新細明體"/>
+        <a:font script="Arab" typeface="Arial"/>
+        <a:font script="Hebr" typeface="Arial"/>
+        <a:font script="Thai" typeface="Cordia New"/>
+        <a:font script="Ethi" typeface="Nyala"/>
+        <a:font script="Beng" typeface="Vrinda"/>
+        <a:font script="Gujr" typeface="Shruti"/>
+        <a:font script="Khmr" typeface="DaunPenh"/>
+        <a:font script="Knda" typeface="Tunga"/>
+        <a:font script="Guru" typeface="Raavi"/>
+        <a:font script="Cans" typeface="Euphemia"/>
+        <a:font script="Cher" typeface="Plantagenet Cherokee"/>
+        <a:font script="Yiii" typeface="Microsoft Yi Baiti"/>
+        <a:font script="Tibt" typeface="Microsoft Himalaya"/>
+        <a:font script="Thaa" typeface="MV Boli"/>
+        <a:font script="Deva" typeface="Mangal"/>
+        <a:font script="Telu" typeface="Gautami"/>
+        <a:font script="Taml" typeface="Latha"/>
+        <a:font script="Syrc" typeface="Estrangelo Edessa"/>
+        <a:font script="Orya" typeface="Kalinga"/>
+        <a:font script="Mlym" typeface="Kartika"/>
+        <a:font script="Laoo" typeface="DokChampa"/>
+        <a:font script="Sinh" typeface="Iskoola Pota"/>
+        <a:font script="Mong" typeface="Mongolian Baiti"/>
+        <a:font script="Viet" typeface="Arial"/>
+        <a:font script="Uigh" typeface="Microsoft Uighur"/>
+        <a:font script="Geor" typeface="Sylfaen"/>
+        <a:font script="Armn" typeface="Arial"/>
+        <a:font script="Bugi" typeface="Leelawadee UI"/>
+        <a:font script="Bopo" typeface="Microsoft JhengHei"/>
+        <a:font script="Java" typeface="Javanese Text"/>
+        <a:font script="Lisu" typeface="Segoe UI"/>
+        <a:font script="Mymr" typeface="Myanmar Text"/>
+        <a:font script="Nkoo" typeface="Ebrima"/>
+        <a:font script="Olck" typeface="Nirmala UI"/>
+        <a:font script="Osma" typeface="Ebrima"/>
+        <a:font script="Phag" typeface="Phagspa"/>
+        <a:font script="Syrn" typeface="Estrangelo Edessa"/>
+        <a:font script="Syrj" typeface="Estrangelo Edessa"/>
+        <a:font script="Syre" typeface="Estrangelo Edessa"/>
+        <a:font script="Sora" typeface="Nirmala UI"/>
+        <a:font script="Tale" typeface="Microsoft Tai Le"/>
+        <a:font script="Talu" typeface="Microsoft New Tai Lue"/>
+        <a:font script="Tfng" typeface="Ebrima"/>
+      </a:minorFont>
+    </a:fontScheme>
+    <a:fmtScheme name="Office">
+      <a:fillStyleLst>
+        <a:solidFill>
+          <a:schemeClr val="phClr"/>
+        </a:solidFill>
+        <a:gradFill rotWithShape="1">
+          <a:gsLst>
+            <a:gs pos="0">
+              <a:schemeClr val="phClr">
+                <a:lumMod val="110000"/>
+                <a:satMod val="105000"/>
+                <a:tint val="67000"/>
+              </a:schemeClr>
+            </a:gs>
+            <a:gs pos="50000">
+              <a:schemeClr val="phClr">
+                <a:lumMod val="105000"/>
+                <a:satMod val="103000"/>
+                <a:tint val="73000"/>
+              </a:schemeClr>
+            </a:gs>
+            <a:gs pos="100000">
+              <a:schemeClr val="phClr">
+                <a:lumMod val="105000"/>
+                <a:satMod val="109000"/>
+                <a:tint val="81000"/>
+              </a:schemeClr>
+            </a:gs>
+          </a:gsLst>
+          <a:lin ang="5400000" scaled="0"/>
+        </a:gradFill>
+        <a:gradFill rotWithShape="1">
+          <a:gsLst>
+            <a:gs pos="0">
+              <a:schemeClr val="phClr">
+                <a:satMod val="103000"/>
+                <a:lumMod val="102000"/>
+                <a:tint val="94000"/>
+              </a:schemeClr>
+            </a:gs>
+            <a:gs pos="50000">
+              <a:schemeClr val="phClr">
+                <a:satMod val="110000"/>
+                <a:lumMod val="100000"/>
+                <a:shade val="100000"/>
+              </a:schemeClr>
+            </a:gs>
+            <a:gs pos="100000">
+              <a:schemeClr val="phClr">
+                <a:lumMod val="99000"/>
+                <a:satMod val="120000"/>
+                <a:shade val="78000"/>
+              </a:schemeClr>
+            </a:gs>
+          </a:gsLst>
+          <a:lin ang="5400000" scaled="0"/>
+        </a:gradFill>
+      </a:fillStyleLst>
+      <a:lnStyleLst>
+        <a:ln w="12700" cap="flat" cmpd="sng" algn="ctr">
+          <a:solidFill>
+            <a:schemeClr val="phClr"/>
+          </a:solidFill>
+          <a:prstDash val="solid"/>
+          <a:miter lim="800000"/>
+        </a:ln>
+        <a:ln w="19050" cap="flat" cmpd="sng" algn="ctr">
+          <a:solidFill>
+            <a:schemeClr val="phClr"/>
+          </a:solidFill>
+          <a:prstDash val="solid"/>
+          <a:miter lim="800000"/>
+        </a:ln>
+        <a:ln w="25400" cap="flat" cmpd="sng" algn="ctr">
+          <a:solidFill>
+            <a:schemeClr val="phClr"/>
+          </a:solidFill>
+          <a:prstDash val="solid"/>
+          <a:miter lim="800000"/>
+        </a:ln>
+      </a:lnStyleLst>
+      <a:effectStyleLst>
+        <a:effectStyle>
+          <a:effectLst/>
+        </a:effectStyle>
+        <a:effectStyle>
+          <a:effectLst/>
+        </a:effectStyle>
+        <a:effectStyle>
+          <a:effectLst>
+            <a:outerShdw blurRad="57150" dist="19050" dir="5400000" algn="ctr" rotWithShape="0">
+              <a:srgbClr val="000000">
+                <a:alpha val="63000"/>
+              </a:srgbClr>
+            </a:outerShdw>
+          </a:effectLst>
+        </a:effectStyle>
+      </a:effectStyleLst>
+      <a:bgFillStyleLst>
+        <a:solidFill>
+          <a:schemeClr val="phClr"/>
+        </a:solidFill>
+        <a:solidFill>
+          <a:schemeClr val="phClr">
+            <a:tint val="95000"/>
+            <a:satMod val="170000"/>
+          </a:schemeClr>
+        </a:solidFill>
+        <a:gradFill rotWithShape="1">
+          <a:gsLst>
+            <a:gs pos="0">
+              <a:schemeClr val="phClr">
+                <a:tint val="93000"/>
+                <a:satMod val="150000"/>
+                <a:shade val="98000"/>
+                <a:lumMod val="102000"/>
+              </a:schemeClr>
+            </a:gs>
+            <a:gs pos="50000">
+              <a:schemeClr val="phClr">
+                <a:tint val="98000"/>
+                <a:satMod val="130000"/>
+                <a:shade val="90000"/>
+                <a:lumMod val="103000"/>
+              </a:schemeClr>
+            </a:gs>
+            <a:gs pos="100000">
+              <a:schemeClr val="phClr">
+                <a:shade val="63000"/>
+                <a:satMod val="120000"/>
+              </a:schemeClr>
+            </a:gs>
+          </a:gsLst>
+          <a:lin ang="5400000" scaled="0"/>
+        </a:gradFill>
+      </a:bgFillStyleLst>
+    </a:fmtScheme>
+  </a:themeElements>
+  <a:objectDefaults>
+    <a:lnDef>
+      <a:spPr/>
+      <a:bodyPr/>
+      <a:lstStyle/>
+      <a:style>
+        <a:lnRef idx="2">
+          <a:schemeClr val="accent1"/>
+        </a:lnRef>
+        <a:fillRef idx="0">
+          <a:schemeClr val="accent1"/>
+        </a:fillRef>
+        <a:effectRef idx="1">
+          <a:schemeClr val="accent1"/>
+        </a:effectRef>
+        <a:fontRef idx="minor">
+          <a:schemeClr val="tx1"/>
+        </a:fontRef>
+      </a:style>
+    </a:lnDef>
+  </a:objectDefaults>
+  <a:extraClrSchemeLst/>
+  <a:extLst>
+    <a:ext uri="{05A4C25C-085E-4340-85A3-A5531E510DB2}">
+      <thm15:themeFamily xmlns:thm15="http://schemas.microsoft.com/office/thememl/2012/main" name="Office Theme" id="{2E142A2C-CD16-42D6-873A-C26D2A0506FA}" vid="{1BDDFF52-6CD6-40A5-AB3C-68EB2F1E4D0A}"/>
+    </a:ext>
+  </a:extLst>
+</a:theme>
 </file>
</xml_diff>